<commit_message>
Added some new slides
</commit_message>
<xml_diff>
--- a/src/Restbucks.Site/Downloads/REST.pptx
+++ b/src/Restbucks.Site/Downloads/REST.pptx
@@ -10,15 +10,17 @@
     <p:sldId id="258" r:id="rId4"/>
     <p:sldId id="259" r:id="rId5"/>
     <p:sldId id="260" r:id="rId6"/>
-    <p:sldId id="261" r:id="rId7"/>
-    <p:sldId id="262" r:id="rId8"/>
-    <p:sldId id="263" r:id="rId9"/>
-    <p:sldId id="264" r:id="rId10"/>
-    <p:sldId id="267" r:id="rId11"/>
-    <p:sldId id="266" r:id="rId12"/>
+    <p:sldId id="270" r:id="rId7"/>
+    <p:sldId id="261" r:id="rId8"/>
+    <p:sldId id="262" r:id="rId9"/>
+    <p:sldId id="263" r:id="rId10"/>
+    <p:sldId id="264" r:id="rId11"/>
+    <p:sldId id="267" r:id="rId12"/>
     <p:sldId id="268" r:id="rId13"/>
-    <p:sldId id="265" r:id="rId14"/>
-    <p:sldId id="269" r:id="rId15"/>
+    <p:sldId id="266" r:id="rId14"/>
+    <p:sldId id="265" r:id="rId15"/>
+    <p:sldId id="271" r:id="rId16"/>
+    <p:sldId id="269" r:id="rId17"/>
   </p:sldIdLst>
   <p:sldSz cx="9144000" cy="6858000" type="screen4x3"/>
   <p:notesSz cx="6858000" cy="9144000"/>
@@ -1111,8 +1113,8 @@
   </dgm:ptLst>
   <dgm:cxnLst>
     <dgm:cxn modelId="{DA2490BC-45B7-4BA2-8FAA-BF4A178A48ED}" type="presOf" srcId="{1311E034-0411-4879-8FF7-204219162BB2}" destId="{94C89D46-98A3-48BD-8087-9A543D686CB3}" srcOrd="0" destOrd="0" presId="urn:microsoft.com/office/officeart/2005/8/layout/pyramid2"/>
+    <dgm:cxn modelId="{67531A3A-0905-4DEC-81D4-9E426AF0AFFF}" type="presOf" srcId="{CDE0FE97-B9BD-4096-9816-E3FC73E89C77}" destId="{BDD20D0A-490A-47EF-A482-D36EE1F2B94E}" srcOrd="0" destOrd="0" presId="urn:microsoft.com/office/officeart/2005/8/layout/pyramid2"/>
     <dgm:cxn modelId="{4E9E8F6D-DE37-409F-8777-6C349F2CF524}" srcId="{E49FEBB6-D7E7-4B07-884D-E97C7D8AC6FF}" destId="{E6845CCC-0300-4361-93E4-1162E8986349}" srcOrd="1" destOrd="0" parTransId="{479ACFBF-4D04-4072-82FA-8CCEF0F2831C}" sibTransId="{9CD54ED2-A5D6-42F6-B68B-D8FA95A3E605}"/>
-    <dgm:cxn modelId="{67531A3A-0905-4DEC-81D4-9E426AF0AFFF}" type="presOf" srcId="{CDE0FE97-B9BD-4096-9816-E3FC73E89C77}" destId="{BDD20D0A-490A-47EF-A482-D36EE1F2B94E}" srcOrd="0" destOrd="0" presId="urn:microsoft.com/office/officeart/2005/8/layout/pyramid2"/>
     <dgm:cxn modelId="{2F763C9F-8E83-4E31-8039-75A9507E40A8}" srcId="{E49FEBB6-D7E7-4B07-884D-E97C7D8AC6FF}" destId="{1311E034-0411-4879-8FF7-204219162BB2}" srcOrd="0" destOrd="0" parTransId="{2790440C-70AA-42FD-AF3F-E5396EC55EE9}" sibTransId="{B0865DF8-AB8B-4028-B110-D1D773815A58}"/>
     <dgm:cxn modelId="{A2AAAF23-E350-43DE-8460-998743F4BCEB}" type="presOf" srcId="{E6845CCC-0300-4361-93E4-1162E8986349}" destId="{7A398B42-77EF-48C1-82CA-F4E0808B084E}" srcOrd="0" destOrd="0" presId="urn:microsoft.com/office/officeart/2005/8/layout/pyramid2"/>
     <dgm:cxn modelId="{5803AFB5-3E0F-4B57-9229-24E3AD16C2F0}" srcId="{E49FEBB6-D7E7-4B07-884D-E97C7D8AC6FF}" destId="{CDE0FE97-B9BD-4096-9816-E3FC73E89C77}" srcOrd="2" destOrd="0" parTransId="{0FF9C53B-72AC-4372-8059-E74D3F4FA842}" sibTransId="{96B2DFE8-4A9D-470A-8060-5B93F5580314}"/>
@@ -2825,7 +2827,7 @@
             <a:fld id="{1D8BD707-D9CF-40AE-B4C6-C98DA3205C09}" type="datetimeFigureOut">
               <a:rPr lang="en-US" smtClean="0"/>
               <a:pPr/>
-              <a:t>3/21/2011</a:t>
+              <a:t>3/23/2011</a:t>
             </a:fld>
             <a:endParaRPr lang="en-US"/>
           </a:p>
@@ -3004,7 +3006,7 @@
             <a:fld id="{1D8BD707-D9CF-40AE-B4C6-C98DA3205C09}" type="datetimeFigureOut">
               <a:rPr lang="en-US" smtClean="0"/>
               <a:pPr/>
-              <a:t>3/21/2011</a:t>
+              <a:t>3/23/2011</a:t>
             </a:fld>
             <a:endParaRPr lang="en-US"/>
           </a:p>
@@ -3193,7 +3195,7 @@
             <a:fld id="{1D8BD707-D9CF-40AE-B4C6-C98DA3205C09}" type="datetimeFigureOut">
               <a:rPr lang="en-US" smtClean="0"/>
               <a:pPr/>
-              <a:t>3/21/2011</a:t>
+              <a:t>3/23/2011</a:t>
             </a:fld>
             <a:endParaRPr lang="en-US"/>
           </a:p>
@@ -3372,7 +3374,7 @@
             <a:fld id="{1D8BD707-D9CF-40AE-B4C6-C98DA3205C09}" type="datetimeFigureOut">
               <a:rPr lang="en-US" smtClean="0"/>
               <a:pPr/>
-              <a:t>3/21/2011</a:t>
+              <a:t>3/23/2011</a:t>
             </a:fld>
             <a:endParaRPr lang="en-US"/>
           </a:p>
@@ -3627,7 +3629,7 @@
             <a:fld id="{1D8BD707-D9CF-40AE-B4C6-C98DA3205C09}" type="datetimeFigureOut">
               <a:rPr lang="en-US" smtClean="0"/>
               <a:pPr/>
-              <a:t>3/21/2011</a:t>
+              <a:t>3/23/2011</a:t>
             </a:fld>
             <a:endParaRPr lang="en-US"/>
           </a:p>
@@ -3924,7 +3926,7 @@
             <a:fld id="{1D8BD707-D9CF-40AE-B4C6-C98DA3205C09}" type="datetimeFigureOut">
               <a:rPr lang="en-US" smtClean="0"/>
               <a:pPr/>
-              <a:t>3/21/2011</a:t>
+              <a:t>3/23/2011</a:t>
             </a:fld>
             <a:endParaRPr lang="en-US"/>
           </a:p>
@@ -4355,7 +4357,7 @@
             <a:fld id="{1D8BD707-D9CF-40AE-B4C6-C98DA3205C09}" type="datetimeFigureOut">
               <a:rPr lang="en-US" smtClean="0"/>
               <a:pPr/>
-              <a:t>3/21/2011</a:t>
+              <a:t>3/23/2011</a:t>
             </a:fld>
             <a:endParaRPr lang="en-US"/>
           </a:p>
@@ -4482,7 +4484,7 @@
             <a:fld id="{1D8BD707-D9CF-40AE-B4C6-C98DA3205C09}" type="datetimeFigureOut">
               <a:rPr lang="en-US" smtClean="0"/>
               <a:pPr/>
-              <a:t>3/21/2011</a:t>
+              <a:t>3/23/2011</a:t>
             </a:fld>
             <a:endParaRPr lang="en-US"/>
           </a:p>
@@ -4586,7 +4588,7 @@
             <a:fld id="{1D8BD707-D9CF-40AE-B4C6-C98DA3205C09}" type="datetimeFigureOut">
               <a:rPr lang="en-US" smtClean="0"/>
               <a:pPr/>
-              <a:t>3/21/2011</a:t>
+              <a:t>3/23/2011</a:t>
             </a:fld>
             <a:endParaRPr lang="en-US"/>
           </a:p>
@@ -4872,7 +4874,7 @@
             <a:fld id="{1D8BD707-D9CF-40AE-B4C6-C98DA3205C09}" type="datetimeFigureOut">
               <a:rPr lang="en-US" smtClean="0"/>
               <a:pPr/>
-              <a:t>3/21/2011</a:t>
+              <a:t>3/23/2011</a:t>
             </a:fld>
             <a:endParaRPr lang="en-US"/>
           </a:p>
@@ -5134,7 +5136,7 @@
             <a:fld id="{1D8BD707-D9CF-40AE-B4C6-C98DA3205C09}" type="datetimeFigureOut">
               <a:rPr lang="en-US" smtClean="0"/>
               <a:pPr/>
-              <a:t>3/21/2011</a:t>
+              <a:t>3/23/2011</a:t>
             </a:fld>
             <a:endParaRPr lang="en-US"/>
           </a:p>
@@ -5356,7 +5358,7 @@
             <a:fld id="{1D8BD707-D9CF-40AE-B4C6-C98DA3205C09}" type="datetimeFigureOut">
               <a:rPr lang="en-US" smtClean="0"/>
               <a:pPr/>
-              <a:t>3/21/2011</a:t>
+              <a:t>3/23/2011</a:t>
             </a:fld>
             <a:endParaRPr lang="en-US"/>
           </a:p>
@@ -5861,565 +5863,32 @@
           <a:chExt cx="0" cy="0"/>
         </a:xfrm>
       </p:grpSpPr>
-      <p:sp>
-        <p:nvSpPr>
-          <p:cNvPr id="4" name="Rounded Rectangle 3"/>
-          <p:cNvSpPr/>
-          <p:nvPr/>
-        </p:nvSpPr>
-        <p:spPr>
-          <a:xfrm>
-            <a:off x="6845893" y="905853"/>
-            <a:ext cx="1828800" cy="1295400"/>
-          </a:xfrm>
-          <a:prstGeom prst="roundRect">
-            <a:avLst/>
-          </a:prstGeom>
-        </p:spPr>
-        <p:style>
-          <a:lnRef idx="0">
-            <a:schemeClr val="accent3"/>
-          </a:lnRef>
-          <a:fillRef idx="3">
-            <a:schemeClr val="accent3"/>
-          </a:fillRef>
-          <a:effectRef idx="3">
-            <a:schemeClr val="accent3"/>
-          </a:effectRef>
-          <a:fontRef idx="minor">
-            <a:schemeClr val="lt1"/>
-          </a:fontRef>
-        </p:style>
-        <p:txBody>
-          <a:bodyPr rtlCol="0" anchor="ctr"/>
-          <a:lstStyle/>
-          <a:p>
-            <a:pPr algn="ctr"/>
-            <a:r>
-              <a:rPr lang="pl-PL" dirty="0" smtClean="0"/>
-              <a:t>Order</a:t>
-            </a:r>
-          </a:p>
-          <a:p>
-            <a:pPr algn="ctr"/>
-            <a:r>
-              <a:rPr lang="pl-PL" dirty="0"/>
-              <a:t>Resource</a:t>
-            </a:r>
-            <a:endParaRPr lang="en-CA" dirty="0"/>
-          </a:p>
-        </p:txBody>
-      </p:sp>
-      <p:sp>
-        <p:nvSpPr>
-          <p:cNvPr id="5" name="Rounded Rectangle 4"/>
-          <p:cNvSpPr/>
-          <p:nvPr/>
-        </p:nvSpPr>
-        <p:spPr>
-          <a:xfrm>
-            <a:off x="5029200" y="1324953"/>
-            <a:ext cx="2286000" cy="457200"/>
-          </a:xfrm>
-          <a:prstGeom prst="roundRect">
-            <a:avLst/>
-          </a:prstGeom>
-        </p:spPr>
-        <p:style>
-          <a:lnRef idx="0">
-            <a:schemeClr val="accent6"/>
-          </a:lnRef>
-          <a:fillRef idx="3">
-            <a:schemeClr val="accent6"/>
-          </a:fillRef>
-          <a:effectRef idx="3">
-            <a:schemeClr val="accent6"/>
-          </a:effectRef>
-          <a:fontRef idx="minor">
-            <a:schemeClr val="lt1"/>
-          </a:fontRef>
-        </p:style>
-        <p:txBody>
-          <a:bodyPr rtlCol="0" anchor="ctr"/>
-          <a:lstStyle/>
-          <a:p>
-            <a:pPr algn="ctr"/>
-            <a:r>
-              <a:rPr lang="pl-PL" dirty="0" smtClean="0"/>
-              <a:t>/order/{orderId}</a:t>
-            </a:r>
-            <a:endParaRPr lang="en-CA" dirty="0"/>
-          </a:p>
-        </p:txBody>
-      </p:sp>
-      <p:sp>
-        <p:nvSpPr>
-          <p:cNvPr id="7" name="Rounded Rectangle 6"/>
-          <p:cNvSpPr/>
-          <p:nvPr/>
-        </p:nvSpPr>
-        <p:spPr>
-          <a:xfrm>
-            <a:off x="6858000" y="2667000"/>
-            <a:ext cx="1828800" cy="1295400"/>
-          </a:xfrm>
-          <a:prstGeom prst="roundRect">
-            <a:avLst/>
-          </a:prstGeom>
-        </p:spPr>
-        <p:style>
-          <a:lnRef idx="0">
-            <a:schemeClr val="accent3"/>
-          </a:lnRef>
-          <a:fillRef idx="3">
-            <a:schemeClr val="accent3"/>
-          </a:fillRef>
-          <a:effectRef idx="3">
-            <a:schemeClr val="accent3"/>
-          </a:effectRef>
-          <a:fontRef idx="minor">
-            <a:schemeClr val="lt1"/>
-          </a:fontRef>
-        </p:style>
-        <p:txBody>
-          <a:bodyPr rtlCol="0" anchor="ctr"/>
-          <a:lstStyle/>
-          <a:p>
-            <a:pPr algn="ctr"/>
-            <a:r>
-              <a:rPr lang="pl-PL" dirty="0" smtClean="0"/>
-              <a:t>Receipt</a:t>
-            </a:r>
-          </a:p>
-          <a:p>
-            <a:pPr algn="ctr"/>
-            <a:r>
-              <a:rPr lang="pl-PL" dirty="0"/>
-              <a:t>Resource</a:t>
-            </a:r>
-            <a:endParaRPr lang="en-CA" dirty="0"/>
-          </a:p>
-        </p:txBody>
-      </p:sp>
-      <p:sp>
-        <p:nvSpPr>
-          <p:cNvPr id="8" name="Rounded Rectangle 7"/>
-          <p:cNvSpPr/>
-          <p:nvPr/>
-        </p:nvSpPr>
-        <p:spPr>
-          <a:xfrm>
-            <a:off x="5029200" y="3086100"/>
-            <a:ext cx="2286000" cy="457200"/>
-          </a:xfrm>
-          <a:prstGeom prst="roundRect">
-            <a:avLst/>
-          </a:prstGeom>
-        </p:spPr>
-        <p:style>
-          <a:lnRef idx="0">
-            <a:schemeClr val="accent6"/>
-          </a:lnRef>
-          <a:fillRef idx="3">
-            <a:schemeClr val="accent6"/>
-          </a:fillRef>
-          <a:effectRef idx="3">
-            <a:schemeClr val="accent6"/>
-          </a:effectRef>
-          <a:fontRef idx="minor">
-            <a:schemeClr val="lt1"/>
-          </a:fontRef>
-        </p:style>
-        <p:txBody>
-          <a:bodyPr rtlCol="0" anchor="ctr"/>
-          <a:lstStyle/>
-          <a:p>
-            <a:pPr algn="ctr"/>
-            <a:r>
-              <a:rPr lang="pl-PL" dirty="0" smtClean="0"/>
-              <a:t>/receipt/{orderId}</a:t>
-            </a:r>
-            <a:endParaRPr lang="en-CA" dirty="0"/>
-          </a:p>
-        </p:txBody>
-      </p:sp>
-      <p:sp>
-        <p:nvSpPr>
-          <p:cNvPr id="9" name="Rounded Rectangle 8"/>
-          <p:cNvSpPr/>
-          <p:nvPr/>
-        </p:nvSpPr>
-        <p:spPr>
-          <a:xfrm>
-            <a:off x="6858000" y="4495800"/>
-            <a:ext cx="1828800" cy="1295400"/>
-          </a:xfrm>
-          <a:prstGeom prst="roundRect">
-            <a:avLst/>
-          </a:prstGeom>
-        </p:spPr>
-        <p:style>
-          <a:lnRef idx="0">
-            <a:schemeClr val="accent3"/>
-          </a:lnRef>
-          <a:fillRef idx="3">
-            <a:schemeClr val="accent3"/>
-          </a:fillRef>
-          <a:effectRef idx="3">
-            <a:schemeClr val="accent3"/>
-          </a:effectRef>
-          <a:fontRef idx="minor">
-            <a:schemeClr val="lt1"/>
-          </a:fontRef>
-        </p:style>
-        <p:txBody>
-          <a:bodyPr rtlCol="0" anchor="ctr"/>
-          <a:lstStyle/>
-          <a:p>
-            <a:pPr algn="ctr"/>
-            <a:r>
-              <a:rPr lang="pl-PL" dirty="0" smtClean="0"/>
-              <a:t>Payment</a:t>
-            </a:r>
-          </a:p>
-          <a:p>
-            <a:pPr algn="ctr"/>
-            <a:r>
-              <a:rPr lang="pl-PL" dirty="0"/>
-              <a:t>Resource</a:t>
-            </a:r>
-            <a:endParaRPr lang="en-CA" dirty="0"/>
-          </a:p>
-        </p:txBody>
-      </p:sp>
-      <p:sp>
-        <p:nvSpPr>
-          <p:cNvPr id="6" name="Rounded Rectangle 5"/>
-          <p:cNvSpPr/>
-          <p:nvPr/>
-        </p:nvSpPr>
-        <p:spPr>
-          <a:xfrm>
-            <a:off x="5029200" y="4955493"/>
-            <a:ext cx="2286000" cy="457200"/>
-          </a:xfrm>
-          <a:prstGeom prst="roundRect">
-            <a:avLst/>
-          </a:prstGeom>
-        </p:spPr>
-        <p:style>
-          <a:lnRef idx="0">
-            <a:schemeClr val="accent6"/>
-          </a:lnRef>
-          <a:fillRef idx="3">
-            <a:schemeClr val="accent6"/>
-          </a:fillRef>
-          <a:effectRef idx="3">
-            <a:schemeClr val="accent6"/>
-          </a:effectRef>
-          <a:fontRef idx="minor">
-            <a:schemeClr val="lt1"/>
-          </a:fontRef>
-        </p:style>
-        <p:txBody>
-          <a:bodyPr rtlCol="0" anchor="ctr"/>
-          <a:lstStyle/>
-          <a:p>
-            <a:pPr algn="ctr"/>
-            <a:r>
-              <a:rPr lang="pl-PL" dirty="0" smtClean="0"/>
-              <a:t>/payment/{orderId}</a:t>
-            </a:r>
-            <a:endParaRPr lang="en-CA" dirty="0"/>
-          </a:p>
-        </p:txBody>
-      </p:sp>
-      <p:sp>
-        <p:nvSpPr>
-          <p:cNvPr id="10" name="Rounded Rectangle 9"/>
-          <p:cNvSpPr/>
-          <p:nvPr/>
-        </p:nvSpPr>
-        <p:spPr>
-          <a:xfrm>
-            <a:off x="533400" y="457200"/>
-            <a:ext cx="1524000" cy="5943600"/>
-          </a:xfrm>
-          <a:prstGeom prst="roundRect">
-            <a:avLst/>
-          </a:prstGeom>
-        </p:spPr>
-        <p:style>
-          <a:lnRef idx="0">
-            <a:schemeClr val="accent1"/>
-          </a:lnRef>
-          <a:fillRef idx="3">
-            <a:schemeClr val="accent1"/>
-          </a:fillRef>
-          <a:effectRef idx="3">
-            <a:schemeClr val="accent1"/>
-          </a:effectRef>
-          <a:fontRef idx="minor">
-            <a:schemeClr val="lt1"/>
-          </a:fontRef>
-        </p:style>
-        <p:txBody>
-          <a:bodyPr vert="vert270" rtlCol="0" anchor="ctr"/>
-          <a:lstStyle/>
-          <a:p>
-            <a:pPr algn="ctr"/>
-            <a:r>
-              <a:rPr lang="pl-PL" sz="3200" dirty="0" smtClean="0"/>
-              <a:t>Client</a:t>
-            </a:r>
-            <a:endParaRPr lang="en-CA" sz="3200" dirty="0"/>
-          </a:p>
-        </p:txBody>
-      </p:sp>
-      <p:sp>
-        <p:nvSpPr>
-          <p:cNvPr id="11" name="Rounded Rectangle 10"/>
-          <p:cNvSpPr/>
-          <p:nvPr/>
-        </p:nvSpPr>
-        <p:spPr>
-          <a:xfrm>
-            <a:off x="1600200" y="1330293"/>
-            <a:ext cx="2286000" cy="457200"/>
-          </a:xfrm>
-          <a:prstGeom prst="roundRect">
-            <a:avLst/>
-          </a:prstGeom>
-        </p:spPr>
-        <p:style>
-          <a:lnRef idx="0">
-            <a:schemeClr val="accent6"/>
-          </a:lnRef>
-          <a:fillRef idx="3">
-            <a:schemeClr val="accent6"/>
-          </a:fillRef>
-          <a:effectRef idx="3">
-            <a:schemeClr val="accent6"/>
-          </a:effectRef>
-          <a:fontRef idx="minor">
-            <a:schemeClr val="lt1"/>
-          </a:fontRef>
-        </p:style>
-        <p:txBody>
-          <a:bodyPr rtlCol="0" anchor="ctr"/>
-          <a:lstStyle/>
-          <a:p>
-            <a:pPr algn="ctr"/>
-            <a:r>
-              <a:rPr lang="pl-PL" dirty="0" smtClean="0"/>
-              <a:t>/order/{orderId}</a:t>
-            </a:r>
-            <a:endParaRPr lang="en-CA" dirty="0"/>
-          </a:p>
-        </p:txBody>
-      </p:sp>
-      <p:sp>
-        <p:nvSpPr>
-          <p:cNvPr id="12" name="Rounded Rectangle 11"/>
-          <p:cNvSpPr/>
-          <p:nvPr/>
-        </p:nvSpPr>
-        <p:spPr>
-          <a:xfrm>
-            <a:off x="1600200" y="3086100"/>
-            <a:ext cx="2286000" cy="457200"/>
-          </a:xfrm>
-          <a:prstGeom prst="roundRect">
-            <a:avLst/>
-          </a:prstGeom>
-        </p:spPr>
-        <p:style>
-          <a:lnRef idx="0">
-            <a:schemeClr val="accent6"/>
-          </a:lnRef>
-          <a:fillRef idx="3">
-            <a:schemeClr val="accent6"/>
-          </a:fillRef>
-          <a:effectRef idx="3">
-            <a:schemeClr val="accent6"/>
-          </a:effectRef>
-          <a:fontRef idx="minor">
-            <a:schemeClr val="lt1"/>
-          </a:fontRef>
-        </p:style>
-        <p:txBody>
-          <a:bodyPr rtlCol="0" anchor="ctr"/>
-          <a:lstStyle/>
-          <a:p>
-            <a:pPr algn="ctr"/>
-            <a:r>
-              <a:rPr lang="pl-PL" dirty="0" smtClean="0"/>
-              <a:t>/receipt/{orderId}</a:t>
-            </a:r>
-            <a:endParaRPr lang="en-CA" dirty="0"/>
-          </a:p>
-        </p:txBody>
-      </p:sp>
-      <p:sp>
-        <p:nvSpPr>
-          <p:cNvPr id="13" name="Rounded Rectangle 12"/>
-          <p:cNvSpPr/>
-          <p:nvPr/>
-        </p:nvSpPr>
-        <p:spPr>
-          <a:xfrm>
-            <a:off x="1600200" y="4955493"/>
-            <a:ext cx="2286000" cy="457200"/>
-          </a:xfrm>
-          <a:prstGeom prst="roundRect">
-            <a:avLst/>
-          </a:prstGeom>
-        </p:spPr>
-        <p:style>
-          <a:lnRef idx="0">
-            <a:schemeClr val="accent6"/>
-          </a:lnRef>
-          <a:fillRef idx="3">
-            <a:schemeClr val="accent6"/>
-          </a:fillRef>
-          <a:effectRef idx="3">
-            <a:schemeClr val="accent6"/>
-          </a:effectRef>
-          <a:fontRef idx="minor">
-            <a:schemeClr val="lt1"/>
-          </a:fontRef>
-        </p:style>
-        <p:txBody>
-          <a:bodyPr rtlCol="0" anchor="ctr"/>
-          <a:lstStyle/>
-          <a:p>
-            <a:pPr algn="ctr"/>
-            <a:r>
-              <a:rPr lang="pl-PL" dirty="0" smtClean="0"/>
-              <a:t>/payment/{orderId}</a:t>
-            </a:r>
-            <a:endParaRPr lang="en-CA" dirty="0"/>
-          </a:p>
-        </p:txBody>
-      </p:sp>
-      <p:sp>
-        <p:nvSpPr>
-          <p:cNvPr id="14" name="Left-Right Arrow 13"/>
-          <p:cNvSpPr/>
-          <p:nvPr/>
-        </p:nvSpPr>
-        <p:spPr>
-          <a:xfrm>
-            <a:off x="3886200" y="1383169"/>
-            <a:ext cx="1143000" cy="351447"/>
-          </a:xfrm>
-          <a:prstGeom prst="leftRightArrow">
-            <a:avLst/>
-          </a:prstGeom>
-        </p:spPr>
-        <p:style>
-          <a:lnRef idx="0">
-            <a:schemeClr val="accent2"/>
-          </a:lnRef>
-          <a:fillRef idx="3">
-            <a:schemeClr val="accent2"/>
-          </a:fillRef>
-          <a:effectRef idx="3">
-            <a:schemeClr val="accent2"/>
-          </a:effectRef>
-          <a:fontRef idx="minor">
-            <a:schemeClr val="lt1"/>
-          </a:fontRef>
-        </p:style>
-        <p:txBody>
-          <a:bodyPr rtlCol="0" anchor="ctr"/>
-          <a:lstStyle/>
-          <a:p>
-            <a:pPr algn="ctr"/>
-            <a:endParaRPr lang="en-CA"/>
-          </a:p>
-        </p:txBody>
-      </p:sp>
-      <p:sp>
-        <p:nvSpPr>
-          <p:cNvPr id="15" name="Left-Right Arrow 14"/>
-          <p:cNvSpPr/>
-          <p:nvPr/>
-        </p:nvSpPr>
-        <p:spPr>
-          <a:xfrm>
-            <a:off x="3886200" y="3138976"/>
-            <a:ext cx="1143000" cy="351447"/>
-          </a:xfrm>
-          <a:prstGeom prst="leftRightArrow">
-            <a:avLst/>
-          </a:prstGeom>
-        </p:spPr>
-        <p:style>
-          <a:lnRef idx="0">
-            <a:schemeClr val="accent2"/>
-          </a:lnRef>
-          <a:fillRef idx="3">
-            <a:schemeClr val="accent2"/>
-          </a:fillRef>
-          <a:effectRef idx="3">
-            <a:schemeClr val="accent2"/>
-          </a:effectRef>
-          <a:fontRef idx="minor">
-            <a:schemeClr val="lt1"/>
-          </a:fontRef>
-        </p:style>
-        <p:txBody>
-          <a:bodyPr rtlCol="0" anchor="ctr"/>
-          <a:lstStyle/>
-          <a:p>
-            <a:pPr algn="ctr"/>
-            <a:endParaRPr lang="en-CA"/>
-          </a:p>
-        </p:txBody>
-      </p:sp>
-      <p:sp>
-        <p:nvSpPr>
-          <p:cNvPr id="16" name="Left-Right Arrow 15"/>
-          <p:cNvSpPr/>
-          <p:nvPr/>
-        </p:nvSpPr>
-        <p:spPr>
-          <a:xfrm>
-            <a:off x="3901155" y="5008369"/>
-            <a:ext cx="1143000" cy="351447"/>
-          </a:xfrm>
-          <a:prstGeom prst="leftRightArrow">
-            <a:avLst/>
-          </a:prstGeom>
-        </p:spPr>
-        <p:style>
-          <a:lnRef idx="0">
-            <a:schemeClr val="accent2"/>
-          </a:lnRef>
-          <a:fillRef idx="3">
-            <a:schemeClr val="accent2"/>
-          </a:fillRef>
-          <a:effectRef idx="3">
-            <a:schemeClr val="accent2"/>
-          </a:effectRef>
-          <a:fontRef idx="minor">
-            <a:schemeClr val="lt1"/>
-          </a:fontRef>
-        </p:style>
-        <p:txBody>
-          <a:bodyPr rtlCol="0" anchor="ctr"/>
-          <a:lstStyle/>
-          <a:p>
-            <a:pPr algn="ctr"/>
-            <a:endParaRPr lang="en-CA"/>
-          </a:p>
-        </p:txBody>
-      </p:sp>
+      <p:graphicFrame>
+        <p:nvGraphicFramePr>
+          <p:cNvPr id="2" name="Diagram 1"/>
+          <p:cNvGraphicFramePr/>
+          <p:nvPr>
+            <p:extLst>
+              <p:ext uri="{D42A27DB-BD31-4B8C-83A1-F6EECF244321}">
+                <p14:modId xmlns:p14="http://schemas.microsoft.com/office/powerpoint/2010/main" val="3603990318"/>
+              </p:ext>
+            </p:extLst>
+          </p:nvPr>
+        </p:nvGraphicFramePr>
+        <p:xfrm>
+          <a:off x="419100" y="914400"/>
+          <a:ext cx="8305800" cy="5029200"/>
+        </p:xfrm>
+        <a:graphic>
+          <a:graphicData uri="http://schemas.openxmlformats.org/drawingml/2006/diagram">
+            <dgm:relIds xmlns:dgm="http://schemas.openxmlformats.org/drawingml/2006/diagram" xmlns:r="http://schemas.openxmlformats.org/officeDocument/2006/relationships" r:dm="rId2" r:lo="rId3" r:qs="rId4" r:cs="rId5"/>
+          </a:graphicData>
+        </a:graphic>
+      </p:graphicFrame>
     </p:spTree>
     <p:extLst>
       <p:ext uri="{BB962C8B-B14F-4D97-AF65-F5344CB8AC3E}">
-        <p14:creationId xmlns:p14="http://schemas.microsoft.com/office/powerpoint/2010/main" val="3323238465"/>
+        <p14:creationId xmlns:p14="http://schemas.microsoft.com/office/powerpoint/2010/main" val="1775356660"/>
       </p:ext>
     </p:extLst>
   </p:cSld>
@@ -6467,16 +5936,65 @@
       </p:grpSpPr>
       <p:sp>
         <p:nvSpPr>
-          <p:cNvPr id="11" name="Right Arrow 10"/>
+          <p:cNvPr id="4" name="Rounded Rectangle 3"/>
           <p:cNvSpPr/>
           <p:nvPr/>
         </p:nvSpPr>
         <p:spPr>
-          <a:xfrm rot="10800000">
-            <a:off x="2057398" y="1585242"/>
-            <a:ext cx="685802" cy="536249"/>
+          <a:xfrm>
+            <a:off x="6845893" y="905853"/>
+            <a:ext cx="1828800" cy="1295400"/>
           </a:xfrm>
-          <a:prstGeom prst="rightArrow">
+          <a:prstGeom prst="roundRect">
+            <a:avLst/>
+          </a:prstGeom>
+        </p:spPr>
+        <p:style>
+          <a:lnRef idx="0">
+            <a:schemeClr val="accent3"/>
+          </a:lnRef>
+          <a:fillRef idx="3">
+            <a:schemeClr val="accent3"/>
+          </a:fillRef>
+          <a:effectRef idx="3">
+            <a:schemeClr val="accent3"/>
+          </a:effectRef>
+          <a:fontRef idx="minor">
+            <a:schemeClr val="lt1"/>
+          </a:fontRef>
+        </p:style>
+        <p:txBody>
+          <a:bodyPr rtlCol="0" anchor="ctr"/>
+          <a:lstStyle/>
+          <a:p>
+            <a:pPr algn="ctr"/>
+            <a:r>
+              <a:rPr lang="pl-PL" dirty="0" smtClean="0"/>
+              <a:t>Order</a:t>
+            </a:r>
+          </a:p>
+          <a:p>
+            <a:pPr algn="ctr"/>
+            <a:r>
+              <a:rPr lang="pl-PL" dirty="0"/>
+              <a:t>Resource</a:t>
+            </a:r>
+            <a:endParaRPr lang="en-CA" dirty="0"/>
+          </a:p>
+        </p:txBody>
+      </p:sp>
+      <p:sp>
+        <p:nvSpPr>
+          <p:cNvPr id="5" name="Rounded Rectangle 4"/>
+          <p:cNvSpPr/>
+          <p:nvPr/>
+        </p:nvSpPr>
+        <p:spPr>
+          <a:xfrm>
+            <a:off x="5029200" y="1324953"/>
+            <a:ext cx="2286000" cy="457200"/>
+          </a:xfrm>
+          <a:prstGeom prst="roundRect">
             <a:avLst/>
           </a:prstGeom>
         </p:spPr>
@@ -6499,22 +6017,75 @@
           <a:lstStyle/>
           <a:p>
             <a:pPr algn="ctr"/>
-            <a:endParaRPr lang="en-CA"/>
-          </a:p>
-        </p:txBody>
-      </p:sp>
-      <p:sp>
-        <p:nvSpPr>
-          <p:cNvPr id="13" name="Right Arrow 12"/>
+            <a:r>
+              <a:rPr lang="pl-PL" dirty="0" smtClean="0"/>
+              <a:t>/order/{orderId}</a:t>
+            </a:r>
+            <a:endParaRPr lang="en-CA" dirty="0"/>
+          </a:p>
+        </p:txBody>
+      </p:sp>
+      <p:sp>
+        <p:nvSpPr>
+          <p:cNvPr id="7" name="Rounded Rectangle 6"/>
           <p:cNvSpPr/>
           <p:nvPr/>
         </p:nvSpPr>
         <p:spPr>
-          <a:xfrm rot="10800000">
-            <a:off x="6476999" y="1585240"/>
-            <a:ext cx="609598" cy="536249"/>
+          <a:xfrm>
+            <a:off x="6858000" y="2667000"/>
+            <a:ext cx="1828800" cy="1295400"/>
           </a:xfrm>
-          <a:prstGeom prst="rightArrow">
+          <a:prstGeom prst="roundRect">
+            <a:avLst/>
+          </a:prstGeom>
+        </p:spPr>
+        <p:style>
+          <a:lnRef idx="0">
+            <a:schemeClr val="accent3"/>
+          </a:lnRef>
+          <a:fillRef idx="3">
+            <a:schemeClr val="accent3"/>
+          </a:fillRef>
+          <a:effectRef idx="3">
+            <a:schemeClr val="accent3"/>
+          </a:effectRef>
+          <a:fontRef idx="minor">
+            <a:schemeClr val="lt1"/>
+          </a:fontRef>
+        </p:style>
+        <p:txBody>
+          <a:bodyPr rtlCol="0" anchor="ctr"/>
+          <a:lstStyle/>
+          <a:p>
+            <a:pPr algn="ctr"/>
+            <a:r>
+              <a:rPr lang="pl-PL" dirty="0" smtClean="0"/>
+              <a:t>Receipt</a:t>
+            </a:r>
+          </a:p>
+          <a:p>
+            <a:pPr algn="ctr"/>
+            <a:r>
+              <a:rPr lang="pl-PL" dirty="0"/>
+              <a:t>Resource</a:t>
+            </a:r>
+            <a:endParaRPr lang="en-CA" dirty="0"/>
+          </a:p>
+        </p:txBody>
+      </p:sp>
+      <p:sp>
+        <p:nvSpPr>
+          <p:cNvPr id="8" name="Rounded Rectangle 7"/>
+          <p:cNvSpPr/>
+          <p:nvPr/>
+        </p:nvSpPr>
+        <p:spPr>
+          <a:xfrm>
+            <a:off x="5029200" y="3086100"/>
+            <a:ext cx="2286000" cy="457200"/>
+          </a:xfrm>
+          <a:prstGeom prst="roundRect">
             <a:avLst/>
           </a:prstGeom>
         </p:spPr>
@@ -6537,13 +6108,108 @@
           <a:lstStyle/>
           <a:p>
             <a:pPr algn="ctr"/>
-            <a:endParaRPr lang="en-CA"/>
-          </a:p>
-        </p:txBody>
-      </p:sp>
-      <p:sp>
-        <p:nvSpPr>
-          <p:cNvPr id="4" name="Rounded Rectangle 3"/>
+            <a:r>
+              <a:rPr lang="pl-PL" dirty="0" smtClean="0"/>
+              <a:t>/receipt/{orderId}</a:t>
+            </a:r>
+            <a:endParaRPr lang="en-CA" dirty="0"/>
+          </a:p>
+        </p:txBody>
+      </p:sp>
+      <p:sp>
+        <p:nvSpPr>
+          <p:cNvPr id="9" name="Rounded Rectangle 8"/>
+          <p:cNvSpPr/>
+          <p:nvPr/>
+        </p:nvSpPr>
+        <p:spPr>
+          <a:xfrm>
+            <a:off x="6858000" y="4495800"/>
+            <a:ext cx="1828800" cy="1295400"/>
+          </a:xfrm>
+          <a:prstGeom prst="roundRect">
+            <a:avLst/>
+          </a:prstGeom>
+        </p:spPr>
+        <p:style>
+          <a:lnRef idx="0">
+            <a:schemeClr val="accent3"/>
+          </a:lnRef>
+          <a:fillRef idx="3">
+            <a:schemeClr val="accent3"/>
+          </a:fillRef>
+          <a:effectRef idx="3">
+            <a:schemeClr val="accent3"/>
+          </a:effectRef>
+          <a:fontRef idx="minor">
+            <a:schemeClr val="lt1"/>
+          </a:fontRef>
+        </p:style>
+        <p:txBody>
+          <a:bodyPr rtlCol="0" anchor="ctr"/>
+          <a:lstStyle/>
+          <a:p>
+            <a:pPr algn="ctr"/>
+            <a:r>
+              <a:rPr lang="pl-PL" dirty="0" smtClean="0"/>
+              <a:t>Payment</a:t>
+            </a:r>
+          </a:p>
+          <a:p>
+            <a:pPr algn="ctr"/>
+            <a:r>
+              <a:rPr lang="pl-PL" dirty="0"/>
+              <a:t>Resource</a:t>
+            </a:r>
+            <a:endParaRPr lang="en-CA" dirty="0"/>
+          </a:p>
+        </p:txBody>
+      </p:sp>
+      <p:sp>
+        <p:nvSpPr>
+          <p:cNvPr id="6" name="Rounded Rectangle 5"/>
+          <p:cNvSpPr/>
+          <p:nvPr/>
+        </p:nvSpPr>
+        <p:spPr>
+          <a:xfrm>
+            <a:off x="5029200" y="4955493"/>
+            <a:ext cx="2286000" cy="457200"/>
+          </a:xfrm>
+          <a:prstGeom prst="roundRect">
+            <a:avLst/>
+          </a:prstGeom>
+        </p:spPr>
+        <p:style>
+          <a:lnRef idx="0">
+            <a:schemeClr val="accent6"/>
+          </a:lnRef>
+          <a:fillRef idx="3">
+            <a:schemeClr val="accent6"/>
+          </a:fillRef>
+          <a:effectRef idx="3">
+            <a:schemeClr val="accent6"/>
+          </a:effectRef>
+          <a:fontRef idx="minor">
+            <a:schemeClr val="lt1"/>
+          </a:fontRef>
+        </p:style>
+        <p:txBody>
+          <a:bodyPr rtlCol="0" anchor="ctr"/>
+          <a:lstStyle/>
+          <a:p>
+            <a:pPr algn="ctr"/>
+            <a:r>
+              <a:rPr lang="pl-PL" dirty="0" smtClean="0"/>
+              <a:t>/payment/{orderId}</a:t>
+            </a:r>
+            <a:endParaRPr lang="en-CA" dirty="0"/>
+          </a:p>
+        </p:txBody>
+      </p:sp>
+      <p:sp>
+        <p:nvSpPr>
+          <p:cNvPr id="10" name="Rounded Rectangle 9"/>
           <p:cNvSpPr/>
           <p:nvPr/>
         </p:nvSpPr>
@@ -6585,205 +6251,16 @@
       </p:sp>
       <p:sp>
         <p:nvSpPr>
-          <p:cNvPr id="6" name="Rounded Rectangle 5"/>
+          <p:cNvPr id="11" name="Rounded Rectangle 10"/>
           <p:cNvSpPr/>
           <p:nvPr/>
         </p:nvSpPr>
         <p:spPr>
           <a:xfrm>
-            <a:off x="7086600" y="457200"/>
-            <a:ext cx="1524000" cy="5943600"/>
+            <a:off x="1600200" y="1330293"/>
+            <a:ext cx="2286000" cy="457200"/>
           </a:xfrm>
           <a:prstGeom prst="roundRect">
-            <a:avLst/>
-          </a:prstGeom>
-        </p:spPr>
-        <p:style>
-          <a:lnRef idx="0">
-            <a:schemeClr val="accent1"/>
-          </a:lnRef>
-          <a:fillRef idx="3">
-            <a:schemeClr val="accent1"/>
-          </a:fillRef>
-          <a:effectRef idx="3">
-            <a:schemeClr val="accent1"/>
-          </a:effectRef>
-          <a:fontRef idx="minor">
-            <a:schemeClr val="lt1"/>
-          </a:fontRef>
-        </p:style>
-        <p:txBody>
-          <a:bodyPr vert="vert270" rtlCol="0" anchor="ctr"/>
-          <a:lstStyle/>
-          <a:p>
-            <a:pPr algn="ctr"/>
-            <a:r>
-              <a:rPr lang="pl-PL" sz="3200" dirty="0" smtClean="0"/>
-              <a:t>Service</a:t>
-            </a:r>
-            <a:endParaRPr lang="en-CA" sz="3200" dirty="0"/>
-          </a:p>
-        </p:txBody>
-      </p:sp>
-      <p:sp>
-        <p:nvSpPr>
-          <p:cNvPr id="8" name="Rounded Rectangle 7"/>
-          <p:cNvSpPr/>
-          <p:nvPr/>
-        </p:nvSpPr>
-        <p:spPr>
-          <a:xfrm>
-            <a:off x="2743200" y="457200"/>
-            <a:ext cx="3733800" cy="3276600"/>
-          </a:xfrm>
-          <a:prstGeom prst="roundRect">
-            <a:avLst/>
-          </a:prstGeom>
-        </p:spPr>
-        <p:style>
-          <a:lnRef idx="0">
-            <a:schemeClr val="accent3"/>
-          </a:lnRef>
-          <a:fillRef idx="3">
-            <a:schemeClr val="accent3"/>
-          </a:fillRef>
-          <a:effectRef idx="3">
-            <a:schemeClr val="accent3"/>
-          </a:effectRef>
-          <a:fontRef idx="minor">
-            <a:schemeClr val="lt1"/>
-          </a:fontRef>
-        </p:style>
-        <p:txBody>
-          <a:bodyPr vert="horz" rtlCol="0" anchor="ctr"/>
-          <a:lstStyle/>
-          <a:p>
-            <a:r>
-              <a:rPr lang="pl-PL" sz="1600" i="1" dirty="0" smtClean="0">
-                <a:solidFill>
-                  <a:schemeClr val="bg1"/>
-                </a:solidFill>
-                <a:latin typeface="Consolas" pitchFamily="49" charset="0"/>
-                <a:cs typeface="Consolas" pitchFamily="49" charset="0"/>
-              </a:rPr>
-              <a:t>200 OK</a:t>
-            </a:r>
-          </a:p>
-          <a:p>
-            <a:r>
-              <a:rPr lang="pl-PL" sz="1600" i="1" dirty="0" smtClean="0">
-                <a:latin typeface="Consolas" pitchFamily="49" charset="0"/>
-                <a:cs typeface="Consolas" pitchFamily="49" charset="0"/>
-              </a:rPr>
-              <a:t>ContentType: </a:t>
-            </a:r>
-            <a:r>
-              <a:rPr lang="pl-PL" sz="1600" b="1" i="1" dirty="0" smtClean="0">
-                <a:solidFill>
-                  <a:schemeClr val="tx1">
-                    <a:lumMod val="95000"/>
-                    <a:lumOff val="5000"/>
-                  </a:schemeClr>
-                </a:solidFill>
-                <a:latin typeface="Consolas" pitchFamily="49" charset="0"/>
-                <a:cs typeface="Consolas" pitchFamily="49" charset="0"/>
-              </a:rPr>
-              <a:t>application/vnd.restbucks+xml</a:t>
-            </a:r>
-            <a:r>
-              <a:rPr lang="en-CA" sz="1600" i="1" dirty="0" smtClean="0">
-                <a:latin typeface="Consolas" pitchFamily="49" charset="0"/>
-                <a:cs typeface="Consolas" pitchFamily="49" charset="0"/>
-              </a:rPr>
-              <a:t> </a:t>
-            </a:r>
-            <a:r>
-              <a:rPr lang="en-CA" sz="1600" i="1" dirty="0" err="1">
-                <a:latin typeface="Consolas" pitchFamily="49" charset="0"/>
-                <a:cs typeface="Consolas" pitchFamily="49" charset="0"/>
-              </a:rPr>
-              <a:t>xmlns</a:t>
-            </a:r>
-            <a:r>
-              <a:rPr lang="en-CA" sz="1600" i="1" dirty="0">
-                <a:latin typeface="Consolas" pitchFamily="49" charset="0"/>
-                <a:cs typeface="Consolas" pitchFamily="49" charset="0"/>
-              </a:rPr>
-              <a:t>="http://schemas.restbucks.net/order</a:t>
-            </a:r>
-            <a:r>
-              <a:rPr lang="en-CA" sz="1600" i="1" dirty="0" smtClean="0">
-                <a:latin typeface="Consolas" pitchFamily="49" charset="0"/>
-                <a:cs typeface="Consolas" pitchFamily="49" charset="0"/>
-              </a:rPr>
-              <a:t>"&gt;</a:t>
-            </a:r>
-            <a:endParaRPr lang="pl-PL" sz="1600" i="1" dirty="0" smtClean="0">
-              <a:latin typeface="Consolas" pitchFamily="49" charset="0"/>
-              <a:cs typeface="Consolas" pitchFamily="49" charset="0"/>
-            </a:endParaRPr>
-          </a:p>
-          <a:p>
-            <a:r>
-              <a:rPr lang="pl-PL" sz="1600" i="1" dirty="0" smtClean="0">
-                <a:latin typeface="Consolas" pitchFamily="49" charset="0"/>
-                <a:cs typeface="Consolas" pitchFamily="49" charset="0"/>
-              </a:rPr>
-              <a:t>&lt;drink&gt;Latte&lt;/drink&gt;</a:t>
-            </a:r>
-          </a:p>
-          <a:p>
-            <a:r>
-              <a:rPr lang="pl-PL" sz="1600" b="1" i="1" dirty="0" smtClean="0">
-                <a:solidFill>
-                  <a:schemeClr val="tx1">
-                    <a:lumMod val="95000"/>
-                    <a:lumOff val="5000"/>
-                  </a:schemeClr>
-                </a:solidFill>
-                <a:latin typeface="Consolas" pitchFamily="49" charset="0"/>
-                <a:cs typeface="Consolas" pitchFamily="49" charset="0"/>
-              </a:rPr>
-              <a:t>&lt;link href=„payment/1234” rel=„http://relations.restbucks.net/payment”/&gt;</a:t>
-            </a:r>
-            <a:endParaRPr lang="pl-PL" sz="1600" b="1" i="1" dirty="0">
-              <a:solidFill>
-                <a:schemeClr val="tx1">
-                  <a:lumMod val="95000"/>
-                  <a:lumOff val="5000"/>
-                </a:schemeClr>
-              </a:solidFill>
-              <a:latin typeface="Consolas" pitchFamily="49" charset="0"/>
-              <a:cs typeface="Consolas" pitchFamily="49" charset="0"/>
-            </a:endParaRPr>
-          </a:p>
-          <a:p>
-            <a:r>
-              <a:rPr lang="pl-PL" sz="1600" i="1" dirty="0" smtClean="0">
-                <a:latin typeface="Consolas" pitchFamily="49" charset="0"/>
-                <a:cs typeface="Consolas" pitchFamily="49" charset="0"/>
-              </a:rPr>
-              <a:t>&lt;/order&gt;</a:t>
-            </a:r>
-            <a:endParaRPr lang="en-CA" sz="1600" i="1" dirty="0">
-              <a:latin typeface="Consolas" pitchFamily="49" charset="0"/>
-              <a:cs typeface="Consolas" pitchFamily="49" charset="0"/>
-            </a:endParaRPr>
-          </a:p>
-        </p:txBody>
-      </p:sp>
-      <p:sp>
-        <p:nvSpPr>
-          <p:cNvPr id="12" name="Right Arrow 11"/>
-          <p:cNvSpPr/>
-          <p:nvPr/>
-        </p:nvSpPr>
-        <p:spPr>
-          <a:xfrm>
-            <a:off x="2057400" y="4926650"/>
-            <a:ext cx="685800" cy="536249"/>
-          </a:xfrm>
-          <a:prstGeom prst="rightArrow">
             <a:avLst/>
           </a:prstGeom>
         </p:spPr>
@@ -6806,22 +6283,26 @@
           <a:lstStyle/>
           <a:p>
             <a:pPr algn="ctr"/>
-            <a:endParaRPr lang="en-CA"/>
-          </a:p>
-        </p:txBody>
-      </p:sp>
-      <p:sp>
-        <p:nvSpPr>
-          <p:cNvPr id="14" name="Right Arrow 13"/>
+            <a:r>
+              <a:rPr lang="pl-PL" dirty="0" smtClean="0"/>
+              <a:t>/order/{orderId}</a:t>
+            </a:r>
+            <a:endParaRPr lang="en-CA" dirty="0"/>
+          </a:p>
+        </p:txBody>
+      </p:sp>
+      <p:sp>
+        <p:nvSpPr>
+          <p:cNvPr id="12" name="Rounded Rectangle 11"/>
           <p:cNvSpPr/>
           <p:nvPr/>
         </p:nvSpPr>
         <p:spPr>
           <a:xfrm>
-            <a:off x="6477000" y="4926650"/>
-            <a:ext cx="609600" cy="536249"/>
+            <a:off x="1600200" y="3086100"/>
+            <a:ext cx="2286000" cy="457200"/>
           </a:xfrm>
-          <a:prstGeom prst="rightArrow">
+          <a:prstGeom prst="roundRect">
             <a:avLst/>
           </a:prstGeom>
         </p:spPr>
@@ -6844,20 +6325,24 @@
           <a:lstStyle/>
           <a:p>
             <a:pPr algn="ctr"/>
-            <a:endParaRPr lang="en-CA"/>
-          </a:p>
-        </p:txBody>
-      </p:sp>
-      <p:sp>
-        <p:nvSpPr>
-          <p:cNvPr id="15" name="Rounded Rectangle 14"/>
+            <a:r>
+              <a:rPr lang="pl-PL" dirty="0" smtClean="0"/>
+              <a:t>/receipt/{orderId}</a:t>
+            </a:r>
+            <a:endParaRPr lang="en-CA" dirty="0"/>
+          </a:p>
+        </p:txBody>
+      </p:sp>
+      <p:sp>
+        <p:nvSpPr>
+          <p:cNvPr id="13" name="Rounded Rectangle 12"/>
           <p:cNvSpPr/>
           <p:nvPr/>
         </p:nvSpPr>
         <p:spPr>
           <a:xfrm>
-            <a:off x="2743200" y="3810000"/>
-            <a:ext cx="3733800" cy="2769550"/>
+            <a:off x="1600200" y="4955493"/>
+            <a:ext cx="2286000" cy="457200"/>
           </a:xfrm>
           <a:prstGeom prst="roundRect">
             <a:avLst/>
@@ -6865,175 +6350,149 @@
         </p:spPr>
         <p:style>
           <a:lnRef idx="0">
-            <a:schemeClr val="accent3"/>
+            <a:schemeClr val="accent6"/>
           </a:lnRef>
           <a:fillRef idx="3">
-            <a:schemeClr val="accent3"/>
+            <a:schemeClr val="accent6"/>
           </a:fillRef>
           <a:effectRef idx="3">
-            <a:schemeClr val="accent3"/>
+            <a:schemeClr val="accent6"/>
           </a:effectRef>
           <a:fontRef idx="minor">
             <a:schemeClr val="lt1"/>
           </a:fontRef>
         </p:style>
         <p:txBody>
-          <a:bodyPr vert="horz" rtlCol="0" anchor="t"/>
-          <a:lstStyle/>
-          <a:p>
-            <a:r>
-              <a:rPr lang="pl-PL" sz="1600" b="1" i="1" dirty="0" smtClean="0">
-                <a:solidFill>
-                  <a:schemeClr val="tx1">
-                    <a:lumMod val="95000"/>
-                    <a:lumOff val="5000"/>
-                  </a:schemeClr>
-                </a:solidFill>
-                <a:latin typeface="Consolas" pitchFamily="49" charset="0"/>
-                <a:cs typeface="Consolas" pitchFamily="49" charset="0"/>
-              </a:rPr>
-              <a:t>PUT /payment/1234</a:t>
-            </a:r>
-            <a:r>
-              <a:rPr lang="en-CA" sz="1600" b="1" i="1" dirty="0" smtClean="0">
-                <a:solidFill>
-                  <a:schemeClr val="tx1">
-                    <a:lumMod val="95000"/>
-                    <a:lumOff val="5000"/>
-                  </a:schemeClr>
-                </a:solidFill>
-                <a:latin typeface="Consolas" pitchFamily="49" charset="0"/>
-                <a:cs typeface="Consolas" pitchFamily="49" charset="0"/>
-              </a:rPr>
-              <a:t> </a:t>
-            </a:r>
-            <a:r>
-              <a:rPr lang="en-CA" sz="1600" b="1" i="1" dirty="0">
-                <a:solidFill>
-                  <a:schemeClr val="tx1">
-                    <a:lumMod val="95000"/>
-                    <a:lumOff val="5000"/>
-                  </a:schemeClr>
-                </a:solidFill>
-                <a:latin typeface="Consolas" pitchFamily="49" charset="0"/>
-                <a:cs typeface="Consolas" pitchFamily="49" charset="0"/>
-              </a:rPr>
-              <a:t>HTTP/1.1</a:t>
-            </a:r>
-          </a:p>
-          <a:p>
-            <a:r>
-              <a:rPr lang="en-CA" sz="1600" i="1" dirty="0">
-                <a:latin typeface="Consolas" pitchFamily="49" charset="0"/>
-                <a:cs typeface="Consolas" pitchFamily="49" charset="0"/>
-              </a:rPr>
-              <a:t>Host: restbucks.net</a:t>
-            </a:r>
-          </a:p>
-          <a:p>
-            <a:r>
-              <a:rPr lang="en-CA" sz="1600" i="1" dirty="0">
-                <a:latin typeface="Consolas" pitchFamily="49" charset="0"/>
-                <a:cs typeface="Consolas" pitchFamily="49" charset="0"/>
-              </a:rPr>
-              <a:t>Content-Type: application/xml</a:t>
-            </a:r>
-          </a:p>
-          <a:p>
-            <a:r>
-              <a:rPr lang="en-CA" sz="1600" i="1" dirty="0">
-                <a:latin typeface="Consolas" pitchFamily="49" charset="0"/>
-                <a:cs typeface="Consolas" pitchFamily="49" charset="0"/>
-              </a:rPr>
-              <a:t>Content-Length: 216</a:t>
-            </a:r>
-          </a:p>
-          <a:p>
-            <a:r>
-              <a:rPr lang="en-CA" sz="1600" i="1" dirty="0" smtClean="0">
-                <a:latin typeface="Consolas" pitchFamily="49" charset="0"/>
-                <a:cs typeface="Consolas" pitchFamily="49" charset="0"/>
-              </a:rPr>
-              <a:t>&lt;</a:t>
-            </a:r>
-            <a:r>
-              <a:rPr lang="pl-PL" sz="1600" i="1" dirty="0" smtClean="0">
-                <a:latin typeface="Consolas" pitchFamily="49" charset="0"/>
-                <a:cs typeface="Consolas" pitchFamily="49" charset="0"/>
-              </a:rPr>
-              <a:t>payment</a:t>
-            </a:r>
-            <a:r>
-              <a:rPr lang="en-CA" sz="1600" i="1" dirty="0" smtClean="0">
-                <a:latin typeface="Consolas" pitchFamily="49" charset="0"/>
-                <a:cs typeface="Consolas" pitchFamily="49" charset="0"/>
-              </a:rPr>
-              <a:t> </a:t>
-            </a:r>
-            <a:r>
-              <a:rPr lang="en-CA" sz="1600" i="1" dirty="0" err="1">
-                <a:latin typeface="Consolas" pitchFamily="49" charset="0"/>
-                <a:cs typeface="Consolas" pitchFamily="49" charset="0"/>
-              </a:rPr>
-              <a:t>xmlns</a:t>
-            </a:r>
-            <a:r>
-              <a:rPr lang="en-CA" sz="1600" i="1" dirty="0">
-                <a:latin typeface="Consolas" pitchFamily="49" charset="0"/>
-                <a:cs typeface="Consolas" pitchFamily="49" charset="0"/>
-              </a:rPr>
-              <a:t>="http://schemas.restbucks.net/order"&gt;</a:t>
-            </a:r>
-          </a:p>
-          <a:p>
-            <a:r>
-              <a:rPr lang="en-CA" sz="1600" i="1" dirty="0" smtClean="0">
-                <a:latin typeface="Consolas" pitchFamily="49" charset="0"/>
-                <a:cs typeface="Consolas" pitchFamily="49" charset="0"/>
-              </a:rPr>
-              <a:t>&lt;</a:t>
-            </a:r>
-            <a:r>
-              <a:rPr lang="pl-PL" sz="1600" i="1" dirty="0" smtClean="0">
-                <a:latin typeface="Consolas" pitchFamily="49" charset="0"/>
-                <a:cs typeface="Consolas" pitchFamily="49" charset="0"/>
-              </a:rPr>
-              <a:t>cardNumber</a:t>
-            </a:r>
-            <a:r>
-              <a:rPr lang="en-CA" sz="1600" i="1" dirty="0" smtClean="0">
-                <a:latin typeface="Consolas" pitchFamily="49" charset="0"/>
-                <a:cs typeface="Consolas" pitchFamily="49" charset="0"/>
-              </a:rPr>
-              <a:t>&gt;</a:t>
-            </a:r>
-            <a:r>
-              <a:rPr lang="pl-PL" sz="1600" i="1" dirty="0" smtClean="0">
-                <a:latin typeface="Consolas" pitchFamily="49" charset="0"/>
-                <a:cs typeface="Consolas" pitchFamily="49" charset="0"/>
-              </a:rPr>
-              <a:t>...&lt;/cardNumber&gt;</a:t>
-            </a:r>
-            <a:endParaRPr lang="en-CA" sz="1600" i="1" dirty="0">
-              <a:latin typeface="Consolas" pitchFamily="49" charset="0"/>
-              <a:cs typeface="Consolas" pitchFamily="49" charset="0"/>
-            </a:endParaRPr>
-          </a:p>
-          <a:p>
-            <a:r>
-              <a:rPr lang="en-CA" sz="1600" i="1" dirty="0">
-                <a:latin typeface="Consolas" pitchFamily="49" charset="0"/>
-                <a:cs typeface="Consolas" pitchFamily="49" charset="0"/>
-              </a:rPr>
-              <a:t>&lt;/order&gt;</a:t>
-            </a:r>
+          <a:bodyPr rtlCol="0" anchor="ctr"/>
+          <a:lstStyle/>
+          <a:p>
+            <a:pPr algn="ctr"/>
+            <a:r>
+              <a:rPr lang="pl-PL" dirty="0" smtClean="0"/>
+              <a:t>/payment/{orderId}</a:t>
+            </a:r>
+            <a:endParaRPr lang="en-CA" dirty="0"/>
+          </a:p>
+        </p:txBody>
+      </p:sp>
+      <p:sp>
+        <p:nvSpPr>
+          <p:cNvPr id="14" name="Left-Right Arrow 13"/>
+          <p:cNvSpPr/>
+          <p:nvPr/>
+        </p:nvSpPr>
+        <p:spPr>
+          <a:xfrm>
+            <a:off x="3886200" y="1383169"/>
+            <a:ext cx="1143000" cy="351447"/>
+          </a:xfrm>
+          <a:prstGeom prst="leftRightArrow">
+            <a:avLst/>
+          </a:prstGeom>
+        </p:spPr>
+        <p:style>
+          <a:lnRef idx="0">
+            <a:schemeClr val="accent2"/>
+          </a:lnRef>
+          <a:fillRef idx="3">
+            <a:schemeClr val="accent2"/>
+          </a:fillRef>
+          <a:effectRef idx="3">
+            <a:schemeClr val="accent2"/>
+          </a:effectRef>
+          <a:fontRef idx="minor">
+            <a:schemeClr val="lt1"/>
+          </a:fontRef>
+        </p:style>
+        <p:txBody>
+          <a:bodyPr rtlCol="0" anchor="ctr"/>
+          <a:lstStyle/>
+          <a:p>
+            <a:pPr algn="ctr"/>
+            <a:endParaRPr lang="en-CA"/>
+          </a:p>
+        </p:txBody>
+      </p:sp>
+      <p:sp>
+        <p:nvSpPr>
+          <p:cNvPr id="15" name="Left-Right Arrow 14"/>
+          <p:cNvSpPr/>
+          <p:nvPr/>
+        </p:nvSpPr>
+        <p:spPr>
+          <a:xfrm>
+            <a:off x="3886200" y="3138976"/>
+            <a:ext cx="1143000" cy="351447"/>
+          </a:xfrm>
+          <a:prstGeom prst="leftRightArrow">
+            <a:avLst/>
+          </a:prstGeom>
+        </p:spPr>
+        <p:style>
+          <a:lnRef idx="0">
+            <a:schemeClr val="accent2"/>
+          </a:lnRef>
+          <a:fillRef idx="3">
+            <a:schemeClr val="accent2"/>
+          </a:fillRef>
+          <a:effectRef idx="3">
+            <a:schemeClr val="accent2"/>
+          </a:effectRef>
+          <a:fontRef idx="minor">
+            <a:schemeClr val="lt1"/>
+          </a:fontRef>
+        </p:style>
+        <p:txBody>
+          <a:bodyPr rtlCol="0" anchor="ctr"/>
+          <a:lstStyle/>
+          <a:p>
+            <a:pPr algn="ctr"/>
+            <a:endParaRPr lang="en-CA"/>
+          </a:p>
+        </p:txBody>
+      </p:sp>
+      <p:sp>
+        <p:nvSpPr>
+          <p:cNvPr id="16" name="Left-Right Arrow 15"/>
+          <p:cNvSpPr/>
+          <p:nvPr/>
+        </p:nvSpPr>
+        <p:spPr>
+          <a:xfrm>
+            <a:off x="3901155" y="5008369"/>
+            <a:ext cx="1143000" cy="351447"/>
+          </a:xfrm>
+          <a:prstGeom prst="leftRightArrow">
+            <a:avLst/>
+          </a:prstGeom>
+        </p:spPr>
+        <p:style>
+          <a:lnRef idx="0">
+            <a:schemeClr val="accent2"/>
+          </a:lnRef>
+          <a:fillRef idx="3">
+            <a:schemeClr val="accent2"/>
+          </a:fillRef>
+          <a:effectRef idx="3">
+            <a:schemeClr val="accent2"/>
+          </a:effectRef>
+          <a:fontRef idx="minor">
+            <a:schemeClr val="lt1"/>
+          </a:fontRef>
+        </p:style>
+        <p:txBody>
+          <a:bodyPr rtlCol="0" anchor="ctr"/>
+          <a:lstStyle/>
+          <a:p>
+            <a:pPr algn="ctr"/>
+            <a:endParaRPr lang="en-CA"/>
           </a:p>
         </p:txBody>
       </p:sp>
     </p:spTree>
     <p:extLst>
       <p:ext uri="{BB962C8B-B14F-4D97-AF65-F5344CB8AC3E}">
-        <p14:creationId xmlns:p14="http://schemas.microsoft.com/office/powerpoint/2010/main" val="1817859391"/>
+        <p14:creationId xmlns:p14="http://schemas.microsoft.com/office/powerpoint/2010/main" val="3323238465"/>
       </p:ext>
     </p:extLst>
   </p:cSld>
@@ -7558,6 +7017,98 @@
           </a:p>
         </p:txBody>
       </p:sp>
+      <p:sp>
+        <p:nvSpPr>
+          <p:cNvPr id="3" name="Rounded Rectangular Callout 2"/>
+          <p:cNvSpPr/>
+          <p:nvPr/>
+        </p:nvSpPr>
+        <p:spPr>
+          <a:xfrm>
+            <a:off x="6832362" y="2407778"/>
+            <a:ext cx="1371600" cy="533400"/>
+          </a:xfrm>
+          <a:prstGeom prst="wedgeRoundRectCallout">
+            <a:avLst>
+              <a:gd name="adj1" fmla="val 57049"/>
+              <a:gd name="adj2" fmla="val 81726"/>
+              <a:gd name="adj3" fmla="val 16667"/>
+            </a:avLst>
+          </a:prstGeom>
+        </p:spPr>
+        <p:style>
+          <a:lnRef idx="0">
+            <a:schemeClr val="accent5"/>
+          </a:lnRef>
+          <a:fillRef idx="3">
+            <a:schemeClr val="accent5"/>
+          </a:fillRef>
+          <a:effectRef idx="3">
+            <a:schemeClr val="accent5"/>
+          </a:effectRef>
+          <a:fontRef idx="minor">
+            <a:schemeClr val="lt1"/>
+          </a:fontRef>
+        </p:style>
+        <p:txBody>
+          <a:bodyPr rtlCol="0" anchor="ctr"/>
+          <a:lstStyle/>
+          <a:p>
+            <a:pPr algn="ctr"/>
+            <a:r>
+              <a:rPr lang="pl-PL" dirty="0" smtClean="0"/>
+              <a:t>order</a:t>
+            </a:r>
+            <a:endParaRPr lang="en-CA" dirty="0"/>
+          </a:p>
+        </p:txBody>
+      </p:sp>
+      <p:sp>
+        <p:nvSpPr>
+          <p:cNvPr id="15" name="Rounded Rectangular Callout 14"/>
+          <p:cNvSpPr/>
+          <p:nvPr/>
+        </p:nvSpPr>
+        <p:spPr>
+          <a:xfrm>
+            <a:off x="2971800" y="4343400"/>
+            <a:ext cx="1371600" cy="533400"/>
+          </a:xfrm>
+          <a:prstGeom prst="wedgeRoundRectCallout">
+            <a:avLst>
+              <a:gd name="adj1" fmla="val 57049"/>
+              <a:gd name="adj2" fmla="val 81726"/>
+              <a:gd name="adj3" fmla="val 16667"/>
+            </a:avLst>
+          </a:prstGeom>
+        </p:spPr>
+        <p:style>
+          <a:lnRef idx="0">
+            <a:schemeClr val="accent5"/>
+          </a:lnRef>
+          <a:fillRef idx="3">
+            <a:schemeClr val="accent5"/>
+          </a:fillRef>
+          <a:effectRef idx="3">
+            <a:schemeClr val="accent5"/>
+          </a:effectRef>
+          <a:fontRef idx="minor">
+            <a:schemeClr val="lt1"/>
+          </a:fontRef>
+        </p:style>
+        <p:txBody>
+          <a:bodyPr rtlCol="0" anchor="ctr"/>
+          <a:lstStyle/>
+          <a:p>
+            <a:pPr algn="ctr"/>
+            <a:r>
+              <a:rPr lang="pl-PL" dirty="0" smtClean="0"/>
+              <a:t>receipt</a:t>
+            </a:r>
+            <a:endParaRPr lang="en-CA" dirty="0"/>
+          </a:p>
+        </p:txBody>
+      </p:sp>
     </p:spTree>
     <p:extLst>
       <p:ext uri="{BB962C8B-B14F-4D97-AF65-F5344CB8AC3E}">
@@ -7591,6 +7142,620 @@
 </file>
 
 <file path=ppt/slides/slide13.xml><?xml version="1.0" encoding="utf-8"?>
+<p:sld xmlns:a="http://schemas.openxmlformats.org/drawingml/2006/main" xmlns:r="http://schemas.openxmlformats.org/officeDocument/2006/relationships" xmlns:p="http://schemas.openxmlformats.org/presentationml/2006/main">
+  <p:cSld>
+    <p:spTree>
+      <p:nvGrpSpPr>
+        <p:cNvPr id="1" name=""/>
+        <p:cNvGrpSpPr/>
+        <p:nvPr/>
+      </p:nvGrpSpPr>
+      <p:grpSpPr>
+        <a:xfrm>
+          <a:off x="0" y="0"/>
+          <a:ext cx="0" cy="0"/>
+          <a:chOff x="0" y="0"/>
+          <a:chExt cx="0" cy="0"/>
+        </a:xfrm>
+      </p:grpSpPr>
+      <p:sp>
+        <p:nvSpPr>
+          <p:cNvPr id="11" name="Right Arrow 10"/>
+          <p:cNvSpPr/>
+          <p:nvPr/>
+        </p:nvSpPr>
+        <p:spPr>
+          <a:xfrm rot="10800000">
+            <a:off x="2057398" y="1585242"/>
+            <a:ext cx="685802" cy="536249"/>
+          </a:xfrm>
+          <a:prstGeom prst="rightArrow">
+            <a:avLst/>
+          </a:prstGeom>
+        </p:spPr>
+        <p:style>
+          <a:lnRef idx="0">
+            <a:schemeClr val="accent6"/>
+          </a:lnRef>
+          <a:fillRef idx="3">
+            <a:schemeClr val="accent6"/>
+          </a:fillRef>
+          <a:effectRef idx="3">
+            <a:schemeClr val="accent6"/>
+          </a:effectRef>
+          <a:fontRef idx="minor">
+            <a:schemeClr val="lt1"/>
+          </a:fontRef>
+        </p:style>
+        <p:txBody>
+          <a:bodyPr rtlCol="0" anchor="ctr"/>
+          <a:lstStyle/>
+          <a:p>
+            <a:pPr algn="ctr"/>
+            <a:endParaRPr lang="en-CA"/>
+          </a:p>
+        </p:txBody>
+      </p:sp>
+      <p:sp>
+        <p:nvSpPr>
+          <p:cNvPr id="13" name="Right Arrow 12"/>
+          <p:cNvSpPr/>
+          <p:nvPr/>
+        </p:nvSpPr>
+        <p:spPr>
+          <a:xfrm rot="10800000">
+            <a:off x="6476999" y="1585240"/>
+            <a:ext cx="609598" cy="536249"/>
+          </a:xfrm>
+          <a:prstGeom prst="rightArrow">
+            <a:avLst/>
+          </a:prstGeom>
+        </p:spPr>
+        <p:style>
+          <a:lnRef idx="0">
+            <a:schemeClr val="accent6"/>
+          </a:lnRef>
+          <a:fillRef idx="3">
+            <a:schemeClr val="accent6"/>
+          </a:fillRef>
+          <a:effectRef idx="3">
+            <a:schemeClr val="accent6"/>
+          </a:effectRef>
+          <a:fontRef idx="minor">
+            <a:schemeClr val="lt1"/>
+          </a:fontRef>
+        </p:style>
+        <p:txBody>
+          <a:bodyPr rtlCol="0" anchor="ctr"/>
+          <a:lstStyle/>
+          <a:p>
+            <a:pPr algn="ctr"/>
+            <a:endParaRPr lang="en-CA"/>
+          </a:p>
+        </p:txBody>
+      </p:sp>
+      <p:sp>
+        <p:nvSpPr>
+          <p:cNvPr id="4" name="Rounded Rectangle 3"/>
+          <p:cNvSpPr/>
+          <p:nvPr/>
+        </p:nvSpPr>
+        <p:spPr>
+          <a:xfrm>
+            <a:off x="533400" y="457200"/>
+            <a:ext cx="1524000" cy="5943600"/>
+          </a:xfrm>
+          <a:prstGeom prst="roundRect">
+            <a:avLst/>
+          </a:prstGeom>
+        </p:spPr>
+        <p:style>
+          <a:lnRef idx="0">
+            <a:schemeClr val="accent1"/>
+          </a:lnRef>
+          <a:fillRef idx="3">
+            <a:schemeClr val="accent1"/>
+          </a:fillRef>
+          <a:effectRef idx="3">
+            <a:schemeClr val="accent1"/>
+          </a:effectRef>
+          <a:fontRef idx="minor">
+            <a:schemeClr val="lt1"/>
+          </a:fontRef>
+        </p:style>
+        <p:txBody>
+          <a:bodyPr vert="vert270" rtlCol="0" anchor="ctr"/>
+          <a:lstStyle/>
+          <a:p>
+            <a:pPr algn="ctr"/>
+            <a:r>
+              <a:rPr lang="pl-PL" sz="3200" dirty="0" smtClean="0"/>
+              <a:t>Client</a:t>
+            </a:r>
+            <a:endParaRPr lang="en-CA" sz="3200" dirty="0"/>
+          </a:p>
+        </p:txBody>
+      </p:sp>
+      <p:sp>
+        <p:nvSpPr>
+          <p:cNvPr id="6" name="Rounded Rectangle 5"/>
+          <p:cNvSpPr/>
+          <p:nvPr/>
+        </p:nvSpPr>
+        <p:spPr>
+          <a:xfrm>
+            <a:off x="7086600" y="457200"/>
+            <a:ext cx="1524000" cy="5943600"/>
+          </a:xfrm>
+          <a:prstGeom prst="roundRect">
+            <a:avLst/>
+          </a:prstGeom>
+        </p:spPr>
+        <p:style>
+          <a:lnRef idx="0">
+            <a:schemeClr val="accent1"/>
+          </a:lnRef>
+          <a:fillRef idx="3">
+            <a:schemeClr val="accent1"/>
+          </a:fillRef>
+          <a:effectRef idx="3">
+            <a:schemeClr val="accent1"/>
+          </a:effectRef>
+          <a:fontRef idx="minor">
+            <a:schemeClr val="lt1"/>
+          </a:fontRef>
+        </p:style>
+        <p:txBody>
+          <a:bodyPr vert="vert270" rtlCol="0" anchor="ctr"/>
+          <a:lstStyle/>
+          <a:p>
+            <a:pPr algn="ctr"/>
+            <a:r>
+              <a:rPr lang="pl-PL" sz="3200" dirty="0" smtClean="0"/>
+              <a:t>Service</a:t>
+            </a:r>
+            <a:endParaRPr lang="en-CA" sz="3200" dirty="0"/>
+          </a:p>
+        </p:txBody>
+      </p:sp>
+      <p:sp>
+        <p:nvSpPr>
+          <p:cNvPr id="8" name="Rounded Rectangle 7"/>
+          <p:cNvSpPr/>
+          <p:nvPr/>
+        </p:nvSpPr>
+        <p:spPr>
+          <a:xfrm>
+            <a:off x="2743200" y="457200"/>
+            <a:ext cx="3733800" cy="3276600"/>
+          </a:xfrm>
+          <a:prstGeom prst="roundRect">
+            <a:avLst/>
+          </a:prstGeom>
+        </p:spPr>
+        <p:style>
+          <a:lnRef idx="0">
+            <a:schemeClr val="accent3"/>
+          </a:lnRef>
+          <a:fillRef idx="3">
+            <a:schemeClr val="accent3"/>
+          </a:fillRef>
+          <a:effectRef idx="3">
+            <a:schemeClr val="accent3"/>
+          </a:effectRef>
+          <a:fontRef idx="minor">
+            <a:schemeClr val="lt1"/>
+          </a:fontRef>
+        </p:style>
+        <p:txBody>
+          <a:bodyPr vert="horz" rtlCol="0" anchor="ctr"/>
+          <a:lstStyle/>
+          <a:p>
+            <a:r>
+              <a:rPr lang="pl-PL" sz="1600" i="1" dirty="0" smtClean="0">
+                <a:solidFill>
+                  <a:schemeClr val="bg1"/>
+                </a:solidFill>
+                <a:latin typeface="Consolas" pitchFamily="49" charset="0"/>
+                <a:cs typeface="Consolas" pitchFamily="49" charset="0"/>
+              </a:rPr>
+              <a:t>200 OK</a:t>
+            </a:r>
+          </a:p>
+          <a:p>
+            <a:r>
+              <a:rPr lang="pl-PL" sz="1600" i="1" dirty="0" smtClean="0">
+                <a:latin typeface="Consolas" pitchFamily="49" charset="0"/>
+                <a:cs typeface="Consolas" pitchFamily="49" charset="0"/>
+              </a:rPr>
+              <a:t>ContentType: </a:t>
+            </a:r>
+            <a:r>
+              <a:rPr lang="pl-PL" sz="1600" b="1" i="1" dirty="0" smtClean="0">
+                <a:solidFill>
+                  <a:schemeClr val="tx1">
+                    <a:lumMod val="95000"/>
+                    <a:lumOff val="5000"/>
+                  </a:schemeClr>
+                </a:solidFill>
+                <a:latin typeface="Consolas" pitchFamily="49" charset="0"/>
+                <a:cs typeface="Consolas" pitchFamily="49" charset="0"/>
+              </a:rPr>
+              <a:t>application/vnd.restbucks+xml</a:t>
+            </a:r>
+            <a:r>
+              <a:rPr lang="en-CA" sz="1600" i="1" dirty="0" smtClean="0">
+                <a:latin typeface="Consolas" pitchFamily="49" charset="0"/>
+                <a:cs typeface="Consolas" pitchFamily="49" charset="0"/>
+              </a:rPr>
+              <a:t> </a:t>
+            </a:r>
+            <a:r>
+              <a:rPr lang="en-CA" sz="1600" i="1" dirty="0" err="1">
+                <a:latin typeface="Consolas" pitchFamily="49" charset="0"/>
+                <a:cs typeface="Consolas" pitchFamily="49" charset="0"/>
+              </a:rPr>
+              <a:t>xmlns</a:t>
+            </a:r>
+            <a:r>
+              <a:rPr lang="en-CA" sz="1600" i="1" dirty="0">
+                <a:latin typeface="Consolas" pitchFamily="49" charset="0"/>
+                <a:cs typeface="Consolas" pitchFamily="49" charset="0"/>
+              </a:rPr>
+              <a:t>="http://schemas.restbucks.net/order</a:t>
+            </a:r>
+            <a:r>
+              <a:rPr lang="en-CA" sz="1600" i="1" dirty="0" smtClean="0">
+                <a:latin typeface="Consolas" pitchFamily="49" charset="0"/>
+                <a:cs typeface="Consolas" pitchFamily="49" charset="0"/>
+              </a:rPr>
+              <a:t>"&gt;</a:t>
+            </a:r>
+            <a:endParaRPr lang="pl-PL" sz="1600" i="1" dirty="0" smtClean="0">
+              <a:latin typeface="Consolas" pitchFamily="49" charset="0"/>
+              <a:cs typeface="Consolas" pitchFamily="49" charset="0"/>
+            </a:endParaRPr>
+          </a:p>
+          <a:p>
+            <a:r>
+              <a:rPr lang="pl-PL" sz="1600" i="1" dirty="0" smtClean="0">
+                <a:latin typeface="Consolas" pitchFamily="49" charset="0"/>
+                <a:cs typeface="Consolas" pitchFamily="49" charset="0"/>
+              </a:rPr>
+              <a:t>&lt;drink&gt;Latte&lt;/drink&gt;</a:t>
+            </a:r>
+          </a:p>
+          <a:p>
+            <a:r>
+              <a:rPr lang="pl-PL" sz="1600" b="1" i="1" dirty="0" smtClean="0">
+                <a:solidFill>
+                  <a:schemeClr val="tx1">
+                    <a:lumMod val="95000"/>
+                    <a:lumOff val="5000"/>
+                  </a:schemeClr>
+                </a:solidFill>
+                <a:latin typeface="Consolas" pitchFamily="49" charset="0"/>
+                <a:cs typeface="Consolas" pitchFamily="49" charset="0"/>
+              </a:rPr>
+              <a:t>&lt;link href=„payment/1234” rel=„http://relations.restbucks.net/payment”/&gt;</a:t>
+            </a:r>
+            <a:endParaRPr lang="pl-PL" sz="1600" b="1" i="1" dirty="0">
+              <a:solidFill>
+                <a:schemeClr val="tx1">
+                  <a:lumMod val="95000"/>
+                  <a:lumOff val="5000"/>
+                </a:schemeClr>
+              </a:solidFill>
+              <a:latin typeface="Consolas" pitchFamily="49" charset="0"/>
+              <a:cs typeface="Consolas" pitchFamily="49" charset="0"/>
+            </a:endParaRPr>
+          </a:p>
+          <a:p>
+            <a:r>
+              <a:rPr lang="pl-PL" sz="1600" i="1" dirty="0" smtClean="0">
+                <a:latin typeface="Consolas" pitchFamily="49" charset="0"/>
+                <a:cs typeface="Consolas" pitchFamily="49" charset="0"/>
+              </a:rPr>
+              <a:t>&lt;/order&gt;</a:t>
+            </a:r>
+            <a:endParaRPr lang="en-CA" sz="1600" i="1" dirty="0">
+              <a:latin typeface="Consolas" pitchFamily="49" charset="0"/>
+              <a:cs typeface="Consolas" pitchFamily="49" charset="0"/>
+            </a:endParaRPr>
+          </a:p>
+        </p:txBody>
+      </p:sp>
+      <p:sp>
+        <p:nvSpPr>
+          <p:cNvPr id="12" name="Right Arrow 11"/>
+          <p:cNvSpPr/>
+          <p:nvPr/>
+        </p:nvSpPr>
+        <p:spPr>
+          <a:xfrm>
+            <a:off x="2057400" y="4926650"/>
+            <a:ext cx="685800" cy="536249"/>
+          </a:xfrm>
+          <a:prstGeom prst="rightArrow">
+            <a:avLst/>
+          </a:prstGeom>
+        </p:spPr>
+        <p:style>
+          <a:lnRef idx="0">
+            <a:schemeClr val="accent6"/>
+          </a:lnRef>
+          <a:fillRef idx="3">
+            <a:schemeClr val="accent6"/>
+          </a:fillRef>
+          <a:effectRef idx="3">
+            <a:schemeClr val="accent6"/>
+          </a:effectRef>
+          <a:fontRef idx="minor">
+            <a:schemeClr val="lt1"/>
+          </a:fontRef>
+        </p:style>
+        <p:txBody>
+          <a:bodyPr rtlCol="0" anchor="ctr"/>
+          <a:lstStyle/>
+          <a:p>
+            <a:pPr algn="ctr"/>
+            <a:endParaRPr lang="en-CA"/>
+          </a:p>
+        </p:txBody>
+      </p:sp>
+      <p:sp>
+        <p:nvSpPr>
+          <p:cNvPr id="14" name="Right Arrow 13"/>
+          <p:cNvSpPr/>
+          <p:nvPr/>
+        </p:nvSpPr>
+        <p:spPr>
+          <a:xfrm>
+            <a:off x="6477000" y="4926650"/>
+            <a:ext cx="609600" cy="536249"/>
+          </a:xfrm>
+          <a:prstGeom prst="rightArrow">
+            <a:avLst/>
+          </a:prstGeom>
+        </p:spPr>
+        <p:style>
+          <a:lnRef idx="0">
+            <a:schemeClr val="accent6"/>
+          </a:lnRef>
+          <a:fillRef idx="3">
+            <a:schemeClr val="accent6"/>
+          </a:fillRef>
+          <a:effectRef idx="3">
+            <a:schemeClr val="accent6"/>
+          </a:effectRef>
+          <a:fontRef idx="minor">
+            <a:schemeClr val="lt1"/>
+          </a:fontRef>
+        </p:style>
+        <p:txBody>
+          <a:bodyPr rtlCol="0" anchor="ctr"/>
+          <a:lstStyle/>
+          <a:p>
+            <a:pPr algn="ctr"/>
+            <a:endParaRPr lang="en-CA"/>
+          </a:p>
+        </p:txBody>
+      </p:sp>
+      <p:sp>
+        <p:nvSpPr>
+          <p:cNvPr id="15" name="Rounded Rectangle 14"/>
+          <p:cNvSpPr/>
+          <p:nvPr/>
+        </p:nvSpPr>
+        <p:spPr>
+          <a:xfrm>
+            <a:off x="2743200" y="3810000"/>
+            <a:ext cx="3733800" cy="2769550"/>
+          </a:xfrm>
+          <a:prstGeom prst="roundRect">
+            <a:avLst/>
+          </a:prstGeom>
+        </p:spPr>
+        <p:style>
+          <a:lnRef idx="0">
+            <a:schemeClr val="accent3"/>
+          </a:lnRef>
+          <a:fillRef idx="3">
+            <a:schemeClr val="accent3"/>
+          </a:fillRef>
+          <a:effectRef idx="3">
+            <a:schemeClr val="accent3"/>
+          </a:effectRef>
+          <a:fontRef idx="minor">
+            <a:schemeClr val="lt1"/>
+          </a:fontRef>
+        </p:style>
+        <p:txBody>
+          <a:bodyPr vert="horz" rtlCol="0" anchor="t"/>
+          <a:lstStyle/>
+          <a:p>
+            <a:r>
+              <a:rPr lang="pl-PL" sz="1600" b="1" i="1" dirty="0" smtClean="0">
+                <a:solidFill>
+                  <a:schemeClr val="tx1">
+                    <a:lumMod val="95000"/>
+                    <a:lumOff val="5000"/>
+                  </a:schemeClr>
+                </a:solidFill>
+                <a:latin typeface="Consolas" pitchFamily="49" charset="0"/>
+                <a:cs typeface="Consolas" pitchFamily="49" charset="0"/>
+              </a:rPr>
+              <a:t>PUT /payment/1234</a:t>
+            </a:r>
+            <a:r>
+              <a:rPr lang="en-CA" sz="1600" b="1" i="1" dirty="0" smtClean="0">
+                <a:solidFill>
+                  <a:schemeClr val="tx1">
+                    <a:lumMod val="95000"/>
+                    <a:lumOff val="5000"/>
+                  </a:schemeClr>
+                </a:solidFill>
+                <a:latin typeface="Consolas" pitchFamily="49" charset="0"/>
+                <a:cs typeface="Consolas" pitchFamily="49" charset="0"/>
+              </a:rPr>
+              <a:t> </a:t>
+            </a:r>
+            <a:r>
+              <a:rPr lang="en-CA" sz="1600" b="1" i="1" dirty="0">
+                <a:solidFill>
+                  <a:schemeClr val="tx1">
+                    <a:lumMod val="95000"/>
+                    <a:lumOff val="5000"/>
+                  </a:schemeClr>
+                </a:solidFill>
+                <a:latin typeface="Consolas" pitchFamily="49" charset="0"/>
+                <a:cs typeface="Consolas" pitchFamily="49" charset="0"/>
+              </a:rPr>
+              <a:t>HTTP/1.1</a:t>
+            </a:r>
+          </a:p>
+          <a:p>
+            <a:r>
+              <a:rPr lang="en-CA" sz="1600" i="1" dirty="0">
+                <a:latin typeface="Consolas" pitchFamily="49" charset="0"/>
+                <a:cs typeface="Consolas" pitchFamily="49" charset="0"/>
+              </a:rPr>
+              <a:t>Host: restbucks.net</a:t>
+            </a:r>
+          </a:p>
+          <a:p>
+            <a:r>
+              <a:rPr lang="en-CA" sz="1600" i="1" dirty="0">
+                <a:latin typeface="Consolas" pitchFamily="49" charset="0"/>
+                <a:cs typeface="Consolas" pitchFamily="49" charset="0"/>
+              </a:rPr>
+              <a:t>Content-Type: application/xml</a:t>
+            </a:r>
+          </a:p>
+          <a:p>
+            <a:r>
+              <a:rPr lang="en-CA" sz="1600" i="1" dirty="0">
+                <a:latin typeface="Consolas" pitchFamily="49" charset="0"/>
+                <a:cs typeface="Consolas" pitchFamily="49" charset="0"/>
+              </a:rPr>
+              <a:t>Content-Length: 216</a:t>
+            </a:r>
+          </a:p>
+          <a:p>
+            <a:r>
+              <a:rPr lang="en-CA" sz="1600" i="1" dirty="0" smtClean="0">
+                <a:latin typeface="Consolas" pitchFamily="49" charset="0"/>
+                <a:cs typeface="Consolas" pitchFamily="49" charset="0"/>
+              </a:rPr>
+              <a:t>&lt;</a:t>
+            </a:r>
+            <a:r>
+              <a:rPr lang="pl-PL" sz="1600" i="1" dirty="0" smtClean="0">
+                <a:latin typeface="Consolas" pitchFamily="49" charset="0"/>
+                <a:cs typeface="Consolas" pitchFamily="49" charset="0"/>
+              </a:rPr>
+              <a:t>payment</a:t>
+            </a:r>
+            <a:r>
+              <a:rPr lang="en-CA" sz="1600" i="1" dirty="0" smtClean="0">
+                <a:latin typeface="Consolas" pitchFamily="49" charset="0"/>
+                <a:cs typeface="Consolas" pitchFamily="49" charset="0"/>
+              </a:rPr>
+              <a:t> </a:t>
+            </a:r>
+            <a:r>
+              <a:rPr lang="en-CA" sz="1600" i="1" dirty="0" err="1">
+                <a:latin typeface="Consolas" pitchFamily="49" charset="0"/>
+                <a:cs typeface="Consolas" pitchFamily="49" charset="0"/>
+              </a:rPr>
+              <a:t>xmlns</a:t>
+            </a:r>
+            <a:r>
+              <a:rPr lang="en-CA" sz="1600" i="1" dirty="0">
+                <a:latin typeface="Consolas" pitchFamily="49" charset="0"/>
+                <a:cs typeface="Consolas" pitchFamily="49" charset="0"/>
+              </a:rPr>
+              <a:t>="http://schemas.restbucks.net/order"&gt;</a:t>
+            </a:r>
+          </a:p>
+          <a:p>
+            <a:r>
+              <a:rPr lang="en-CA" sz="1600" i="1" dirty="0" smtClean="0">
+                <a:latin typeface="Consolas" pitchFamily="49" charset="0"/>
+                <a:cs typeface="Consolas" pitchFamily="49" charset="0"/>
+              </a:rPr>
+              <a:t>&lt;</a:t>
+            </a:r>
+            <a:r>
+              <a:rPr lang="pl-PL" sz="1600" i="1" dirty="0" smtClean="0">
+                <a:latin typeface="Consolas" pitchFamily="49" charset="0"/>
+                <a:cs typeface="Consolas" pitchFamily="49" charset="0"/>
+              </a:rPr>
+              <a:t>cardNumber</a:t>
+            </a:r>
+            <a:r>
+              <a:rPr lang="en-CA" sz="1600" i="1" dirty="0" smtClean="0">
+                <a:latin typeface="Consolas" pitchFamily="49" charset="0"/>
+                <a:cs typeface="Consolas" pitchFamily="49" charset="0"/>
+              </a:rPr>
+              <a:t>&gt;</a:t>
+            </a:r>
+            <a:r>
+              <a:rPr lang="pl-PL" sz="1600" i="1" dirty="0" smtClean="0">
+                <a:latin typeface="Consolas" pitchFamily="49" charset="0"/>
+                <a:cs typeface="Consolas" pitchFamily="49" charset="0"/>
+              </a:rPr>
+              <a:t>...&lt;/cardNumber&gt;</a:t>
+            </a:r>
+            <a:endParaRPr lang="en-CA" sz="1600" i="1" dirty="0">
+              <a:latin typeface="Consolas" pitchFamily="49" charset="0"/>
+              <a:cs typeface="Consolas" pitchFamily="49" charset="0"/>
+            </a:endParaRPr>
+          </a:p>
+          <a:p>
+            <a:r>
+              <a:rPr lang="en-CA" sz="1600" i="1" dirty="0">
+                <a:latin typeface="Consolas" pitchFamily="49" charset="0"/>
+                <a:cs typeface="Consolas" pitchFamily="49" charset="0"/>
+              </a:rPr>
+              <a:t>&lt;/order&gt;</a:t>
+            </a:r>
+          </a:p>
+        </p:txBody>
+      </p:sp>
+    </p:spTree>
+    <p:extLst>
+      <p:ext uri="{BB962C8B-B14F-4D97-AF65-F5344CB8AC3E}">
+        <p14:creationId xmlns:p14="http://schemas.microsoft.com/office/powerpoint/2010/main" val="1817859391"/>
+      </p:ext>
+    </p:extLst>
+  </p:cSld>
+  <p:clrMapOvr>
+    <a:masterClrMapping/>
+  </p:clrMapOvr>
+  <mc:AlternateContent xmlns:mc="http://schemas.openxmlformats.org/markup-compatibility/2006" xmlns:p14="http://schemas.microsoft.com/office/powerpoint/2010/main">
+    <mc:Choice Requires="p14">
+      <p:transition spd="slow" p14:dur="800">
+        <p14:flythrough/>
+      </p:transition>
+    </mc:Choice>
+    <mc:Fallback xmlns="">
+      <p:transition spd="slow">
+        <p:fade/>
+      </p:transition>
+    </mc:Fallback>
+  </mc:AlternateContent>
+  <p:timing>
+    <p:tnLst>
+      <p:par>
+        <p:cTn id="1" dur="indefinite" restart="never" nodeType="tmRoot"/>
+      </p:par>
+    </p:tnLst>
+  </p:timing>
+</p:sld>
+</file>
+
+<file path=ppt/slides/slide14.xml><?xml version="1.0" encoding="utf-8"?>
 <p:sld xmlns:a="http://schemas.openxmlformats.org/drawingml/2006/main" xmlns:r="http://schemas.openxmlformats.org/officeDocument/2006/relationships" xmlns:p="http://schemas.openxmlformats.org/presentationml/2006/main">
   <p:cSld>
     <p:spTree>
@@ -9134,7 +9299,167 @@
 </p:sld>
 </file>
 
-<file path=ppt/slides/slide14.xml><?xml version="1.0" encoding="utf-8"?>
+<file path=ppt/slides/slide15.xml><?xml version="1.0" encoding="utf-8"?>
+<p:sld xmlns:a="http://schemas.openxmlformats.org/drawingml/2006/main" xmlns:r="http://schemas.openxmlformats.org/officeDocument/2006/relationships" xmlns:p="http://schemas.openxmlformats.org/presentationml/2006/main">
+  <p:cSld>
+    <p:spTree>
+      <p:nvGrpSpPr>
+        <p:cNvPr id="1" name=""/>
+        <p:cNvGrpSpPr/>
+        <p:nvPr/>
+      </p:nvGrpSpPr>
+      <p:grpSpPr>
+        <a:xfrm>
+          <a:off x="0" y="0"/>
+          <a:ext cx="0" cy="0"/>
+          <a:chOff x="0" y="0"/>
+          <a:chExt cx="0" cy="0"/>
+        </a:xfrm>
+      </p:grpSpPr>
+      <p:pic>
+        <p:nvPicPr>
+          <p:cNvPr id="2" name="Picture 1"/>
+          <p:cNvPicPr>
+            <a:picLocks noChangeAspect="1"/>
+          </p:cNvPicPr>
+          <p:nvPr/>
+        </p:nvPicPr>
+        <p:blipFill>
+          <a:blip r:embed="rId2" cstate="print">
+            <a:extLst>
+              <a:ext uri="{28A0092B-C50C-407E-A947-70E740481C1C}">
+                <a14:useLocalDpi xmlns:a14="http://schemas.microsoft.com/office/drawing/2010/main" val="0"/>
+              </a:ext>
+            </a:extLst>
+          </a:blip>
+          <a:stretch>
+            <a:fillRect/>
+          </a:stretch>
+        </p:blipFill>
+        <p:spPr>
+          <a:xfrm>
+            <a:off x="228600" y="1365901"/>
+            <a:ext cx="3581401" cy="3581401"/>
+          </a:xfrm>
+          <a:prstGeom prst="rect">
+            <a:avLst/>
+          </a:prstGeom>
+          <a:ln>
+            <a:noFill/>
+          </a:ln>
+          <a:effectLst>
+            <a:outerShdw blurRad="292100" dist="139700" dir="2700000" algn="tl" rotWithShape="0">
+              <a:srgbClr val="333333">
+                <a:alpha val="65000"/>
+              </a:srgbClr>
+            </a:outerShdw>
+          </a:effectLst>
+        </p:spPr>
+      </p:pic>
+      <p:pic>
+        <p:nvPicPr>
+          <p:cNvPr id="3" name="Picture 2"/>
+          <p:cNvPicPr>
+            <a:picLocks noChangeAspect="1"/>
+          </p:cNvPicPr>
+          <p:nvPr/>
+        </p:nvPicPr>
+        <p:blipFill>
+          <a:blip r:embed="rId3" cstate="print">
+            <a:extLst>
+              <a:ext uri="{28A0092B-C50C-407E-A947-70E740481C1C}">
+                <a14:useLocalDpi xmlns:a14="http://schemas.microsoft.com/office/drawing/2010/main" val="0"/>
+              </a:ext>
+            </a:extLst>
+          </a:blip>
+          <a:stretch>
+            <a:fillRect/>
+          </a:stretch>
+        </p:blipFill>
+        <p:spPr>
+          <a:xfrm rot="2364820">
+            <a:off x="5281150" y="2359581"/>
+            <a:ext cx="3740938" cy="2133600"/>
+          </a:xfrm>
+          <a:prstGeom prst="rect">
+            <a:avLst/>
+          </a:prstGeom>
+          <a:ln>
+            <a:noFill/>
+          </a:ln>
+          <a:effectLst>
+            <a:outerShdw blurRad="292100" dist="139700" dir="2700000" algn="tl" rotWithShape="0">
+              <a:srgbClr val="333333">
+                <a:alpha val="65000"/>
+              </a:srgbClr>
+            </a:outerShdw>
+          </a:effectLst>
+        </p:spPr>
+      </p:pic>
+      <p:sp>
+        <p:nvSpPr>
+          <p:cNvPr id="4" name="TextBox 3"/>
+          <p:cNvSpPr txBox="1"/>
+          <p:nvPr/>
+        </p:nvSpPr>
+        <p:spPr>
+          <a:xfrm>
+            <a:off x="3733800" y="2497976"/>
+            <a:ext cx="1676400" cy="1862048"/>
+          </a:xfrm>
+          <a:prstGeom prst="rect">
+            <a:avLst/>
+          </a:prstGeom>
+          <a:noFill/>
+        </p:spPr>
+        <p:txBody>
+          <a:bodyPr wrap="square" rtlCol="0">
+            <a:spAutoFit/>
+          </a:bodyPr>
+          <a:lstStyle/>
+          <a:p>
+            <a:pPr algn="ctr"/>
+            <a:r>
+              <a:rPr lang="pl-PL" sz="11500" b="1" dirty="0" smtClean="0"/>
+              <a:t>vs</a:t>
+            </a:r>
+            <a:endParaRPr lang="en-CA" b="1" dirty="0"/>
+          </a:p>
+        </p:txBody>
+      </p:sp>
+    </p:spTree>
+    <p:extLst>
+      <p:ext uri="{BB962C8B-B14F-4D97-AF65-F5344CB8AC3E}">
+        <p14:creationId xmlns:p14="http://schemas.microsoft.com/office/powerpoint/2010/main" val="3182064588"/>
+      </p:ext>
+    </p:extLst>
+  </p:cSld>
+  <p:clrMapOvr>
+    <a:masterClrMapping/>
+  </p:clrMapOvr>
+  <mc:AlternateContent xmlns:mc="http://schemas.openxmlformats.org/markup-compatibility/2006" xmlns:p14="http://schemas.microsoft.com/office/powerpoint/2010/main">
+    <mc:Choice Requires="p14">
+      <p:transition spd="slow" p14:dur="800">
+        <p14:flythrough/>
+      </p:transition>
+    </mc:Choice>
+    <mc:Fallback xmlns="">
+      <p:transition spd="slow">
+        <p:fade/>
+      </p:transition>
+    </mc:Fallback>
+  </mc:AlternateContent>
+  <p:timing>
+    <p:tnLst>
+      <p:par>
+        <p:cTn id="1" dur="indefinite" restart="never" nodeType="tmRoot"/>
+      </p:par>
+    </p:tnLst>
+  </p:timing>
+</p:sld>
+</file>
+
+<file path=ppt/slides/slide16.xml><?xml version="1.0" encoding="utf-8"?>
 <p:sld xmlns:a="http://schemas.openxmlformats.org/drawingml/2006/main" xmlns:r="http://schemas.openxmlformats.org/officeDocument/2006/relationships" xmlns:p="http://schemas.openxmlformats.org/presentationml/2006/main">
   <p:cSld>
     <p:spTree>
@@ -10488,30 +10813,93 @@
           <a:chExt cx="0" cy="0"/>
         </a:xfrm>
       </p:grpSpPr>
-      <p:sp>
-        <p:nvSpPr>
-          <p:cNvPr id="9" name="Right Arrow 8"/>
+      <p:pic>
+        <p:nvPicPr>
+          <p:cNvPr id="2" name="Picture 1"/>
+          <p:cNvPicPr>
+            <a:picLocks noChangeAspect="1"/>
+          </p:cNvPicPr>
+          <p:nvPr/>
+        </p:nvPicPr>
+        <p:blipFill>
+          <a:blip r:embed="rId2" cstate="print">
+            <a:extLst>
+              <a:ext uri="{28A0092B-C50C-407E-A947-70E740481C1C}">
+                <a14:useLocalDpi xmlns:a14="http://schemas.microsoft.com/office/drawing/2010/main" val="0"/>
+              </a:ext>
+            </a:extLst>
+          </a:blip>
+          <a:stretch>
+            <a:fillRect/>
+          </a:stretch>
+        </p:blipFill>
+        <p:spPr>
+          <a:xfrm>
+            <a:off x="6858000" y="2209800"/>
+            <a:ext cx="1325879" cy="2286000"/>
+          </a:xfrm>
+          <a:prstGeom prst="rect">
+            <a:avLst/>
+          </a:prstGeom>
+        </p:spPr>
+      </p:pic>
+      <p:pic>
+        <p:nvPicPr>
+          <p:cNvPr id="3" name="Picture 2"/>
+          <p:cNvPicPr>
+            <a:picLocks noChangeAspect="1"/>
+          </p:cNvPicPr>
+          <p:nvPr/>
+        </p:nvPicPr>
+        <p:blipFill>
+          <a:blip r:embed="rId3" cstate="print">
+            <a:extLst>
+              <a:ext uri="{28A0092B-C50C-407E-A947-70E740481C1C}">
+                <a14:useLocalDpi xmlns:a14="http://schemas.microsoft.com/office/drawing/2010/main" val="0"/>
+              </a:ext>
+            </a:extLst>
+          </a:blip>
+          <a:stretch>
+            <a:fillRect/>
+          </a:stretch>
+        </p:blipFill>
+        <p:spPr>
+          <a:xfrm>
+            <a:off x="685800" y="2216921"/>
+            <a:ext cx="1552319" cy="2286000"/>
+          </a:xfrm>
+          <a:prstGeom prst="rect">
+            <a:avLst/>
+          </a:prstGeom>
+        </p:spPr>
+      </p:pic>
+      <p:sp>
+        <p:nvSpPr>
+          <p:cNvPr id="4" name="Cloud Callout 3"/>
           <p:cNvSpPr/>
           <p:nvPr/>
         </p:nvSpPr>
         <p:spPr>
           <a:xfrm>
-            <a:off x="2057400" y="1699900"/>
-            <a:ext cx="914400" cy="536249"/>
+            <a:off x="1916394" y="609600"/>
+            <a:ext cx="2590800" cy="1447800"/>
           </a:xfrm>
-          <a:prstGeom prst="rightArrow">
-            <a:avLst/>
+          <a:prstGeom prst="cloudCallout">
+            <a:avLst>
+              <a:gd name="adj1" fmla="val -30069"/>
+              <a:gd name="adj2" fmla="val 66632"/>
+            </a:avLst>
           </a:prstGeom>
         </p:spPr>
         <p:style>
           <a:lnRef idx="0">
-            <a:schemeClr val="accent6"/>
+            <a:schemeClr val="accent3"/>
           </a:lnRef>
           <a:fillRef idx="3">
-            <a:schemeClr val="accent6"/>
+            <a:schemeClr val="accent3"/>
           </a:fillRef>
           <a:effectRef idx="3">
-            <a:schemeClr val="accent6"/>
+            <a:schemeClr val="accent3"/>
           </a:effectRef>
           <a:fontRef idx="minor">
             <a:schemeClr val="lt1"/>
@@ -10522,34 +10910,48 @@
           <a:lstStyle/>
           <a:p>
             <a:pPr algn="ctr"/>
-            <a:endParaRPr lang="en-CA"/>
-          </a:p>
-        </p:txBody>
-      </p:sp>
-      <p:sp>
-        <p:nvSpPr>
-          <p:cNvPr id="10" name="Right Arrow 9"/>
+            <a:r>
+              <a:rPr lang="pl-PL" b="1" dirty="0" smtClean="0"/>
+              <a:t>Latte, large, </a:t>
+            </a:r>
+          </a:p>
+          <a:p>
+            <a:pPr algn="ctr"/>
+            <a:r>
+              <a:rPr lang="pl-PL" b="1" dirty="0" smtClean="0"/>
+              <a:t>to go</a:t>
+            </a:r>
+            <a:endParaRPr lang="en-CA" b="1" dirty="0"/>
+          </a:p>
+        </p:txBody>
+      </p:sp>
+      <p:sp>
+        <p:nvSpPr>
+          <p:cNvPr id="5" name="Cloud Callout 4"/>
           <p:cNvSpPr/>
           <p:nvPr/>
         </p:nvSpPr>
         <p:spPr>
           <a:xfrm>
-            <a:off x="6019800" y="1699900"/>
-            <a:ext cx="1066800" cy="536249"/>
+            <a:off x="2570860" y="2420596"/>
+            <a:ext cx="1924940" cy="1069649"/>
           </a:xfrm>
-          <a:prstGeom prst="rightArrow">
-            <a:avLst/>
+          <a:prstGeom prst="cloudCallout">
+            <a:avLst>
+              <a:gd name="adj1" fmla="val -59457"/>
+              <a:gd name="adj2" fmla="val 38532"/>
+            </a:avLst>
           </a:prstGeom>
         </p:spPr>
         <p:style>
           <a:lnRef idx="0">
-            <a:schemeClr val="accent6"/>
+            <a:schemeClr val="accent3"/>
           </a:lnRef>
           <a:fillRef idx="3">
-            <a:schemeClr val="accent6"/>
+            <a:schemeClr val="accent3"/>
           </a:fillRef>
           <a:effectRef idx="3">
-            <a:schemeClr val="accent6"/>
+            <a:schemeClr val="accent3"/>
           </a:effectRef>
           <a:fontRef idx="minor">
             <a:schemeClr val="lt1"/>
@@ -10560,99 +10962,30 @@
           <a:lstStyle/>
           <a:p>
             <a:pPr algn="ctr"/>
-            <a:endParaRPr lang="en-CA"/>
-          </a:p>
-        </p:txBody>
-      </p:sp>
-      <p:sp>
-        <p:nvSpPr>
-          <p:cNvPr id="11" name="Right Arrow 10"/>
+            <a:r>
+              <a:rPr lang="pl-PL" b="1" dirty="0" smtClean="0"/>
+              <a:t>Here’s $5</a:t>
+            </a:r>
+            <a:endParaRPr lang="en-CA" b="1" dirty="0"/>
+          </a:p>
+        </p:txBody>
+      </p:sp>
+      <p:sp>
+        <p:nvSpPr>
+          <p:cNvPr id="6" name="Cloud Callout 5"/>
           <p:cNvSpPr/>
           <p:nvPr/>
         </p:nvSpPr>
         <p:spPr>
-          <a:xfrm rot="10800000">
-            <a:off x="2057400" y="4736503"/>
-            <a:ext cx="957841" cy="536249"/>
+          <a:xfrm flipH="1">
+            <a:off x="4777811" y="1066800"/>
+            <a:ext cx="2209800" cy="1295400"/>
           </a:xfrm>
-          <a:prstGeom prst="rightArrow">
-            <a:avLst/>
-          </a:prstGeom>
-        </p:spPr>
-        <p:style>
-          <a:lnRef idx="0">
-            <a:schemeClr val="accent6"/>
-          </a:lnRef>
-          <a:fillRef idx="3">
-            <a:schemeClr val="accent6"/>
-          </a:fillRef>
-          <a:effectRef idx="3">
-            <a:schemeClr val="accent6"/>
-          </a:effectRef>
-          <a:fontRef idx="minor">
-            <a:schemeClr val="lt1"/>
-          </a:fontRef>
-        </p:style>
-        <p:txBody>
-          <a:bodyPr rtlCol="0" anchor="ctr"/>
-          <a:lstStyle/>
-          <a:p>
-            <a:pPr algn="ctr"/>
-            <a:endParaRPr lang="en-CA"/>
-          </a:p>
-        </p:txBody>
-      </p:sp>
-      <p:sp>
-        <p:nvSpPr>
-          <p:cNvPr id="13" name="Right Arrow 12"/>
-          <p:cNvSpPr/>
-          <p:nvPr/>
-        </p:nvSpPr>
-        <p:spPr>
-          <a:xfrm rot="10800000">
-            <a:off x="6063240" y="4736502"/>
-            <a:ext cx="1023360" cy="536249"/>
-          </a:xfrm>
-          <a:prstGeom prst="rightArrow">
-            <a:avLst/>
-          </a:prstGeom>
-        </p:spPr>
-        <p:style>
-          <a:lnRef idx="0">
-            <a:schemeClr val="accent6"/>
-          </a:lnRef>
-          <a:fillRef idx="3">
-            <a:schemeClr val="accent6"/>
-          </a:fillRef>
-          <a:effectRef idx="3">
-            <a:schemeClr val="accent6"/>
-          </a:effectRef>
-          <a:fontRef idx="minor">
-            <a:schemeClr val="lt1"/>
-          </a:fontRef>
-        </p:style>
-        <p:txBody>
-          <a:bodyPr rtlCol="0" anchor="ctr"/>
-          <a:lstStyle/>
-          <a:p>
-            <a:pPr algn="ctr"/>
-            <a:endParaRPr lang="en-CA"/>
-          </a:p>
-        </p:txBody>
-      </p:sp>
-      <p:sp>
-        <p:nvSpPr>
-          <p:cNvPr id="4" name="Rounded Rectangle 3"/>
-          <p:cNvSpPr/>
-          <p:nvPr/>
-        </p:nvSpPr>
-        <p:spPr>
-          <a:xfrm>
-            <a:off x="533400" y="457200"/>
-            <a:ext cx="1524000" cy="5943600"/>
-          </a:xfrm>
-          <a:prstGeom prst="roundRect">
-            <a:avLst/>
+          <a:prstGeom prst="cloudCallout">
+            <a:avLst>
+              <a:gd name="adj1" fmla="val -32821"/>
+              <a:gd name="adj2" fmla="val 59861"/>
+            </a:avLst>
           </a:prstGeom>
         </p:spPr>
         <p:style>
@@ -10670,31 +11003,34 @@
           </a:fontRef>
         </p:style>
         <p:txBody>
-          <a:bodyPr vert="vert270" rtlCol="0" anchor="ctr"/>
+          <a:bodyPr rtlCol="0" anchor="ctr"/>
           <a:lstStyle/>
           <a:p>
             <a:pPr algn="ctr"/>
             <a:r>
-              <a:rPr lang="pl-PL" sz="3200" dirty="0" smtClean="0"/>
-              <a:t>Client</a:t>
-            </a:r>
-            <a:endParaRPr lang="en-CA" sz="3200" dirty="0"/>
-          </a:p>
-        </p:txBody>
-      </p:sp>
-      <p:sp>
-        <p:nvSpPr>
-          <p:cNvPr id="6" name="Rounded Rectangle 5"/>
+              <a:rPr lang="pl-PL" b="1" dirty="0" smtClean="0"/>
+              <a:t>Order 123</a:t>
+            </a:r>
+            <a:endParaRPr lang="en-CA" b="1" dirty="0"/>
+          </a:p>
+        </p:txBody>
+      </p:sp>
+      <p:sp>
+        <p:nvSpPr>
+          <p:cNvPr id="7" name="Cloud Callout 6"/>
           <p:cNvSpPr/>
           <p:nvPr/>
         </p:nvSpPr>
         <p:spPr>
-          <a:xfrm>
-            <a:off x="7086600" y="457200"/>
-            <a:ext cx="1524000" cy="5943600"/>
+          <a:xfrm flipH="1">
+            <a:off x="4652473" y="2929783"/>
+            <a:ext cx="1824527" cy="1062706"/>
           </a:xfrm>
-          <a:prstGeom prst="roundRect">
-            <a:avLst/>
+          <a:prstGeom prst="cloudCallout">
+            <a:avLst>
+              <a:gd name="adj1" fmla="val -64861"/>
+              <a:gd name="adj2" fmla="val 2188"/>
+            </a:avLst>
           </a:prstGeom>
         </p:spPr>
         <p:style>
@@ -10712,31 +11048,34 @@
           </a:fontRef>
         </p:style>
         <p:txBody>
-          <a:bodyPr vert="vert270" rtlCol="0" anchor="ctr"/>
+          <a:bodyPr rtlCol="0" anchor="ctr"/>
           <a:lstStyle/>
           <a:p>
             <a:pPr algn="ctr"/>
             <a:r>
-              <a:rPr lang="pl-PL" sz="3200" dirty="0" smtClean="0"/>
-              <a:t>Service</a:t>
-            </a:r>
-            <a:endParaRPr lang="en-CA" sz="3200" dirty="0"/>
-          </a:p>
-        </p:txBody>
-      </p:sp>
-      <p:sp>
-        <p:nvSpPr>
-          <p:cNvPr id="7" name="Rounded Rectangle 6"/>
+              <a:rPr lang="pl-PL" b="1" dirty="0" smtClean="0"/>
+              <a:t>Here’s the receipt</a:t>
+            </a:r>
+            <a:endParaRPr lang="en-CA" b="1" dirty="0"/>
+          </a:p>
+        </p:txBody>
+      </p:sp>
+      <p:sp>
+        <p:nvSpPr>
+          <p:cNvPr id="8" name="Cloud Callout 7"/>
           <p:cNvSpPr/>
           <p:nvPr/>
         </p:nvSpPr>
         <p:spPr>
           <a:xfrm>
-            <a:off x="2971800" y="583250"/>
-            <a:ext cx="3048000" cy="2769550"/>
+            <a:off x="2582254" y="3733800"/>
+            <a:ext cx="1924940" cy="1069649"/>
           </a:xfrm>
-          <a:prstGeom prst="roundRect">
-            <a:avLst/>
+          <a:prstGeom prst="cloudCallout">
+            <a:avLst>
+              <a:gd name="adj1" fmla="val -50577"/>
+              <a:gd name="adj2" fmla="val -47753"/>
+            </a:avLst>
           </a:prstGeom>
         </p:spPr>
         <p:style>
@@ -10754,113 +11093,124 @@
           </a:fontRef>
         </p:style>
         <p:txBody>
-          <a:bodyPr vert="horz" rtlCol="0" anchor="t"/>
-          <a:lstStyle/>
-          <a:p>
-            <a:r>
-              <a:rPr lang="en-CA" sz="1600" b="1" i="1" dirty="0">
-                <a:solidFill>
-                  <a:schemeClr val="tx1">
-                    <a:lumMod val="95000"/>
-                    <a:lumOff val="5000"/>
-                  </a:schemeClr>
-                </a:solidFill>
-                <a:latin typeface="Consolas" pitchFamily="49" charset="0"/>
-                <a:cs typeface="Consolas" pitchFamily="49" charset="0"/>
-              </a:rPr>
-              <a:t>POST /order HTTP/1.1</a:t>
-            </a:r>
-          </a:p>
-          <a:p>
-            <a:r>
-              <a:rPr lang="en-CA" sz="1600" i="1" dirty="0">
-                <a:latin typeface="Consolas" pitchFamily="49" charset="0"/>
-                <a:cs typeface="Consolas" pitchFamily="49" charset="0"/>
-              </a:rPr>
-              <a:t>Host: restbucks.net</a:t>
-            </a:r>
-          </a:p>
-          <a:p>
-            <a:r>
-              <a:rPr lang="en-CA" sz="1600" i="1" dirty="0">
-                <a:latin typeface="Consolas" pitchFamily="49" charset="0"/>
-                <a:cs typeface="Consolas" pitchFamily="49" charset="0"/>
-              </a:rPr>
-              <a:t>Content-Type: application/xml</a:t>
-            </a:r>
-          </a:p>
-          <a:p>
-            <a:r>
-              <a:rPr lang="en-CA" sz="1600" i="1" dirty="0">
-                <a:latin typeface="Consolas" pitchFamily="49" charset="0"/>
-                <a:cs typeface="Consolas" pitchFamily="49" charset="0"/>
-              </a:rPr>
-              <a:t>Content-Length: 216</a:t>
-            </a:r>
-          </a:p>
-          <a:p>
-            <a:r>
-              <a:rPr lang="en-CA" sz="1600" i="1" dirty="0" smtClean="0">
-                <a:latin typeface="Consolas" pitchFamily="49" charset="0"/>
-                <a:cs typeface="Consolas" pitchFamily="49" charset="0"/>
-              </a:rPr>
-              <a:t>&lt;</a:t>
-            </a:r>
-            <a:r>
-              <a:rPr lang="en-CA" sz="1600" i="1" dirty="0">
-                <a:latin typeface="Consolas" pitchFamily="49" charset="0"/>
-                <a:cs typeface="Consolas" pitchFamily="49" charset="0"/>
-              </a:rPr>
-              <a:t>order </a:t>
-            </a:r>
-            <a:r>
-              <a:rPr lang="en-CA" sz="1600" i="1" dirty="0" err="1">
-                <a:latin typeface="Consolas" pitchFamily="49" charset="0"/>
-                <a:cs typeface="Consolas" pitchFamily="49" charset="0"/>
-              </a:rPr>
-              <a:t>xmlns</a:t>
-            </a:r>
-            <a:r>
-              <a:rPr lang="en-CA" sz="1600" i="1" dirty="0">
-                <a:latin typeface="Consolas" pitchFamily="49" charset="0"/>
-                <a:cs typeface="Consolas" pitchFamily="49" charset="0"/>
-              </a:rPr>
-              <a:t>="http://schemas.restbucks.net/order"&gt;</a:t>
-            </a:r>
-          </a:p>
-          <a:p>
-            <a:r>
-              <a:rPr lang="en-CA" sz="1600" i="1" dirty="0">
-                <a:latin typeface="Consolas" pitchFamily="49" charset="0"/>
-                <a:cs typeface="Consolas" pitchFamily="49" charset="0"/>
-              </a:rPr>
-              <a:t>&lt;drink&gt;latte&lt;/drink&gt;</a:t>
-            </a:r>
-          </a:p>
-          <a:p>
-            <a:r>
-              <a:rPr lang="en-CA" sz="1600" i="1" dirty="0">
-                <a:latin typeface="Consolas" pitchFamily="49" charset="0"/>
-                <a:cs typeface="Consolas" pitchFamily="49" charset="0"/>
-              </a:rPr>
-              <a:t>&lt;/order&gt;</a:t>
-            </a:r>
-          </a:p>
-        </p:txBody>
-      </p:sp>
-      <p:sp>
-        <p:nvSpPr>
-          <p:cNvPr id="8" name="Rounded Rectangle 7"/>
+          <a:bodyPr rtlCol="0" anchor="ctr"/>
+          <a:lstStyle/>
+          <a:p>
+            <a:pPr algn="ctr"/>
+            <a:r>
+              <a:rPr lang="pl-PL" b="1" dirty="0" smtClean="0"/>
+              <a:t>Status of order 123?</a:t>
+            </a:r>
+            <a:endParaRPr lang="en-CA" b="1" dirty="0"/>
+          </a:p>
+        </p:txBody>
+      </p:sp>
+      <p:sp>
+        <p:nvSpPr>
+          <p:cNvPr id="9" name="Cloud Callout 8"/>
           <p:cNvSpPr/>
           <p:nvPr/>
         </p:nvSpPr>
         <p:spPr>
+          <a:xfrm flipH="1">
+            <a:off x="4774961" y="4114800"/>
+            <a:ext cx="1824527" cy="1062706"/>
+          </a:xfrm>
+          <a:prstGeom prst="cloudCallout">
+            <a:avLst>
+              <a:gd name="adj1" fmla="val -55962"/>
+              <a:gd name="adj2" fmla="val -33195"/>
+            </a:avLst>
+          </a:prstGeom>
+        </p:spPr>
+        <p:style>
+          <a:lnRef idx="0">
+            <a:schemeClr val="accent1"/>
+          </a:lnRef>
+          <a:fillRef idx="3">
+            <a:schemeClr val="accent1"/>
+          </a:fillRef>
+          <a:effectRef idx="3">
+            <a:schemeClr val="accent1"/>
+          </a:effectRef>
+          <a:fontRef idx="minor">
+            <a:schemeClr val="lt1"/>
+          </a:fontRef>
+        </p:style>
+        <p:txBody>
+          <a:bodyPr rtlCol="0" anchor="ctr"/>
+          <a:lstStyle/>
+          <a:p>
+            <a:pPr algn="ctr"/>
+            <a:r>
+              <a:rPr lang="pl-PL" b="1" dirty="0" smtClean="0"/>
+              <a:t>Still preparing</a:t>
+            </a:r>
+            <a:endParaRPr lang="en-CA" b="1" dirty="0"/>
+          </a:p>
+        </p:txBody>
+      </p:sp>
+      <p:sp>
+        <p:nvSpPr>
+          <p:cNvPr id="10" name="Cloud Callout 9"/>
+          <p:cNvSpPr/>
+          <p:nvPr/>
+        </p:nvSpPr>
+        <p:spPr>
+          <a:xfrm flipH="1">
+            <a:off x="4931636" y="5334000"/>
+            <a:ext cx="1824527" cy="1062706"/>
+          </a:xfrm>
+          <a:prstGeom prst="cloudCallout">
+            <a:avLst>
+              <a:gd name="adj1" fmla="val -46594"/>
+              <a:gd name="adj2" fmla="val -66165"/>
+            </a:avLst>
+          </a:prstGeom>
+        </p:spPr>
+        <p:style>
+          <a:lnRef idx="0">
+            <a:schemeClr val="accent1"/>
+          </a:lnRef>
+          <a:fillRef idx="3">
+            <a:schemeClr val="accent1"/>
+          </a:fillRef>
+          <a:effectRef idx="3">
+            <a:schemeClr val="accent1"/>
+          </a:effectRef>
+          <a:fontRef idx="minor">
+            <a:schemeClr val="lt1"/>
+          </a:fontRef>
+        </p:style>
+        <p:txBody>
+          <a:bodyPr rtlCol="0" anchor="ctr"/>
+          <a:lstStyle/>
+          <a:p>
+            <a:pPr algn="ctr"/>
+            <a:r>
+              <a:rPr lang="pl-PL" b="1" dirty="0" smtClean="0"/>
+              <a:t>Ready</a:t>
+            </a:r>
+            <a:endParaRPr lang="en-CA" b="1" dirty="0"/>
+          </a:p>
+        </p:txBody>
+      </p:sp>
+      <p:sp>
+        <p:nvSpPr>
+          <p:cNvPr id="11" name="Cloud Callout 10"/>
+          <p:cNvSpPr/>
+          <p:nvPr/>
+        </p:nvSpPr>
+        <p:spPr>
           <a:xfrm>
-            <a:off x="3015241" y="3608460"/>
-            <a:ext cx="3048000" cy="2792340"/>
+            <a:off x="2438400" y="4804161"/>
+            <a:ext cx="1924940" cy="1069649"/>
           </a:xfrm>
-          <a:prstGeom prst="roundRect">
-            <a:avLst/>
+          <a:prstGeom prst="cloudCallout">
+            <a:avLst>
+              <a:gd name="adj1" fmla="val -59456"/>
+              <a:gd name="adj2" fmla="val -65330"/>
+            </a:avLst>
           </a:prstGeom>
         </p:spPr>
         <p:style>
@@ -10878,111 +11228,62 @@
           </a:fontRef>
         </p:style>
         <p:txBody>
-          <a:bodyPr vert="horz" rtlCol="0" anchor="t"/>
-          <a:lstStyle/>
-          <a:p>
-            <a:r>
-              <a:rPr lang="pl-PL" sz="1600" b="1" i="1" dirty="0" smtClean="0">
-                <a:solidFill>
-                  <a:schemeClr val="tx1">
-                    <a:lumMod val="95000"/>
-                    <a:lumOff val="5000"/>
-                  </a:schemeClr>
-                </a:solidFill>
-                <a:latin typeface="Consolas" pitchFamily="49" charset="0"/>
-                <a:cs typeface="Consolas" pitchFamily="49" charset="0"/>
-              </a:rPr>
-              <a:t>201 Created</a:t>
-            </a:r>
-          </a:p>
-          <a:p>
-            <a:r>
-              <a:rPr lang="pl-PL" sz="1600" b="1" i="1" dirty="0" smtClean="0">
-                <a:solidFill>
-                  <a:schemeClr val="tx1">
-                    <a:lumMod val="95000"/>
-                    <a:lumOff val="5000"/>
-                  </a:schemeClr>
-                </a:solidFill>
-                <a:latin typeface="Consolas" pitchFamily="49" charset="0"/>
-                <a:cs typeface="Consolas" pitchFamily="49" charset="0"/>
-              </a:rPr>
-              <a:t>Location: http://restbucks.net/order/1234</a:t>
-            </a:r>
-          </a:p>
-          <a:p>
-            <a:r>
-              <a:rPr lang="pl-PL" sz="1600" i="1" dirty="0" smtClean="0">
-                <a:latin typeface="Consolas" pitchFamily="49" charset="0"/>
-                <a:cs typeface="Consolas" pitchFamily="49" charset="0"/>
-              </a:rPr>
-              <a:t>ContentType: application/xml</a:t>
-            </a:r>
-            <a:endParaRPr lang="en-CA" sz="1600" i="1" dirty="0">
-              <a:latin typeface="Consolas" pitchFamily="49" charset="0"/>
-              <a:cs typeface="Consolas" pitchFamily="49" charset="0"/>
-            </a:endParaRPr>
-          </a:p>
-          <a:p>
-            <a:r>
-              <a:rPr lang="en-CA" sz="1600" i="1" dirty="0" smtClean="0">
-                <a:latin typeface="Consolas" pitchFamily="49" charset="0"/>
-                <a:cs typeface="Consolas" pitchFamily="49" charset="0"/>
-              </a:rPr>
-              <a:t>&lt;</a:t>
-            </a:r>
-            <a:r>
-              <a:rPr lang="en-CA" sz="1600" i="1" dirty="0">
-                <a:latin typeface="Consolas" pitchFamily="49" charset="0"/>
-                <a:cs typeface="Consolas" pitchFamily="49" charset="0"/>
-              </a:rPr>
-              <a:t>order </a:t>
-            </a:r>
-            <a:r>
-              <a:rPr lang="en-CA" sz="1600" i="1" dirty="0" err="1">
-                <a:latin typeface="Consolas" pitchFamily="49" charset="0"/>
-                <a:cs typeface="Consolas" pitchFamily="49" charset="0"/>
-              </a:rPr>
-              <a:t>xmlns</a:t>
-            </a:r>
-            <a:r>
-              <a:rPr lang="en-CA" sz="1600" i="1" dirty="0">
-                <a:latin typeface="Consolas" pitchFamily="49" charset="0"/>
-                <a:cs typeface="Consolas" pitchFamily="49" charset="0"/>
-              </a:rPr>
-              <a:t>="http://schemas.restbucks.net/order</a:t>
-            </a:r>
-            <a:r>
-              <a:rPr lang="en-CA" sz="1600" i="1" dirty="0" smtClean="0">
-                <a:latin typeface="Consolas" pitchFamily="49" charset="0"/>
-                <a:cs typeface="Consolas" pitchFamily="49" charset="0"/>
-              </a:rPr>
-              <a:t>"&gt;</a:t>
-            </a:r>
-            <a:endParaRPr lang="pl-PL" sz="1600" i="1" dirty="0">
-              <a:latin typeface="Consolas" pitchFamily="49" charset="0"/>
-              <a:cs typeface="Consolas" pitchFamily="49" charset="0"/>
-            </a:endParaRPr>
-          </a:p>
-          <a:p>
-            <a:r>
-              <a:rPr lang="pl-PL" sz="1600" i="1" dirty="0" smtClean="0">
-                <a:latin typeface="Consolas" pitchFamily="49" charset="0"/>
-                <a:cs typeface="Consolas" pitchFamily="49" charset="0"/>
-              </a:rPr>
-              <a:t>...</a:t>
-            </a:r>
-            <a:endParaRPr lang="en-CA" sz="1600" i="1" dirty="0">
-              <a:latin typeface="Consolas" pitchFamily="49" charset="0"/>
-              <a:cs typeface="Consolas" pitchFamily="49" charset="0"/>
-            </a:endParaRPr>
-          </a:p>
-        </p:txBody>
-      </p:sp>
+          <a:bodyPr rtlCol="0" anchor="ctr"/>
+          <a:lstStyle/>
+          <a:p>
+            <a:pPr algn="ctr"/>
+            <a:r>
+              <a:rPr lang="pl-PL" b="1" dirty="0" smtClean="0"/>
+              <a:t>Status of order 123?</a:t>
+            </a:r>
+            <a:endParaRPr lang="en-CA" b="1" dirty="0"/>
+          </a:p>
+        </p:txBody>
+      </p:sp>
+      <p:pic>
+        <p:nvPicPr>
+          <p:cNvPr id="12" name="Picture 11"/>
+          <p:cNvPicPr>
+            <a:picLocks noChangeAspect="1"/>
+          </p:cNvPicPr>
+          <p:nvPr/>
+        </p:nvPicPr>
+        <p:blipFill>
+          <a:blip r:embed="rId4" cstate="print">
+            <a:extLst>
+              <a:ext uri="{28A0092B-C50C-407E-A947-70E740481C1C}">
+                <a14:useLocalDpi xmlns:a14="http://schemas.microsoft.com/office/drawing/2010/main" val="0"/>
+              </a:ext>
+            </a:extLst>
+          </a:blip>
+          <a:stretch>
+            <a:fillRect/>
+          </a:stretch>
+        </p:blipFill>
+        <p:spPr>
+          <a:xfrm>
+            <a:off x="6019800" y="5638800"/>
+            <a:ext cx="1361797" cy="1085134"/>
+          </a:xfrm>
+          <a:prstGeom prst="rect">
+            <a:avLst/>
+          </a:prstGeom>
+          <a:ln>
+            <a:noFill/>
+          </a:ln>
+          <a:effectLst>
+            <a:outerShdw blurRad="292100" dist="139700" dir="2700000" algn="tl" rotWithShape="0">
+              <a:srgbClr val="333333">
+                <a:alpha val="65000"/>
+              </a:srgbClr>
+            </a:outerShdw>
+          </a:effectLst>
+        </p:spPr>
+      </p:pic>
     </p:spTree>
     <p:extLst>
       <p:ext uri="{BB962C8B-B14F-4D97-AF65-F5344CB8AC3E}">
-        <p14:creationId xmlns:p14="http://schemas.microsoft.com/office/powerpoint/2010/main" val="3498248285"/>
+        <p14:creationId xmlns:p14="http://schemas.microsoft.com/office/powerpoint/2010/main" val="1429213824"/>
       </p:ext>
     </p:extLst>
   </p:cSld>
@@ -11036,8 +11337,8 @@
         </p:nvSpPr>
         <p:spPr>
           <a:xfrm>
-            <a:off x="2057398" y="1699900"/>
-            <a:ext cx="981343" cy="536249"/>
+            <a:off x="2057400" y="1699900"/>
+            <a:ext cx="914400" cy="536249"/>
           </a:xfrm>
           <a:prstGeom prst="rightArrow">
             <a:avLst/>
@@ -11074,8 +11375,8 @@
         </p:nvSpPr>
         <p:spPr>
           <a:xfrm>
-            <a:off x="6086741" y="1699900"/>
-            <a:ext cx="999859" cy="536249"/>
+            <a:off x="6019800" y="1699900"/>
+            <a:ext cx="1066800" cy="536249"/>
           </a:xfrm>
           <a:prstGeom prst="rightArrow">
             <a:avLst/>
@@ -11151,7 +11452,7 @@
         <p:spPr>
           <a:xfrm rot="10800000">
             <a:off x="6063240" y="4736502"/>
-            <a:ext cx="1023361" cy="536249"/>
+            <a:ext cx="1023360" cy="536249"/>
           </a:xfrm>
           <a:prstGeom prst="rightArrow">
             <a:avLst/>
@@ -11272,8 +11573,8 @@
         </p:nvSpPr>
         <p:spPr>
           <a:xfrm>
-            <a:off x="3038742" y="1497649"/>
-            <a:ext cx="3048000" cy="940750"/>
+            <a:off x="2971800" y="583250"/>
+            <a:ext cx="3048000" cy="2769550"/>
           </a:xfrm>
           <a:prstGeom prst="roundRect">
             <a:avLst/>
@@ -11294,35 +11595,9 @@
           </a:fontRef>
         </p:style>
         <p:txBody>
-          <a:bodyPr vert="horz" rtlCol="0" anchor="ctr"/>
-          <a:lstStyle/>
-          <a:p>
-            <a:r>
-              <a:rPr lang="pl-PL" sz="1600" b="1" i="1" dirty="0" smtClean="0">
-                <a:solidFill>
-                  <a:schemeClr val="tx1">
-                    <a:lumMod val="95000"/>
-                    <a:lumOff val="5000"/>
-                  </a:schemeClr>
-                </a:solidFill>
-                <a:latin typeface="Consolas" pitchFamily="49" charset="0"/>
-                <a:cs typeface="Consolas" pitchFamily="49" charset="0"/>
-              </a:rPr>
-              <a:t>GET</a:t>
-            </a:r>
-            <a:r>
-              <a:rPr lang="en-CA" sz="1600" b="1" i="1" dirty="0" smtClean="0">
-                <a:solidFill>
-                  <a:schemeClr val="tx1">
-                    <a:lumMod val="95000"/>
-                    <a:lumOff val="5000"/>
-                  </a:schemeClr>
-                </a:solidFill>
-                <a:latin typeface="Consolas" pitchFamily="49" charset="0"/>
-                <a:cs typeface="Consolas" pitchFamily="49" charset="0"/>
-              </a:rPr>
-              <a:t> </a:t>
-            </a:r>
+          <a:bodyPr vert="horz" rtlCol="0" anchor="t"/>
+          <a:lstStyle/>
+          <a:p>
             <a:r>
               <a:rPr lang="en-CA" sz="1600" b="1" i="1" dirty="0">
                 <a:solidFill>
@@ -11334,59 +11609,7 @@
                 <a:latin typeface="Consolas" pitchFamily="49" charset="0"/>
                 <a:cs typeface="Consolas" pitchFamily="49" charset="0"/>
               </a:rPr>
-              <a:t>/</a:t>
-            </a:r>
-            <a:r>
-              <a:rPr lang="en-CA" sz="1600" b="1" i="1" dirty="0" smtClean="0">
-                <a:solidFill>
-                  <a:schemeClr val="tx1">
-                    <a:lumMod val="95000"/>
-                    <a:lumOff val="5000"/>
-                  </a:schemeClr>
-                </a:solidFill>
-                <a:latin typeface="Consolas" pitchFamily="49" charset="0"/>
-                <a:cs typeface="Consolas" pitchFamily="49" charset="0"/>
-              </a:rPr>
-              <a:t>order</a:t>
-            </a:r>
-            <a:r>
-              <a:rPr lang="pl-PL" sz="1600" b="1" i="1" dirty="0" smtClean="0">
-                <a:solidFill>
-                  <a:schemeClr val="tx1">
-                    <a:lumMod val="95000"/>
-                    <a:lumOff val="5000"/>
-                  </a:schemeClr>
-                </a:solidFill>
-                <a:latin typeface="Consolas" pitchFamily="49" charset="0"/>
-                <a:cs typeface="Consolas" pitchFamily="49" charset="0"/>
-              </a:rPr>
-              <a:t>/1234</a:t>
-            </a:r>
-            <a:r>
-              <a:rPr lang="en-CA" sz="1600" b="1" i="1" dirty="0" smtClean="0">
-                <a:solidFill>
-                  <a:schemeClr val="tx1">
-                    <a:lumMod val="95000"/>
-                    <a:lumOff val="5000"/>
-                  </a:schemeClr>
-                </a:solidFill>
-                <a:latin typeface="Consolas" pitchFamily="49" charset="0"/>
-                <a:cs typeface="Consolas" pitchFamily="49" charset="0"/>
-              </a:rPr>
-              <a:t> </a:t>
-            </a:r>
-            <a:r>
-              <a:rPr lang="en-CA" sz="1600" b="1" i="1" dirty="0">
-                <a:solidFill>
-                  <a:schemeClr val="tx1">
-                    <a:lumMod val="95000"/>
-                    <a:lumOff val="5000"/>
-                  </a:schemeClr>
-                </a:solidFill>
-                <a:latin typeface="Consolas" pitchFamily="49" charset="0"/>
-                <a:cs typeface="Consolas" pitchFamily="49" charset="0"/>
-              </a:rPr>
-              <a:t>HTTP/1.1</a:t>
+              <a:t>POST /order HTTP/1.1</a:t>
             </a:r>
           </a:p>
           <a:p>
@@ -11395,19 +11618,74 @@
                 <a:latin typeface="Consolas" pitchFamily="49" charset="0"/>
                 <a:cs typeface="Consolas" pitchFamily="49" charset="0"/>
               </a:rPr>
-              <a:t>Host: </a:t>
-            </a:r>
+              <a:t>Host: restbucks.net</a:t>
+            </a:r>
+          </a:p>
+          <a:p>
+            <a:r>
+              <a:rPr lang="en-CA" sz="1600" i="1" dirty="0">
+                <a:latin typeface="Consolas" pitchFamily="49" charset="0"/>
+                <a:cs typeface="Consolas" pitchFamily="49" charset="0"/>
+              </a:rPr>
+              <a:t>Content-Type: application/xml</a:t>
+            </a:r>
+          </a:p>
+          <a:p>
+            <a:r>
+              <a:rPr lang="en-CA" sz="1600" i="1" dirty="0">
+                <a:latin typeface="Consolas" pitchFamily="49" charset="0"/>
+                <a:cs typeface="Consolas" pitchFamily="49" charset="0"/>
+              </a:rPr>
+              <a:t>Content-Length: 216</a:t>
+            </a:r>
+          </a:p>
+          <a:p>
             <a:r>
               <a:rPr lang="en-CA" sz="1600" i="1" dirty="0" smtClean="0">
                 <a:latin typeface="Consolas" pitchFamily="49" charset="0"/>
                 <a:cs typeface="Consolas" pitchFamily="49" charset="0"/>
               </a:rPr>
-              <a:t>restbucks.net</a:t>
-            </a:r>
-            <a:endParaRPr lang="en-CA" sz="1600" i="1" dirty="0">
-              <a:latin typeface="Consolas" pitchFamily="49" charset="0"/>
-              <a:cs typeface="Consolas" pitchFamily="49" charset="0"/>
-            </a:endParaRPr>
+              <a:t>&lt;</a:t>
+            </a:r>
+            <a:r>
+              <a:rPr lang="en-CA" sz="1600" i="1" dirty="0">
+                <a:latin typeface="Consolas" pitchFamily="49" charset="0"/>
+                <a:cs typeface="Consolas" pitchFamily="49" charset="0"/>
+              </a:rPr>
+              <a:t>order </a:t>
+            </a:r>
+            <a:r>
+              <a:rPr lang="en-CA" sz="1600" i="1" dirty="0" err="1">
+                <a:latin typeface="Consolas" pitchFamily="49" charset="0"/>
+                <a:cs typeface="Consolas" pitchFamily="49" charset="0"/>
+              </a:rPr>
+              <a:t>xmlns</a:t>
+            </a:r>
+            <a:r>
+              <a:rPr lang="en-CA" sz="1600" i="1" dirty="0">
+                <a:latin typeface="Consolas" pitchFamily="49" charset="0"/>
+                <a:cs typeface="Consolas" pitchFamily="49" charset="0"/>
+              </a:rPr>
+              <a:t>="http://schemas.restbucks.net/order"&gt;</a:t>
+            </a:r>
+          </a:p>
+          <a:p>
+            <a:r>
+              <a:rPr lang="en-CA" sz="1600" i="1" dirty="0">
+                <a:latin typeface="Consolas" pitchFamily="49" charset="0"/>
+                <a:cs typeface="Consolas" pitchFamily="49" charset="0"/>
+              </a:rPr>
+              <a:t>&lt;drink&gt;latte&lt;/drink&gt;</a:t>
+            </a:r>
+          </a:p>
+          <a:p>
+            <a:r>
+              <a:rPr lang="en-CA" sz="1600" i="1" dirty="0">
+                <a:latin typeface="Consolas" pitchFamily="49" charset="0"/>
+                <a:cs typeface="Consolas" pitchFamily="49" charset="0"/>
+              </a:rPr>
+              <a:t>&lt;/order&gt;</a:t>
+            </a:r>
           </a:p>
         </p:txBody>
       </p:sp>
@@ -11441,7 +11719,7 @@
           </a:fontRef>
         </p:style>
         <p:txBody>
-          <a:bodyPr vert="horz" rtlCol="0" anchor="ctr"/>
+          <a:bodyPr vert="horz" rtlCol="0" anchor="t"/>
           <a:lstStyle/>
           <a:p>
             <a:r>
@@ -11455,7 +11733,22 @@
                 <a:latin typeface="Consolas" pitchFamily="49" charset="0"/>
                 <a:cs typeface="Consolas" pitchFamily="49" charset="0"/>
               </a:rPr>
-              <a:t>200 OK</a:t>
+              <a:t>201 Created</a:t>
+            </a:r>
+          </a:p>
+          <a:p>
+            <a:r>
+              <a:rPr lang="pl-PL" sz="1600" b="1" i="1" dirty="0" smtClean="0">
+                <a:solidFill>
+                  <a:schemeClr val="tx1">
+                    <a:lumMod val="95000"/>
+                    <a:lumOff val="5000"/>
+                  </a:schemeClr>
+                </a:solidFill>
+                <a:latin typeface="Consolas" pitchFamily="49" charset="0"/>
+                <a:cs typeface="Consolas" pitchFamily="49" charset="0"/>
+              </a:rPr>
+              <a:t>Location: http://restbucks.net/order/1234</a:t>
             </a:r>
           </a:p>
           <a:p>
@@ -11507,19 +11800,6 @@
               </a:rPr>
               <a:t>"&gt;</a:t>
             </a:r>
-            <a:endParaRPr lang="pl-PL" sz="1600" i="1" dirty="0" smtClean="0">
-              <a:latin typeface="Consolas" pitchFamily="49" charset="0"/>
-              <a:cs typeface="Consolas" pitchFamily="49" charset="0"/>
-            </a:endParaRPr>
-          </a:p>
-          <a:p>
-            <a:r>
-              <a:rPr lang="pl-PL" sz="1600" i="1" dirty="0" smtClean="0">
-                <a:latin typeface="Consolas" pitchFamily="49" charset="0"/>
-                <a:cs typeface="Consolas" pitchFamily="49" charset="0"/>
-              </a:rPr>
-              <a:t>&lt;drink&gt;Latte&lt;/drink&gt;</a:t>
-            </a:r>
             <a:endParaRPr lang="pl-PL" sz="1600" i="1" dirty="0">
               <a:latin typeface="Consolas" pitchFamily="49" charset="0"/>
               <a:cs typeface="Consolas" pitchFamily="49" charset="0"/>
@@ -11543,7 +11823,7 @@
     </p:spTree>
     <p:extLst>
       <p:ext uri="{BB962C8B-B14F-4D97-AF65-F5344CB8AC3E}">
-        <p14:creationId xmlns:p14="http://schemas.microsoft.com/office/powerpoint/2010/main" val="1496966245"/>
+        <p14:creationId xmlns:p14="http://schemas.microsoft.com/office/powerpoint/2010/main" val="3498248285"/>
       </p:ext>
     </p:extLst>
   </p:cSld>
@@ -11591,46 +11871,520 @@
       </p:grpSpPr>
       <p:sp>
         <p:nvSpPr>
-          <p:cNvPr id="2" name="TextBox 1"/>
-          <p:cNvSpPr txBox="1"/>
+          <p:cNvPr id="9" name="Right Arrow 8"/>
+          <p:cNvSpPr/>
           <p:nvPr/>
         </p:nvSpPr>
         <p:spPr>
           <a:xfrm>
-            <a:off x="2819400" y="2514600"/>
-            <a:ext cx="3581400" cy="1323439"/>
+            <a:off x="2057398" y="1699900"/>
+            <a:ext cx="981343" cy="536249"/>
           </a:xfrm>
-          <a:prstGeom prst="rect">
+          <a:prstGeom prst="rightArrow">
             <a:avLst/>
           </a:prstGeom>
-          <a:noFill/>
         </p:spPr>
-        <p:txBody>
-          <a:bodyPr wrap="square" rtlCol="0">
-            <a:spAutoFit/>
-          </a:bodyPr>
-          <a:lstStyle/>
-          <a:p>
-            <a:r>
-              <a:rPr lang="pl-PL" sz="8000" dirty="0">
-                <a:hlinkClick r:id="rId2"/>
+        <p:style>
+          <a:lnRef idx="0">
+            <a:schemeClr val="accent6"/>
+          </a:lnRef>
+          <a:fillRef idx="3">
+            <a:schemeClr val="accent6"/>
+          </a:fillRef>
+          <a:effectRef idx="3">
+            <a:schemeClr val="accent6"/>
+          </a:effectRef>
+          <a:fontRef idx="minor">
+            <a:schemeClr val="lt1"/>
+          </a:fontRef>
+        </p:style>
+        <p:txBody>
+          <a:bodyPr rtlCol="0" anchor="ctr"/>
+          <a:lstStyle/>
+          <a:p>
+            <a:pPr algn="ctr"/>
+            <a:endParaRPr lang="en-CA"/>
+          </a:p>
+        </p:txBody>
+      </p:sp>
+      <p:sp>
+        <p:nvSpPr>
+          <p:cNvPr id="10" name="Right Arrow 9"/>
+          <p:cNvSpPr/>
+          <p:nvPr/>
+        </p:nvSpPr>
+        <p:spPr>
+          <a:xfrm>
+            <a:off x="6086741" y="1699900"/>
+            <a:ext cx="999859" cy="536249"/>
+          </a:xfrm>
+          <a:prstGeom prst="rightArrow">
+            <a:avLst/>
+          </a:prstGeom>
+        </p:spPr>
+        <p:style>
+          <a:lnRef idx="0">
+            <a:schemeClr val="accent6"/>
+          </a:lnRef>
+          <a:fillRef idx="3">
+            <a:schemeClr val="accent6"/>
+          </a:fillRef>
+          <a:effectRef idx="3">
+            <a:schemeClr val="accent6"/>
+          </a:effectRef>
+          <a:fontRef idx="minor">
+            <a:schemeClr val="lt1"/>
+          </a:fontRef>
+        </p:style>
+        <p:txBody>
+          <a:bodyPr rtlCol="0" anchor="ctr"/>
+          <a:lstStyle/>
+          <a:p>
+            <a:pPr algn="ctr"/>
+            <a:endParaRPr lang="en-CA"/>
+          </a:p>
+        </p:txBody>
+      </p:sp>
+      <p:sp>
+        <p:nvSpPr>
+          <p:cNvPr id="11" name="Right Arrow 10"/>
+          <p:cNvSpPr/>
+          <p:nvPr/>
+        </p:nvSpPr>
+        <p:spPr>
+          <a:xfrm rot="10800000">
+            <a:off x="2057400" y="4736503"/>
+            <a:ext cx="957841" cy="536249"/>
+          </a:xfrm>
+          <a:prstGeom prst="rightArrow">
+            <a:avLst/>
+          </a:prstGeom>
+        </p:spPr>
+        <p:style>
+          <a:lnRef idx="0">
+            <a:schemeClr val="accent6"/>
+          </a:lnRef>
+          <a:fillRef idx="3">
+            <a:schemeClr val="accent6"/>
+          </a:fillRef>
+          <a:effectRef idx="3">
+            <a:schemeClr val="accent6"/>
+          </a:effectRef>
+          <a:fontRef idx="minor">
+            <a:schemeClr val="lt1"/>
+          </a:fontRef>
+        </p:style>
+        <p:txBody>
+          <a:bodyPr rtlCol="0" anchor="ctr"/>
+          <a:lstStyle/>
+          <a:p>
+            <a:pPr algn="ctr"/>
+            <a:endParaRPr lang="en-CA"/>
+          </a:p>
+        </p:txBody>
+      </p:sp>
+      <p:sp>
+        <p:nvSpPr>
+          <p:cNvPr id="13" name="Right Arrow 12"/>
+          <p:cNvSpPr/>
+          <p:nvPr/>
+        </p:nvSpPr>
+        <p:spPr>
+          <a:xfrm rot="10800000">
+            <a:off x="6063240" y="4736502"/>
+            <a:ext cx="1023361" cy="536249"/>
+          </a:xfrm>
+          <a:prstGeom prst="rightArrow">
+            <a:avLst/>
+          </a:prstGeom>
+        </p:spPr>
+        <p:style>
+          <a:lnRef idx="0">
+            <a:schemeClr val="accent6"/>
+          </a:lnRef>
+          <a:fillRef idx="3">
+            <a:schemeClr val="accent6"/>
+          </a:fillRef>
+          <a:effectRef idx="3">
+            <a:schemeClr val="accent6"/>
+          </a:effectRef>
+          <a:fontRef idx="minor">
+            <a:schemeClr val="lt1"/>
+          </a:fontRef>
+        </p:style>
+        <p:txBody>
+          <a:bodyPr rtlCol="0" anchor="ctr"/>
+          <a:lstStyle/>
+          <a:p>
+            <a:pPr algn="ctr"/>
+            <a:endParaRPr lang="en-CA"/>
+          </a:p>
+        </p:txBody>
+      </p:sp>
+      <p:sp>
+        <p:nvSpPr>
+          <p:cNvPr id="4" name="Rounded Rectangle 3"/>
+          <p:cNvSpPr/>
+          <p:nvPr/>
+        </p:nvSpPr>
+        <p:spPr>
+          <a:xfrm>
+            <a:off x="533400" y="457200"/>
+            <a:ext cx="1524000" cy="5943600"/>
+          </a:xfrm>
+          <a:prstGeom prst="roundRect">
+            <a:avLst/>
+          </a:prstGeom>
+        </p:spPr>
+        <p:style>
+          <a:lnRef idx="0">
+            <a:schemeClr val="accent1"/>
+          </a:lnRef>
+          <a:fillRef idx="3">
+            <a:schemeClr val="accent1"/>
+          </a:fillRef>
+          <a:effectRef idx="3">
+            <a:schemeClr val="accent1"/>
+          </a:effectRef>
+          <a:fontRef idx="minor">
+            <a:schemeClr val="lt1"/>
+          </a:fontRef>
+        </p:style>
+        <p:txBody>
+          <a:bodyPr vert="vert270" rtlCol="0" anchor="ctr"/>
+          <a:lstStyle/>
+          <a:p>
+            <a:pPr algn="ctr"/>
+            <a:r>
+              <a:rPr lang="pl-PL" sz="3200" dirty="0" smtClean="0"/>
+              <a:t>Client</a:t>
+            </a:r>
+            <a:endParaRPr lang="en-CA" sz="3200" dirty="0"/>
+          </a:p>
+        </p:txBody>
+      </p:sp>
+      <p:sp>
+        <p:nvSpPr>
+          <p:cNvPr id="6" name="Rounded Rectangle 5"/>
+          <p:cNvSpPr/>
+          <p:nvPr/>
+        </p:nvSpPr>
+        <p:spPr>
+          <a:xfrm>
+            <a:off x="7086600" y="457200"/>
+            <a:ext cx="1524000" cy="5943600"/>
+          </a:xfrm>
+          <a:prstGeom prst="roundRect">
+            <a:avLst/>
+          </a:prstGeom>
+        </p:spPr>
+        <p:style>
+          <a:lnRef idx="0">
+            <a:schemeClr val="accent1"/>
+          </a:lnRef>
+          <a:fillRef idx="3">
+            <a:schemeClr val="accent1"/>
+          </a:fillRef>
+          <a:effectRef idx="3">
+            <a:schemeClr val="accent1"/>
+          </a:effectRef>
+          <a:fontRef idx="minor">
+            <a:schemeClr val="lt1"/>
+          </a:fontRef>
+        </p:style>
+        <p:txBody>
+          <a:bodyPr vert="vert270" rtlCol="0" anchor="ctr"/>
+          <a:lstStyle/>
+          <a:p>
+            <a:pPr algn="ctr"/>
+            <a:r>
+              <a:rPr lang="pl-PL" sz="3200" dirty="0" smtClean="0"/>
+              <a:t>Service</a:t>
+            </a:r>
+            <a:endParaRPr lang="en-CA" sz="3200" dirty="0"/>
+          </a:p>
+        </p:txBody>
+      </p:sp>
+      <p:sp>
+        <p:nvSpPr>
+          <p:cNvPr id="7" name="Rounded Rectangle 6"/>
+          <p:cNvSpPr/>
+          <p:nvPr/>
+        </p:nvSpPr>
+        <p:spPr>
+          <a:xfrm>
+            <a:off x="3038742" y="1497649"/>
+            <a:ext cx="3048000" cy="940750"/>
+          </a:xfrm>
+          <a:prstGeom prst="roundRect">
+            <a:avLst/>
+          </a:prstGeom>
+        </p:spPr>
+        <p:style>
+          <a:lnRef idx="0">
+            <a:schemeClr val="accent3"/>
+          </a:lnRef>
+          <a:fillRef idx="3">
+            <a:schemeClr val="accent3"/>
+          </a:fillRef>
+          <a:effectRef idx="3">
+            <a:schemeClr val="accent3"/>
+          </a:effectRef>
+          <a:fontRef idx="minor">
+            <a:schemeClr val="lt1"/>
+          </a:fontRef>
+        </p:style>
+        <p:txBody>
+          <a:bodyPr vert="horz" rtlCol="0" anchor="ctr"/>
+          <a:lstStyle/>
+          <a:p>
+            <a:r>
+              <a:rPr lang="pl-PL" sz="1600" b="1" i="1" dirty="0" smtClean="0">
+                <a:solidFill>
+                  <a:schemeClr val="tx1">
+                    <a:lumMod val="95000"/>
+                    <a:lumOff val="5000"/>
+                  </a:schemeClr>
+                </a:solidFill>
+                <a:latin typeface="Consolas" pitchFamily="49" charset="0"/>
+                <a:cs typeface="Consolas" pitchFamily="49" charset="0"/>
               </a:rPr>
-              <a:t>c</a:t>
-            </a:r>
-            <a:r>
-              <a:rPr lang="pl-PL" sz="8000" dirty="0" smtClean="0">
-                <a:hlinkClick r:id="rId2"/>
+              <a:t>GET</a:t>
+            </a:r>
+            <a:r>
+              <a:rPr lang="en-CA" sz="1600" b="1" i="1" dirty="0" smtClean="0">
+                <a:solidFill>
+                  <a:schemeClr val="tx1">
+                    <a:lumMod val="95000"/>
+                    <a:lumOff val="5000"/>
+                  </a:schemeClr>
+                </a:solidFill>
+                <a:latin typeface="Consolas" pitchFamily="49" charset="0"/>
+                <a:cs typeface="Consolas" pitchFamily="49" charset="0"/>
               </a:rPr>
-              <a:t>lick me</a:t>
-            </a:r>
-            <a:endParaRPr lang="en-CA" sz="8000" dirty="0"/>
+              <a:t> </a:t>
+            </a:r>
+            <a:r>
+              <a:rPr lang="en-CA" sz="1600" b="1" i="1" dirty="0">
+                <a:solidFill>
+                  <a:schemeClr val="tx1">
+                    <a:lumMod val="95000"/>
+                    <a:lumOff val="5000"/>
+                  </a:schemeClr>
+                </a:solidFill>
+                <a:latin typeface="Consolas" pitchFamily="49" charset="0"/>
+                <a:cs typeface="Consolas" pitchFamily="49" charset="0"/>
+              </a:rPr>
+              <a:t>/</a:t>
+            </a:r>
+            <a:r>
+              <a:rPr lang="en-CA" sz="1600" b="1" i="1" dirty="0" smtClean="0">
+                <a:solidFill>
+                  <a:schemeClr val="tx1">
+                    <a:lumMod val="95000"/>
+                    <a:lumOff val="5000"/>
+                  </a:schemeClr>
+                </a:solidFill>
+                <a:latin typeface="Consolas" pitchFamily="49" charset="0"/>
+                <a:cs typeface="Consolas" pitchFamily="49" charset="0"/>
+              </a:rPr>
+              <a:t>order</a:t>
+            </a:r>
+            <a:r>
+              <a:rPr lang="pl-PL" sz="1600" b="1" i="1" dirty="0" smtClean="0">
+                <a:solidFill>
+                  <a:schemeClr val="tx1">
+                    <a:lumMod val="95000"/>
+                    <a:lumOff val="5000"/>
+                  </a:schemeClr>
+                </a:solidFill>
+                <a:latin typeface="Consolas" pitchFamily="49" charset="0"/>
+                <a:cs typeface="Consolas" pitchFamily="49" charset="0"/>
+              </a:rPr>
+              <a:t>/1234</a:t>
+            </a:r>
+            <a:r>
+              <a:rPr lang="en-CA" sz="1600" b="1" i="1" dirty="0" smtClean="0">
+                <a:solidFill>
+                  <a:schemeClr val="tx1">
+                    <a:lumMod val="95000"/>
+                    <a:lumOff val="5000"/>
+                  </a:schemeClr>
+                </a:solidFill>
+                <a:latin typeface="Consolas" pitchFamily="49" charset="0"/>
+                <a:cs typeface="Consolas" pitchFamily="49" charset="0"/>
+              </a:rPr>
+              <a:t> </a:t>
+            </a:r>
+            <a:r>
+              <a:rPr lang="en-CA" sz="1600" b="1" i="1" dirty="0">
+                <a:solidFill>
+                  <a:schemeClr val="tx1">
+                    <a:lumMod val="95000"/>
+                    <a:lumOff val="5000"/>
+                  </a:schemeClr>
+                </a:solidFill>
+                <a:latin typeface="Consolas" pitchFamily="49" charset="0"/>
+                <a:cs typeface="Consolas" pitchFamily="49" charset="0"/>
+              </a:rPr>
+              <a:t>HTTP/1.1</a:t>
+            </a:r>
+          </a:p>
+          <a:p>
+            <a:r>
+              <a:rPr lang="en-CA" sz="1600" i="1" dirty="0">
+                <a:latin typeface="Consolas" pitchFamily="49" charset="0"/>
+                <a:cs typeface="Consolas" pitchFamily="49" charset="0"/>
+              </a:rPr>
+              <a:t>Host: </a:t>
+            </a:r>
+            <a:r>
+              <a:rPr lang="en-CA" sz="1600" i="1" dirty="0" smtClean="0">
+                <a:latin typeface="Consolas" pitchFamily="49" charset="0"/>
+                <a:cs typeface="Consolas" pitchFamily="49" charset="0"/>
+              </a:rPr>
+              <a:t>restbucks.net</a:t>
+            </a:r>
+            <a:endParaRPr lang="en-CA" sz="1600" i="1" dirty="0">
+              <a:latin typeface="Consolas" pitchFamily="49" charset="0"/>
+              <a:cs typeface="Consolas" pitchFamily="49" charset="0"/>
+            </a:endParaRPr>
+          </a:p>
+        </p:txBody>
+      </p:sp>
+      <p:sp>
+        <p:nvSpPr>
+          <p:cNvPr id="8" name="Rounded Rectangle 7"/>
+          <p:cNvSpPr/>
+          <p:nvPr/>
+        </p:nvSpPr>
+        <p:spPr>
+          <a:xfrm>
+            <a:off x="3015241" y="3608460"/>
+            <a:ext cx="3048000" cy="2792340"/>
+          </a:xfrm>
+          <a:prstGeom prst="roundRect">
+            <a:avLst/>
+          </a:prstGeom>
+        </p:spPr>
+        <p:style>
+          <a:lnRef idx="0">
+            <a:schemeClr val="accent3"/>
+          </a:lnRef>
+          <a:fillRef idx="3">
+            <a:schemeClr val="accent3"/>
+          </a:fillRef>
+          <a:effectRef idx="3">
+            <a:schemeClr val="accent3"/>
+          </a:effectRef>
+          <a:fontRef idx="minor">
+            <a:schemeClr val="lt1"/>
+          </a:fontRef>
+        </p:style>
+        <p:txBody>
+          <a:bodyPr vert="horz" rtlCol="0" anchor="ctr"/>
+          <a:lstStyle/>
+          <a:p>
+            <a:r>
+              <a:rPr lang="pl-PL" sz="1600" b="1" i="1" dirty="0" smtClean="0">
+                <a:solidFill>
+                  <a:schemeClr val="tx1">
+                    <a:lumMod val="95000"/>
+                    <a:lumOff val="5000"/>
+                  </a:schemeClr>
+                </a:solidFill>
+                <a:latin typeface="Consolas" pitchFamily="49" charset="0"/>
+                <a:cs typeface="Consolas" pitchFamily="49" charset="0"/>
+              </a:rPr>
+              <a:t>200 OK</a:t>
+            </a:r>
+          </a:p>
+          <a:p>
+            <a:r>
+              <a:rPr lang="pl-PL" sz="1600" i="1" dirty="0" smtClean="0">
+                <a:latin typeface="Consolas" pitchFamily="49" charset="0"/>
+                <a:cs typeface="Consolas" pitchFamily="49" charset="0"/>
+              </a:rPr>
+              <a:t>ContentType: application/xml</a:t>
+            </a:r>
+            <a:endParaRPr lang="en-CA" sz="1600" i="1" dirty="0">
+              <a:latin typeface="Consolas" pitchFamily="49" charset="0"/>
+              <a:cs typeface="Consolas" pitchFamily="49" charset="0"/>
+            </a:endParaRPr>
+          </a:p>
+          <a:p>
+            <a:r>
+              <a:rPr lang="en-CA" sz="1600" i="1" dirty="0" smtClean="0">
+                <a:latin typeface="Consolas" pitchFamily="49" charset="0"/>
+                <a:cs typeface="Consolas" pitchFamily="49" charset="0"/>
+              </a:rPr>
+              <a:t>&lt;</a:t>
+            </a:r>
+            <a:r>
+              <a:rPr lang="en-CA" sz="1600" i="1" dirty="0">
+                <a:latin typeface="Consolas" pitchFamily="49" charset="0"/>
+                <a:cs typeface="Consolas" pitchFamily="49" charset="0"/>
+              </a:rPr>
+              <a:t>order </a:t>
+            </a:r>
+            <a:r>
+              <a:rPr lang="en-CA" sz="1600" i="1" dirty="0" err="1">
+                <a:latin typeface="Consolas" pitchFamily="49" charset="0"/>
+                <a:cs typeface="Consolas" pitchFamily="49" charset="0"/>
+              </a:rPr>
+              <a:t>xmlns</a:t>
+            </a:r>
+            <a:r>
+              <a:rPr lang="en-CA" sz="1600" i="1" dirty="0">
+                <a:latin typeface="Consolas" pitchFamily="49" charset="0"/>
+                <a:cs typeface="Consolas" pitchFamily="49" charset="0"/>
+              </a:rPr>
+              <a:t>="http://schemas.restbucks.net/order</a:t>
+            </a:r>
+            <a:r>
+              <a:rPr lang="en-CA" sz="1600" i="1" dirty="0" smtClean="0">
+                <a:latin typeface="Consolas" pitchFamily="49" charset="0"/>
+                <a:cs typeface="Consolas" pitchFamily="49" charset="0"/>
+              </a:rPr>
+              <a:t>"&gt;</a:t>
+            </a:r>
+            <a:endParaRPr lang="pl-PL" sz="1600" i="1" dirty="0" smtClean="0">
+              <a:latin typeface="Consolas" pitchFamily="49" charset="0"/>
+              <a:cs typeface="Consolas" pitchFamily="49" charset="0"/>
+            </a:endParaRPr>
+          </a:p>
+          <a:p>
+            <a:r>
+              <a:rPr lang="pl-PL" sz="1600" i="1" dirty="0" smtClean="0">
+                <a:latin typeface="Consolas" pitchFamily="49" charset="0"/>
+                <a:cs typeface="Consolas" pitchFamily="49" charset="0"/>
+              </a:rPr>
+              <a:t>&lt;drink&gt;Latte&lt;/drink&gt;</a:t>
+            </a:r>
+            <a:endParaRPr lang="pl-PL" sz="1600" i="1" dirty="0">
+              <a:latin typeface="Consolas" pitchFamily="49" charset="0"/>
+              <a:cs typeface="Consolas" pitchFamily="49" charset="0"/>
+            </a:endParaRPr>
+          </a:p>
+          <a:p>
+            <a:r>
+              <a:rPr lang="pl-PL" sz="1600" i="1" dirty="0" smtClean="0">
+                <a:latin typeface="Consolas" pitchFamily="49" charset="0"/>
+                <a:cs typeface="Consolas" pitchFamily="49" charset="0"/>
+              </a:rPr>
+              <a:t>...</a:t>
+            </a:r>
+            <a:endParaRPr lang="en-CA" sz="1600" i="1" dirty="0">
+              <a:latin typeface="Consolas" pitchFamily="49" charset="0"/>
+              <a:cs typeface="Consolas" pitchFamily="49" charset="0"/>
+            </a:endParaRPr>
           </a:p>
         </p:txBody>
       </p:sp>
     </p:spTree>
     <p:extLst>
       <p:ext uri="{BB962C8B-B14F-4D97-AF65-F5344CB8AC3E}">
-        <p14:creationId xmlns:p14="http://schemas.microsoft.com/office/powerpoint/2010/main" val="3985022318"/>
+        <p14:creationId xmlns:p14="http://schemas.microsoft.com/office/powerpoint/2010/main" val="1496966245"/>
       </p:ext>
     </p:extLst>
   </p:cSld>
@@ -11676,32 +12430,48 @@
           <a:chExt cx="0" cy="0"/>
         </a:xfrm>
       </p:grpSpPr>
-      <p:graphicFrame>
-        <p:nvGraphicFramePr>
-          <p:cNvPr id="2" name="Diagram 1"/>
-          <p:cNvGraphicFramePr/>
-          <p:nvPr>
-            <p:extLst>
-              <p:ext uri="{D42A27DB-BD31-4B8C-83A1-F6EECF244321}">
-                <p14:modId xmlns:p14="http://schemas.microsoft.com/office/powerpoint/2010/main" val="3603990318"/>
-              </p:ext>
-            </p:extLst>
-          </p:nvPr>
-        </p:nvGraphicFramePr>
-        <p:xfrm>
-          <a:off x="419100" y="914400"/>
-          <a:ext cx="8305800" cy="5029200"/>
-        </p:xfrm>
-        <a:graphic>
-          <a:graphicData uri="http://schemas.openxmlformats.org/drawingml/2006/diagram">
-            <dgm:relIds xmlns:dgm="http://schemas.openxmlformats.org/drawingml/2006/diagram" xmlns:r="http://schemas.openxmlformats.org/officeDocument/2006/relationships" r:dm="rId2" r:lo="rId3" r:qs="rId4" r:cs="rId5"/>
-          </a:graphicData>
-        </a:graphic>
-      </p:graphicFrame>
+      <p:sp>
+        <p:nvSpPr>
+          <p:cNvPr id="2" name="TextBox 1"/>
+          <p:cNvSpPr txBox="1"/>
+          <p:nvPr/>
+        </p:nvSpPr>
+        <p:spPr>
+          <a:xfrm>
+            <a:off x="2819400" y="2514600"/>
+            <a:ext cx="3581400" cy="1323439"/>
+          </a:xfrm>
+          <a:prstGeom prst="rect">
+            <a:avLst/>
+          </a:prstGeom>
+          <a:noFill/>
+        </p:spPr>
+        <p:txBody>
+          <a:bodyPr wrap="square" rtlCol="0">
+            <a:spAutoFit/>
+          </a:bodyPr>
+          <a:lstStyle/>
+          <a:p>
+            <a:r>
+              <a:rPr lang="pl-PL" sz="8000" dirty="0">
+                <a:hlinkClick r:id="rId2"/>
+              </a:rPr>
+              <a:t>c</a:t>
+            </a:r>
+            <a:r>
+              <a:rPr lang="pl-PL" sz="8000" dirty="0" smtClean="0">
+                <a:hlinkClick r:id="rId2"/>
+              </a:rPr>
+              <a:t>lick me</a:t>
+            </a:r>
+            <a:endParaRPr lang="en-CA" sz="8000" dirty="0"/>
+          </a:p>
+        </p:txBody>
+      </p:sp>
     </p:spTree>
     <p:extLst>
       <p:ext uri="{BB962C8B-B14F-4D97-AF65-F5344CB8AC3E}">
-        <p14:creationId xmlns:p14="http://schemas.microsoft.com/office/powerpoint/2010/main" val="1775356660"/>
+        <p14:creationId xmlns:p14="http://schemas.microsoft.com/office/powerpoint/2010/main" val="3985022318"/>
       </p:ext>
     </p:extLst>
   </p:cSld>

</xml_diff>

<commit_message>
Updated project to be compatible with drop 4 of WCF Web APIs
</commit_message>
<xml_diff>
--- a/src/Restbucks.Site/Downloads/REST.pptx
+++ b/src/Restbucks.Site/Downloads/REST.pptx
@@ -4,6 +4,9 @@
   <p:sldMasterIdLst>
     <p:sldMasterId id="2147483648" r:id="rId1"/>
   </p:sldMasterIdLst>
+  <p:notesMasterIdLst>
+    <p:notesMasterId r:id="rId19"/>
+  </p:notesMasterIdLst>
   <p:sldIdLst>
     <p:sldId id="256" r:id="rId2"/>
     <p:sldId id="257" r:id="rId3"/>
@@ -19,8 +22,9 @@
     <p:sldId id="268" r:id="rId13"/>
     <p:sldId id="266" r:id="rId14"/>
     <p:sldId id="265" r:id="rId15"/>
-    <p:sldId id="271" r:id="rId16"/>
-    <p:sldId id="269" r:id="rId17"/>
+    <p:sldId id="272" r:id="rId16"/>
+    <p:sldId id="271" r:id="rId17"/>
+    <p:sldId id="269" r:id="rId18"/>
   </p:sldIdLst>
   <p:sldSz cx="9144000" cy="6858000" type="screen4x3"/>
   <p:notesSz cx="6858000" cy="9144000"/>
@@ -2645,6 +2649,601 @@
 </dgm:styleDef>
 </file>
 
+<file path=ppt/notesMasters/notesMaster1.xml><?xml version="1.0" encoding="utf-8"?>
+<p:notesMaster xmlns:a="http://schemas.openxmlformats.org/drawingml/2006/main" xmlns:r="http://schemas.openxmlformats.org/officeDocument/2006/relationships" xmlns:p="http://schemas.openxmlformats.org/presentationml/2006/main">
+  <p:cSld>
+    <p:bg>
+      <p:bgRef idx="1001">
+        <a:schemeClr val="bg1"/>
+      </p:bgRef>
+    </p:bg>
+    <p:spTree>
+      <p:nvGrpSpPr>
+        <p:cNvPr id="1" name=""/>
+        <p:cNvGrpSpPr/>
+        <p:nvPr/>
+      </p:nvGrpSpPr>
+      <p:grpSpPr>
+        <a:xfrm>
+          <a:off x="0" y="0"/>
+          <a:ext cx="0" cy="0"/>
+          <a:chOff x="0" y="0"/>
+          <a:chExt cx="0" cy="0"/>
+        </a:xfrm>
+      </p:grpSpPr>
+      <p:sp>
+        <p:nvSpPr>
+          <p:cNvPr id="2" name="Header Placeholder 1"/>
+          <p:cNvSpPr>
+            <a:spLocks noGrp="1"/>
+          </p:cNvSpPr>
+          <p:nvPr>
+            <p:ph type="hdr" sz="quarter"/>
+          </p:nvPr>
+        </p:nvSpPr>
+        <p:spPr>
+          <a:xfrm>
+            <a:off x="0" y="0"/>
+            <a:ext cx="2971800" cy="457200"/>
+          </a:xfrm>
+          <a:prstGeom prst="rect">
+            <a:avLst/>
+          </a:prstGeom>
+        </p:spPr>
+        <p:txBody>
+          <a:bodyPr vert="horz" lIns="91440" tIns="45720" rIns="91440" bIns="45720" rtlCol="0"/>
+          <a:lstStyle>
+            <a:lvl1pPr algn="l">
+              <a:defRPr sz="1200"/>
+            </a:lvl1pPr>
+          </a:lstStyle>
+          <a:p>
+            <a:endParaRPr lang="en-CA"/>
+          </a:p>
+        </p:txBody>
+      </p:sp>
+      <p:sp>
+        <p:nvSpPr>
+          <p:cNvPr id="3" name="Date Placeholder 2"/>
+          <p:cNvSpPr>
+            <a:spLocks noGrp="1"/>
+          </p:cNvSpPr>
+          <p:nvPr>
+            <p:ph type="dt" idx="1"/>
+          </p:nvPr>
+        </p:nvSpPr>
+        <p:spPr>
+          <a:xfrm>
+            <a:off x="3884613" y="0"/>
+            <a:ext cx="2971800" cy="457200"/>
+          </a:xfrm>
+          <a:prstGeom prst="rect">
+            <a:avLst/>
+          </a:prstGeom>
+        </p:spPr>
+        <p:txBody>
+          <a:bodyPr vert="horz" lIns="91440" tIns="45720" rIns="91440" bIns="45720" rtlCol="0"/>
+          <a:lstStyle>
+            <a:lvl1pPr algn="r">
+              <a:defRPr sz="1200"/>
+            </a:lvl1pPr>
+          </a:lstStyle>
+          <a:p>
+            <a:fld id="{D08A75DD-9324-44FD-B664-511CA8D85F41}" type="datetimeFigureOut">
+              <a:rPr lang="en-CA" smtClean="0"/>
+              <a:t>23/03/2011</a:t>
+            </a:fld>
+            <a:endParaRPr lang="en-CA"/>
+          </a:p>
+        </p:txBody>
+      </p:sp>
+      <p:sp>
+        <p:nvSpPr>
+          <p:cNvPr id="4" name="Slide Image Placeholder 3"/>
+          <p:cNvSpPr>
+            <a:spLocks noGrp="1" noRot="1" noChangeAspect="1"/>
+          </p:cNvSpPr>
+          <p:nvPr>
+            <p:ph type="sldImg" idx="2"/>
+          </p:nvPr>
+        </p:nvSpPr>
+        <p:spPr>
+          <a:xfrm>
+            <a:off x="1143000" y="685800"/>
+            <a:ext cx="4572000" cy="3429000"/>
+          </a:xfrm>
+          <a:prstGeom prst="rect">
+            <a:avLst/>
+          </a:prstGeom>
+          <a:noFill/>
+          <a:ln w="12700">
+            <a:solidFill>
+              <a:prstClr val="black"/>
+            </a:solidFill>
+          </a:ln>
+        </p:spPr>
+        <p:txBody>
+          <a:bodyPr vert="horz" lIns="91440" tIns="45720" rIns="91440" bIns="45720" rtlCol="0" anchor="ctr"/>
+          <a:lstStyle/>
+          <a:p>
+            <a:endParaRPr lang="en-CA"/>
+          </a:p>
+        </p:txBody>
+      </p:sp>
+      <p:sp>
+        <p:nvSpPr>
+          <p:cNvPr id="5" name="Notes Placeholder 4"/>
+          <p:cNvSpPr>
+            <a:spLocks noGrp="1"/>
+          </p:cNvSpPr>
+          <p:nvPr>
+            <p:ph type="body" sz="quarter" idx="3"/>
+          </p:nvPr>
+        </p:nvSpPr>
+        <p:spPr>
+          <a:xfrm>
+            <a:off x="685800" y="4343400"/>
+            <a:ext cx="5486400" cy="4114800"/>
+          </a:xfrm>
+          <a:prstGeom prst="rect">
+            <a:avLst/>
+          </a:prstGeom>
+        </p:spPr>
+        <p:txBody>
+          <a:bodyPr vert="horz" lIns="91440" tIns="45720" rIns="91440" bIns="45720" rtlCol="0"/>
+          <a:lstStyle/>
+          <a:p>
+            <a:pPr lvl="0"/>
+            <a:r>
+              <a:rPr lang="en-US" smtClean="0"/>
+              <a:t>Click to edit Master text styles</a:t>
+            </a:r>
+          </a:p>
+          <a:p>
+            <a:pPr lvl="1"/>
+            <a:r>
+              <a:rPr lang="en-US" smtClean="0"/>
+              <a:t>Second level</a:t>
+            </a:r>
+          </a:p>
+          <a:p>
+            <a:pPr lvl="2"/>
+            <a:r>
+              <a:rPr lang="en-US" smtClean="0"/>
+              <a:t>Third level</a:t>
+            </a:r>
+          </a:p>
+          <a:p>
+            <a:pPr lvl="3"/>
+            <a:r>
+              <a:rPr lang="en-US" smtClean="0"/>
+              <a:t>Fourth level</a:t>
+            </a:r>
+          </a:p>
+          <a:p>
+            <a:pPr lvl="4"/>
+            <a:r>
+              <a:rPr lang="en-US" smtClean="0"/>
+              <a:t>Fifth level</a:t>
+            </a:r>
+            <a:endParaRPr lang="en-CA"/>
+          </a:p>
+        </p:txBody>
+      </p:sp>
+      <p:sp>
+        <p:nvSpPr>
+          <p:cNvPr id="6" name="Footer Placeholder 5"/>
+          <p:cNvSpPr>
+            <a:spLocks noGrp="1"/>
+          </p:cNvSpPr>
+          <p:nvPr>
+            <p:ph type="ftr" sz="quarter" idx="4"/>
+          </p:nvPr>
+        </p:nvSpPr>
+        <p:spPr>
+          <a:xfrm>
+            <a:off x="0" y="8685213"/>
+            <a:ext cx="2971800" cy="457200"/>
+          </a:xfrm>
+          <a:prstGeom prst="rect">
+            <a:avLst/>
+          </a:prstGeom>
+        </p:spPr>
+        <p:txBody>
+          <a:bodyPr vert="horz" lIns="91440" tIns="45720" rIns="91440" bIns="45720" rtlCol="0" anchor="b"/>
+          <a:lstStyle>
+            <a:lvl1pPr algn="l">
+              <a:defRPr sz="1200"/>
+            </a:lvl1pPr>
+          </a:lstStyle>
+          <a:p>
+            <a:endParaRPr lang="en-CA"/>
+          </a:p>
+        </p:txBody>
+      </p:sp>
+      <p:sp>
+        <p:nvSpPr>
+          <p:cNvPr id="7" name="Slide Number Placeholder 6"/>
+          <p:cNvSpPr>
+            <a:spLocks noGrp="1"/>
+          </p:cNvSpPr>
+          <p:nvPr>
+            <p:ph type="sldNum" sz="quarter" idx="5"/>
+          </p:nvPr>
+        </p:nvSpPr>
+        <p:spPr>
+          <a:xfrm>
+            <a:off x="3884613" y="8685213"/>
+            <a:ext cx="2971800" cy="457200"/>
+          </a:xfrm>
+          <a:prstGeom prst="rect">
+            <a:avLst/>
+          </a:prstGeom>
+        </p:spPr>
+        <p:txBody>
+          <a:bodyPr vert="horz" lIns="91440" tIns="45720" rIns="91440" bIns="45720" rtlCol="0" anchor="b"/>
+          <a:lstStyle>
+            <a:lvl1pPr algn="r">
+              <a:defRPr sz="1200"/>
+            </a:lvl1pPr>
+          </a:lstStyle>
+          <a:p>
+            <a:fld id="{A8D16605-C025-4A2E-A114-30AEAB840602}" type="slidenum">
+              <a:rPr lang="en-CA" smtClean="0"/>
+              <a:t>‹#›</a:t>
+            </a:fld>
+            <a:endParaRPr lang="en-CA"/>
+          </a:p>
+        </p:txBody>
+      </p:sp>
+    </p:spTree>
+    <p:extLst>
+      <p:ext uri="{BB962C8B-B14F-4D97-AF65-F5344CB8AC3E}">
+        <p14:creationId xmlns:p14="http://schemas.microsoft.com/office/powerpoint/2010/main" val="1901832884"/>
+      </p:ext>
+    </p:extLst>
+  </p:cSld>
+  <p:clrMap bg1="lt1" tx1="dk1" bg2="lt2" tx2="dk2" accent1="accent1" accent2="accent2" accent3="accent3" accent4="accent4" accent5="accent5" accent6="accent6" hlink="hlink" folHlink="folHlink"/>
+  <p:notesStyle>
+    <a:lvl1pPr marL="0" algn="l" defTabSz="914400" rtl="0" eaLnBrk="1" latinLnBrk="0" hangingPunct="1">
+      <a:defRPr sz="1200" kern="1200">
+        <a:solidFill>
+          <a:schemeClr val="tx1"/>
+        </a:solidFill>
+        <a:latin typeface="+mn-lt"/>
+        <a:ea typeface="+mn-ea"/>
+        <a:cs typeface="+mn-cs"/>
+      </a:defRPr>
+    </a:lvl1pPr>
+    <a:lvl2pPr marL="457200" algn="l" defTabSz="914400" rtl="0" eaLnBrk="1" latinLnBrk="0" hangingPunct="1">
+      <a:defRPr sz="1200" kern="1200">
+        <a:solidFill>
+          <a:schemeClr val="tx1"/>
+        </a:solidFill>
+        <a:latin typeface="+mn-lt"/>
+        <a:ea typeface="+mn-ea"/>
+        <a:cs typeface="+mn-cs"/>
+      </a:defRPr>
+    </a:lvl2pPr>
+    <a:lvl3pPr marL="914400" algn="l" defTabSz="914400" rtl="0" eaLnBrk="1" latinLnBrk="0" hangingPunct="1">
+      <a:defRPr sz="1200" kern="1200">
+        <a:solidFill>
+          <a:schemeClr val="tx1"/>
+        </a:solidFill>
+        <a:latin typeface="+mn-lt"/>
+        <a:ea typeface="+mn-ea"/>
+        <a:cs typeface="+mn-cs"/>
+      </a:defRPr>
+    </a:lvl3pPr>
+    <a:lvl4pPr marL="1371600" algn="l" defTabSz="914400" rtl="0" eaLnBrk="1" latinLnBrk="0" hangingPunct="1">
+      <a:defRPr sz="1200" kern="1200">
+        <a:solidFill>
+          <a:schemeClr val="tx1"/>
+        </a:solidFill>
+        <a:latin typeface="+mn-lt"/>
+        <a:ea typeface="+mn-ea"/>
+        <a:cs typeface="+mn-cs"/>
+      </a:defRPr>
+    </a:lvl4pPr>
+    <a:lvl5pPr marL="1828800" algn="l" defTabSz="914400" rtl="0" eaLnBrk="1" latinLnBrk="0" hangingPunct="1">
+      <a:defRPr sz="1200" kern="1200">
+        <a:solidFill>
+          <a:schemeClr val="tx1"/>
+        </a:solidFill>
+        <a:latin typeface="+mn-lt"/>
+        <a:ea typeface="+mn-ea"/>
+        <a:cs typeface="+mn-cs"/>
+      </a:defRPr>
+    </a:lvl5pPr>
+    <a:lvl6pPr marL="2286000" algn="l" defTabSz="914400" rtl="0" eaLnBrk="1" latinLnBrk="0" hangingPunct="1">
+      <a:defRPr sz="1200" kern="1200">
+        <a:solidFill>
+          <a:schemeClr val="tx1"/>
+        </a:solidFill>
+        <a:latin typeface="+mn-lt"/>
+        <a:ea typeface="+mn-ea"/>
+        <a:cs typeface="+mn-cs"/>
+      </a:defRPr>
+    </a:lvl6pPr>
+    <a:lvl7pPr marL="2743200" algn="l" defTabSz="914400" rtl="0" eaLnBrk="1" latinLnBrk="0" hangingPunct="1">
+      <a:defRPr sz="1200" kern="1200">
+        <a:solidFill>
+          <a:schemeClr val="tx1"/>
+        </a:solidFill>
+        <a:latin typeface="+mn-lt"/>
+        <a:ea typeface="+mn-ea"/>
+        <a:cs typeface="+mn-cs"/>
+      </a:defRPr>
+    </a:lvl7pPr>
+    <a:lvl8pPr marL="3200400" algn="l" defTabSz="914400" rtl="0" eaLnBrk="1" latinLnBrk="0" hangingPunct="1">
+      <a:defRPr sz="1200" kern="1200">
+        <a:solidFill>
+          <a:schemeClr val="tx1"/>
+        </a:solidFill>
+        <a:latin typeface="+mn-lt"/>
+        <a:ea typeface="+mn-ea"/>
+        <a:cs typeface="+mn-cs"/>
+      </a:defRPr>
+    </a:lvl8pPr>
+    <a:lvl9pPr marL="3657600" algn="l" defTabSz="914400" rtl="0" eaLnBrk="1" latinLnBrk="0" hangingPunct="1">
+      <a:defRPr sz="1200" kern="1200">
+        <a:solidFill>
+          <a:schemeClr val="tx1"/>
+        </a:solidFill>
+        <a:latin typeface="+mn-lt"/>
+        <a:ea typeface="+mn-ea"/>
+        <a:cs typeface="+mn-cs"/>
+      </a:defRPr>
+    </a:lvl9pPr>
+  </p:notesStyle>
+</p:notesMaster>
+</file>
+
+<file path=ppt/notesSlides/notesSlide1.xml><?xml version="1.0" encoding="utf-8"?>
+<p:notes xmlns:a="http://schemas.openxmlformats.org/drawingml/2006/main" xmlns:r="http://schemas.openxmlformats.org/officeDocument/2006/relationships" xmlns:p="http://schemas.openxmlformats.org/presentationml/2006/main">
+  <p:cSld>
+    <p:spTree>
+      <p:nvGrpSpPr>
+        <p:cNvPr id="1" name=""/>
+        <p:cNvGrpSpPr/>
+        <p:nvPr/>
+      </p:nvGrpSpPr>
+      <p:grpSpPr>
+        <a:xfrm>
+          <a:off x="0" y="0"/>
+          <a:ext cx="0" cy="0"/>
+          <a:chOff x="0" y="0"/>
+          <a:chExt cx="0" cy="0"/>
+        </a:xfrm>
+      </p:grpSpPr>
+      <p:sp>
+        <p:nvSpPr>
+          <p:cNvPr id="2" name="Slide Image Placeholder 1"/>
+          <p:cNvSpPr>
+            <a:spLocks noGrp="1" noRot="1" noChangeAspect="1"/>
+          </p:cNvSpPr>
+          <p:nvPr>
+            <p:ph type="sldImg"/>
+          </p:nvPr>
+        </p:nvSpPr>
+        <p:spPr/>
+      </p:sp>
+      <p:sp>
+        <p:nvSpPr>
+          <p:cNvPr id="3" name="Notes Placeholder 2"/>
+          <p:cNvSpPr>
+            <a:spLocks noGrp="1"/>
+          </p:cNvSpPr>
+          <p:nvPr>
+            <p:ph type="body" idx="1"/>
+          </p:nvPr>
+        </p:nvSpPr>
+        <p:spPr/>
+        <p:txBody>
+          <a:bodyPr/>
+          <a:lstStyle/>
+          <a:p>
+            <a:r>
+              <a:rPr lang="en-CA" dirty="0" smtClean="0"/>
+              <a:t>Client - server</a:t>
+            </a:r>
+          </a:p>
+          <a:p>
+            <a:r>
+              <a:rPr lang="en-CA" dirty="0" smtClean="0"/>
+              <a:t>Stateless</a:t>
+            </a:r>
+          </a:p>
+          <a:p>
+            <a:r>
+              <a:rPr lang="en-CA" dirty="0" smtClean="0"/>
+              <a:t>Cacheable</a:t>
+            </a:r>
+          </a:p>
+          <a:p>
+            <a:r>
+              <a:rPr lang="en-CA" dirty="0" smtClean="0"/>
+              <a:t>Layered</a:t>
+            </a:r>
+          </a:p>
+          <a:p>
+            <a:r>
+              <a:rPr lang="en-CA" dirty="0" smtClean="0"/>
+              <a:t>Uniform interface</a:t>
+            </a:r>
+          </a:p>
+          <a:p>
+            <a:endParaRPr lang="en-CA" dirty="0"/>
+          </a:p>
+        </p:txBody>
+      </p:sp>
+      <p:sp>
+        <p:nvSpPr>
+          <p:cNvPr id="4" name="Slide Number Placeholder 3"/>
+          <p:cNvSpPr>
+            <a:spLocks noGrp="1"/>
+          </p:cNvSpPr>
+          <p:nvPr>
+            <p:ph type="sldNum" sz="quarter" idx="10"/>
+          </p:nvPr>
+        </p:nvSpPr>
+        <p:spPr/>
+        <p:txBody>
+          <a:bodyPr/>
+          <a:lstStyle/>
+          <a:p>
+            <a:fld id="{A8D16605-C025-4A2E-A114-30AEAB840602}" type="slidenum">
+              <a:rPr lang="en-CA" smtClean="0"/>
+              <a:t>4</a:t>
+            </a:fld>
+            <a:endParaRPr lang="en-CA"/>
+          </a:p>
+        </p:txBody>
+      </p:sp>
+    </p:spTree>
+    <p:extLst>
+      <p:ext uri="{BB962C8B-B14F-4D97-AF65-F5344CB8AC3E}">
+        <p14:creationId xmlns:p14="http://schemas.microsoft.com/office/powerpoint/2010/main" val="1515310628"/>
+      </p:ext>
+    </p:extLst>
+  </p:cSld>
+  <p:clrMapOvr>
+    <a:masterClrMapping/>
+  </p:clrMapOvr>
+</p:notes>
+</file>
+
+<file path=ppt/notesSlides/notesSlide2.xml><?xml version="1.0" encoding="utf-8"?>
+<p:notes xmlns:a="http://schemas.openxmlformats.org/drawingml/2006/main" xmlns:r="http://schemas.openxmlformats.org/officeDocument/2006/relationships" xmlns:p="http://schemas.openxmlformats.org/presentationml/2006/main">
+  <p:cSld>
+    <p:spTree>
+      <p:nvGrpSpPr>
+        <p:cNvPr id="1" name=""/>
+        <p:cNvGrpSpPr/>
+        <p:nvPr/>
+      </p:nvGrpSpPr>
+      <p:grpSpPr>
+        <a:xfrm>
+          <a:off x="0" y="0"/>
+          <a:ext cx="0" cy="0"/>
+          <a:chOff x="0" y="0"/>
+          <a:chExt cx="0" cy="0"/>
+        </a:xfrm>
+      </p:grpSpPr>
+      <p:sp>
+        <p:nvSpPr>
+          <p:cNvPr id="2" name="Slide Image Placeholder 1"/>
+          <p:cNvSpPr>
+            <a:spLocks noGrp="1" noRot="1" noChangeAspect="1"/>
+          </p:cNvSpPr>
+          <p:nvPr>
+            <p:ph type="sldImg"/>
+          </p:nvPr>
+        </p:nvSpPr>
+        <p:spPr/>
+      </p:sp>
+      <p:sp>
+        <p:nvSpPr>
+          <p:cNvPr id="3" name="Notes Placeholder 2"/>
+          <p:cNvSpPr>
+            <a:spLocks noGrp="1"/>
+          </p:cNvSpPr>
+          <p:nvPr>
+            <p:ph type="body" idx="1"/>
+          </p:nvPr>
+        </p:nvSpPr>
+        <p:spPr/>
+        <p:txBody>
+          <a:bodyPr/>
+          <a:lstStyle/>
+          <a:p>
+            <a:r>
+              <a:rPr lang="pl-PL" dirty="0" smtClean="0"/>
+              <a:t>Headers</a:t>
+            </a:r>
+          </a:p>
+          <a:p>
+            <a:r>
+              <a:rPr lang="pl-PL" dirty="0" smtClean="0"/>
+              <a:t>Intermediaries</a:t>
+            </a:r>
+          </a:p>
+          <a:p>
+            <a:endParaRPr lang="pl-PL" dirty="0" smtClean="0"/>
+          </a:p>
+          <a:p>
+            <a:r>
+              <a:rPr lang="pl-PL" dirty="0" smtClean="0"/>
+              <a:t>WSDL</a:t>
+            </a:r>
+          </a:p>
+          <a:p>
+            <a:r>
+              <a:rPr lang="pl-PL" dirty="0" smtClean="0"/>
+              <a:t>End</a:t>
+            </a:r>
+            <a:r>
+              <a:rPr lang="pl-PL" baseline="0" dirty="0" smtClean="0"/>
+              <a:t> to end security</a:t>
+            </a:r>
+          </a:p>
+          <a:p>
+            <a:r>
+              <a:rPr lang="pl-PL" baseline="0" dirty="0" smtClean="0"/>
+              <a:t>Auth</a:t>
+            </a:r>
+          </a:p>
+          <a:p>
+            <a:r>
+              <a:rPr lang="pl-PL" baseline="0" dirty="0" smtClean="0"/>
+              <a:t>Transactions</a:t>
+            </a:r>
+          </a:p>
+          <a:p>
+            <a:r>
+              <a:rPr lang="pl-PL" baseline="0" dirty="0" smtClean="0"/>
+              <a:t>Reliability</a:t>
+            </a:r>
+            <a:endParaRPr lang="en-CA" dirty="0"/>
+          </a:p>
+        </p:txBody>
+      </p:sp>
+      <p:sp>
+        <p:nvSpPr>
+          <p:cNvPr id="4" name="Slide Number Placeholder 3"/>
+          <p:cNvSpPr>
+            <a:spLocks noGrp="1"/>
+          </p:cNvSpPr>
+          <p:nvPr>
+            <p:ph type="sldNum" sz="quarter" idx="10"/>
+          </p:nvPr>
+        </p:nvSpPr>
+        <p:spPr/>
+        <p:txBody>
+          <a:bodyPr/>
+          <a:lstStyle/>
+          <a:p>
+            <a:fld id="{A8D16605-C025-4A2E-A114-30AEAB840602}" type="slidenum">
+              <a:rPr lang="en-CA" smtClean="0"/>
+              <a:t>16</a:t>
+            </a:fld>
+            <a:endParaRPr lang="en-CA"/>
+          </a:p>
+        </p:txBody>
+      </p:sp>
+    </p:spTree>
+    <p:extLst>
+      <p:ext uri="{BB962C8B-B14F-4D97-AF65-F5344CB8AC3E}">
+        <p14:creationId xmlns:p14="http://schemas.microsoft.com/office/powerpoint/2010/main" val="1261828156"/>
+      </p:ext>
+    </p:extLst>
+  </p:cSld>
+  <p:clrMapOvr>
+    <a:masterClrMapping/>
+  </p:clrMapOvr>
+</p:notes>
+</file>
+
 <file path=ppt/slideLayouts/slideLayout1.xml><?xml version="1.0" encoding="utf-8"?>
 <p:sldLayout xmlns:a="http://schemas.openxmlformats.org/drawingml/2006/main" xmlns:r="http://schemas.openxmlformats.org/officeDocument/2006/relationships" xmlns:p="http://schemas.openxmlformats.org/presentationml/2006/main" type="title" preserve="1">
   <p:cSld name="Title Slide">
@@ -9316,6 +9915,85 @@
           <a:chExt cx="0" cy="0"/>
         </a:xfrm>
       </p:grpSpPr>
+      <p:sp>
+        <p:nvSpPr>
+          <p:cNvPr id="2" name="TextBox 1"/>
+          <p:cNvSpPr txBox="1"/>
+          <p:nvPr/>
+        </p:nvSpPr>
+        <p:spPr>
+          <a:xfrm>
+            <a:off x="1714500" y="2321005"/>
+            <a:ext cx="5715000" cy="2215991"/>
+          </a:xfrm>
+          <a:prstGeom prst="rect">
+            <a:avLst/>
+          </a:prstGeom>
+          <a:noFill/>
+        </p:spPr>
+        <p:txBody>
+          <a:bodyPr wrap="square" rtlCol="0">
+            <a:spAutoFit/>
+          </a:bodyPr>
+          <a:lstStyle/>
+          <a:p>
+            <a:r>
+              <a:rPr lang="pl-PL" sz="13800" dirty="0" smtClean="0"/>
+              <a:t>&lt;meta&gt;</a:t>
+            </a:r>
+            <a:endParaRPr lang="en-CA" sz="13800" dirty="0"/>
+          </a:p>
+        </p:txBody>
+      </p:sp>
+    </p:spTree>
+    <p:extLst>
+      <p:ext uri="{BB962C8B-B14F-4D97-AF65-F5344CB8AC3E}">
+        <p14:creationId xmlns:p14="http://schemas.microsoft.com/office/powerpoint/2010/main" val="1315078651"/>
+      </p:ext>
+    </p:extLst>
+  </p:cSld>
+  <p:clrMapOvr>
+    <a:masterClrMapping/>
+  </p:clrMapOvr>
+  <mc:AlternateContent xmlns:mc="http://schemas.openxmlformats.org/markup-compatibility/2006" xmlns:p14="http://schemas.microsoft.com/office/powerpoint/2010/main">
+    <mc:Choice Requires="p14">
+      <p:transition spd="slow" p14:dur="800">
+        <p14:flythrough/>
+      </p:transition>
+    </mc:Choice>
+    <mc:Fallback xmlns="">
+      <p:transition spd="slow">
+        <p:fade/>
+      </p:transition>
+    </mc:Fallback>
+  </mc:AlternateContent>
+  <p:timing>
+    <p:tnLst>
+      <p:par>
+        <p:cTn id="1" dur="indefinite" restart="never" nodeType="tmRoot"/>
+      </p:par>
+    </p:tnLst>
+  </p:timing>
+</p:sld>
+</file>
+
+<file path=ppt/slides/slide16.xml><?xml version="1.0" encoding="utf-8"?>
+<p:sld xmlns:a="http://schemas.openxmlformats.org/drawingml/2006/main" xmlns:r="http://schemas.openxmlformats.org/officeDocument/2006/relationships" xmlns:p="http://schemas.openxmlformats.org/presentationml/2006/main">
+  <p:cSld>
+    <p:spTree>
+      <p:nvGrpSpPr>
+        <p:cNvPr id="1" name=""/>
+        <p:cNvGrpSpPr/>
+        <p:nvPr/>
+      </p:nvGrpSpPr>
+      <p:grpSpPr>
+        <a:xfrm>
+          <a:off x="0" y="0"/>
+          <a:ext cx="0" cy="0"/>
+          <a:chOff x="0" y="0"/>
+          <a:chExt cx="0" cy="0"/>
+        </a:xfrm>
+      </p:grpSpPr>
       <p:pic>
         <p:nvPicPr>
           <p:cNvPr id="2" name="Picture 1"/>
@@ -9325,7 +10003,7 @@
           <p:nvPr/>
         </p:nvPicPr>
         <p:blipFill>
-          <a:blip r:embed="rId2" cstate="print">
+          <a:blip r:embed="rId3" cstate="print">
             <a:extLst>
               <a:ext uri="{28A0092B-C50C-407E-A947-70E740481C1C}">
                 <a14:useLocalDpi xmlns:a14="http://schemas.microsoft.com/office/drawing/2010/main" val="0"/>
@@ -9365,7 +10043,7 @@
           <p:nvPr/>
         </p:nvPicPr>
         <p:blipFill>
-          <a:blip r:embed="rId3" cstate="print">
+          <a:blip r:embed="rId4" cstate="print">
             <a:extLst>
               <a:ext uri="{28A0092B-C50C-407E-A947-70E740481C1C}">
                 <a14:useLocalDpi xmlns:a14="http://schemas.microsoft.com/office/drawing/2010/main" val="0"/>
@@ -9459,7 +10137,7 @@
 </p:sld>
 </file>
 
-<file path=ppt/slides/slide16.xml><?xml version="1.0" encoding="utf-8"?>
+<file path=ppt/slides/slide17.xml><?xml version="1.0" encoding="utf-8"?>
 <p:sld xmlns:a="http://schemas.openxmlformats.org/drawingml/2006/main" xmlns:r="http://schemas.openxmlformats.org/officeDocument/2006/relationships" xmlns:p="http://schemas.openxmlformats.org/presentationml/2006/main">
   <p:cSld>
     <p:spTree>
@@ -9904,7 +10582,7 @@
           <p:nvPr/>
         </p:nvPicPr>
         <p:blipFill>
-          <a:blip r:embed="rId2" cstate="print">
+          <a:blip r:embed="rId3" cstate="print">
             <a:extLst>
               <a:ext uri="{28A0092B-C50C-407E-A947-70E740481C1C}">
                 <a14:useLocalDpi xmlns:a14="http://schemas.microsoft.com/office/drawing/2010/main" val="0"/>
@@ -9934,7 +10612,7 @@
           <p:nvPr/>
         </p:nvPicPr>
         <p:blipFill>
-          <a:blip r:embed="rId2" cstate="print">
+          <a:blip r:embed="rId3" cstate="print">
             <a:extLst>
               <a:ext uri="{28A0092B-C50C-407E-A947-70E740481C1C}">
                 <a14:useLocalDpi xmlns:a14="http://schemas.microsoft.com/office/drawing/2010/main" val="0"/>
@@ -12781,4 +13459,289 @@
   <a:objectDefaults/>
   <a:extraClrSchemeLst/>
 </a:theme>
+</file>
+
+<file path=ppt/theme/theme2.xml><?xml version="1.0" encoding="utf-8"?>
+<a:theme xmlns:a="http://schemas.openxmlformats.org/drawingml/2006/main" name="Office Theme">
+  <a:themeElements>
+    <a:clrScheme name="Office">
+      <a:dk1>
+        <a:sysClr val="windowText" lastClr="000000"/>
+      </a:dk1>
+      <a:lt1>
+        <a:sysClr val="window" lastClr="FFFFFF"/>
+      </a:lt1>
+      <a:dk2>
+        <a:srgbClr val="1F497D"/>
+      </a:dk2>
+      <a:lt2>
+        <a:srgbClr val="EEECE1"/>
+      </a:lt2>
+      <a:accent1>
+        <a:srgbClr val="4F81BD"/>
+      </a:accent1>
+      <a:accent2>
+        <a:srgbClr val="C0504D"/>
+      </a:accent2>
+      <a:accent3>
+        <a:srgbClr val="9BBB59"/>
+      </a:accent3>
+      <a:accent4>
+        <a:srgbClr val="8064A2"/>
+      </a:accent4>
+      <a:accent5>
+        <a:srgbClr val="4BACC6"/>
+      </a:accent5>
+      <a:accent6>
+        <a:srgbClr val="F79646"/>
+      </a:accent6>
+      <a:hlink>
+        <a:srgbClr val="0000FF"/>
+      </a:hlink>
+      <a:folHlink>
+        <a:srgbClr val="800080"/>
+      </a:folHlink>
+    </a:clrScheme>
+    <a:fontScheme name="Office">
+      <a:majorFont>
+        <a:latin typeface="Calibri"/>
+        <a:ea typeface=""/>
+        <a:cs typeface=""/>
+        <a:font script="Jpan" typeface="ＭＳ Ｐゴシック"/>
+        <a:font script="Hang" typeface="맑은 고딕"/>
+        <a:font script="Hans" typeface="宋体"/>
+        <a:font script="Hant" typeface="新細明體"/>
+        <a:font script="Arab" typeface="Times New Roman"/>
+        <a:font script="Hebr" typeface="Times New Roman"/>
+        <a:font script="Thai" typeface="Angsana New"/>
+        <a:font script="Ethi" typeface="Nyala"/>
+        <a:font script="Beng" typeface="Vrinda"/>
+        <a:font script="Gujr" typeface="Shruti"/>
+        <a:font script="Khmr" typeface="MoolBoran"/>
+        <a:font script="Knda" typeface="Tunga"/>
+        <a:font script="Guru" typeface="Raavi"/>
+        <a:font script="Cans" typeface="Euphemia"/>
+        <a:font script="Cher" typeface="Plantagenet Cherokee"/>
+        <a:font script="Yiii" typeface="Microsoft Yi Baiti"/>
+        <a:font script="Tibt" typeface="Microsoft Himalaya"/>
+        <a:font script="Thaa" typeface="MV Boli"/>
+        <a:font script="Deva" typeface="Mangal"/>
+        <a:font script="Telu" typeface="Gautami"/>
+        <a:font script="Taml" typeface="Latha"/>
+        <a:font script="Syrc" typeface="Estrangelo Edessa"/>
+        <a:font script="Orya" typeface="Kalinga"/>
+        <a:font script="Mlym" typeface="Kartika"/>
+        <a:font script="Laoo" typeface="DokChampa"/>
+        <a:font script="Sinh" typeface="Iskoola Pota"/>
+        <a:font script="Mong" typeface="Mongolian Baiti"/>
+        <a:font script="Viet" typeface="Times New Roman"/>
+        <a:font script="Uigh" typeface="Microsoft Uighur"/>
+        <a:font script="Geor" typeface="Sylfaen"/>
+      </a:majorFont>
+      <a:minorFont>
+        <a:latin typeface="Calibri"/>
+        <a:ea typeface=""/>
+        <a:cs typeface=""/>
+        <a:font script="Jpan" typeface="ＭＳ Ｐゴシック"/>
+        <a:font script="Hang" typeface="맑은 고딕"/>
+        <a:font script="Hans" typeface="宋体"/>
+        <a:font script="Hant" typeface="新細明體"/>
+        <a:font script="Arab" typeface="Arial"/>
+        <a:font script="Hebr" typeface="Arial"/>
+        <a:font script="Thai" typeface="Cordia New"/>
+        <a:font script="Ethi" typeface="Nyala"/>
+        <a:font script="Beng" typeface="Vrinda"/>
+        <a:font script="Gujr" typeface="Shruti"/>
+        <a:font script="Khmr" typeface="DaunPenh"/>
+        <a:font script="Knda" typeface="Tunga"/>
+        <a:font script="Guru" typeface="Raavi"/>
+        <a:font script="Cans" typeface="Euphemia"/>
+        <a:font script="Cher" typeface="Plantagenet Cherokee"/>
+        <a:font script="Yiii" typeface="Microsoft Yi Baiti"/>
+        <a:font script="Tibt" typeface="Microsoft Himalaya"/>
+        <a:font script="Thaa" typeface="MV Boli"/>
+        <a:font script="Deva" typeface="Mangal"/>
+        <a:font script="Telu" typeface="Gautami"/>
+        <a:font script="Taml" typeface="Latha"/>
+        <a:font script="Syrc" typeface="Estrangelo Edessa"/>
+        <a:font script="Orya" typeface="Kalinga"/>
+        <a:font script="Mlym" typeface="Kartika"/>
+        <a:font script="Laoo" typeface="DokChampa"/>
+        <a:font script="Sinh" typeface="Iskoola Pota"/>
+        <a:font script="Mong" typeface="Mongolian Baiti"/>
+        <a:font script="Viet" typeface="Arial"/>
+        <a:font script="Uigh" typeface="Microsoft Uighur"/>
+        <a:font script="Geor" typeface="Sylfaen"/>
+      </a:minorFont>
+    </a:fontScheme>
+    <a:fmtScheme name="Office">
+      <a:fillStyleLst>
+        <a:solidFill>
+          <a:schemeClr val="phClr"/>
+        </a:solidFill>
+        <a:gradFill rotWithShape="1">
+          <a:gsLst>
+            <a:gs pos="0">
+              <a:schemeClr val="phClr">
+                <a:tint val="50000"/>
+                <a:satMod val="300000"/>
+              </a:schemeClr>
+            </a:gs>
+            <a:gs pos="35000">
+              <a:schemeClr val="phClr">
+                <a:tint val="37000"/>
+                <a:satMod val="300000"/>
+              </a:schemeClr>
+            </a:gs>
+            <a:gs pos="100000">
+              <a:schemeClr val="phClr">
+                <a:tint val="15000"/>
+                <a:satMod val="350000"/>
+              </a:schemeClr>
+            </a:gs>
+          </a:gsLst>
+          <a:lin ang="16200000" scaled="1"/>
+        </a:gradFill>
+        <a:gradFill rotWithShape="1">
+          <a:gsLst>
+            <a:gs pos="0">
+              <a:schemeClr val="phClr">
+                <a:shade val="51000"/>
+                <a:satMod val="130000"/>
+              </a:schemeClr>
+            </a:gs>
+            <a:gs pos="80000">
+              <a:schemeClr val="phClr">
+                <a:shade val="93000"/>
+                <a:satMod val="130000"/>
+              </a:schemeClr>
+            </a:gs>
+            <a:gs pos="100000">
+              <a:schemeClr val="phClr">
+                <a:shade val="94000"/>
+                <a:satMod val="135000"/>
+              </a:schemeClr>
+            </a:gs>
+          </a:gsLst>
+          <a:lin ang="16200000" scaled="0"/>
+        </a:gradFill>
+      </a:fillStyleLst>
+      <a:lnStyleLst>
+        <a:ln w="9525" cap="flat" cmpd="sng" algn="ctr">
+          <a:solidFill>
+            <a:schemeClr val="phClr">
+              <a:shade val="95000"/>
+              <a:satMod val="105000"/>
+            </a:schemeClr>
+          </a:solidFill>
+          <a:prstDash val="solid"/>
+        </a:ln>
+        <a:ln w="25400" cap="flat" cmpd="sng" algn="ctr">
+          <a:solidFill>
+            <a:schemeClr val="phClr"/>
+          </a:solidFill>
+          <a:prstDash val="solid"/>
+        </a:ln>
+        <a:ln w="38100" cap="flat" cmpd="sng" algn="ctr">
+          <a:solidFill>
+            <a:schemeClr val="phClr"/>
+          </a:solidFill>
+          <a:prstDash val="solid"/>
+        </a:ln>
+      </a:lnStyleLst>
+      <a:effectStyleLst>
+        <a:effectStyle>
+          <a:effectLst>
+            <a:outerShdw blurRad="40000" dist="20000" dir="5400000" rotWithShape="0">
+              <a:srgbClr val="000000">
+                <a:alpha val="38000"/>
+              </a:srgbClr>
+            </a:outerShdw>
+          </a:effectLst>
+        </a:effectStyle>
+        <a:effectStyle>
+          <a:effectLst>
+            <a:outerShdw blurRad="40000" dist="23000" dir="5400000" rotWithShape="0">
+              <a:srgbClr val="000000">
+                <a:alpha val="35000"/>
+              </a:srgbClr>
+            </a:outerShdw>
+          </a:effectLst>
+        </a:effectStyle>
+        <a:effectStyle>
+          <a:effectLst>
+            <a:outerShdw blurRad="40000" dist="23000" dir="5400000" rotWithShape="0">
+              <a:srgbClr val="000000">
+                <a:alpha val="35000"/>
+              </a:srgbClr>
+            </a:outerShdw>
+          </a:effectLst>
+          <a:scene3d>
+            <a:camera prst="orthographicFront">
+              <a:rot lat="0" lon="0" rev="0"/>
+            </a:camera>
+            <a:lightRig rig="threePt" dir="t">
+              <a:rot lat="0" lon="0" rev="1200000"/>
+            </a:lightRig>
+          </a:scene3d>
+          <a:sp3d>
+            <a:bevelT w="63500" h="25400"/>
+          </a:sp3d>
+        </a:effectStyle>
+      </a:effectStyleLst>
+      <a:bgFillStyleLst>
+        <a:solidFill>
+          <a:schemeClr val="phClr"/>
+        </a:solidFill>
+        <a:gradFill rotWithShape="1">
+          <a:gsLst>
+            <a:gs pos="0">
+              <a:schemeClr val="phClr">
+                <a:tint val="40000"/>
+                <a:satMod val="350000"/>
+              </a:schemeClr>
+            </a:gs>
+            <a:gs pos="40000">
+              <a:schemeClr val="phClr">
+                <a:tint val="45000"/>
+                <a:shade val="99000"/>
+                <a:satMod val="350000"/>
+              </a:schemeClr>
+            </a:gs>
+            <a:gs pos="100000">
+              <a:schemeClr val="phClr">
+                <a:shade val="20000"/>
+                <a:satMod val="255000"/>
+              </a:schemeClr>
+            </a:gs>
+          </a:gsLst>
+          <a:path path="circle">
+            <a:fillToRect l="50000" t="-80000" r="50000" b="180000"/>
+          </a:path>
+        </a:gradFill>
+        <a:gradFill rotWithShape="1">
+          <a:gsLst>
+            <a:gs pos="0">
+              <a:schemeClr val="phClr">
+                <a:tint val="80000"/>
+                <a:satMod val="300000"/>
+              </a:schemeClr>
+            </a:gs>
+            <a:gs pos="100000">
+              <a:schemeClr val="phClr">
+                <a:shade val="30000"/>
+                <a:satMod val="200000"/>
+              </a:schemeClr>
+            </a:gs>
+          </a:gsLst>
+          <a:path path="circle">
+            <a:fillToRect l="50000" t="50000" r="50000" b="50000"/>
+          </a:path>
+        </a:gradFill>
+      </a:bgFillStyleLst>
+    </a:fmtScheme>
+  </a:themeElements>
+  <a:objectDefaults/>
+  <a:extraClrSchemeLst/>
+</a:theme>
 </file>
</xml_diff>